<commit_message>
Added stomp() deathbeam() Updated save/load Tweaked inventory interactions
</commit_message>
<xml_diff>
--- a/Лекции/FIST2024_OsnProgram_lek_08_dvukhmernye_massivy.pptx
+++ b/Лекции/FIST2024_OsnProgram_lek_08_dvukhmernye_massivy.pptx
@@ -229,7 +229,7 @@
   </p:defaultTextStyle>
   <p:extLst>
     <p:ext uri="{521415D9-36F7-43E2-AB2F-B90AF26B5E84}">
-      <p14:sectionLst xmlns:p14="http://schemas.microsoft.com/office/powerpoint/2010/main">
+      <p14:sectionLst xmlns:p14="http://schemas.microsoft.com/office/powerpoint/2010/main" xmlns="">
         <p14:section name="Раздел по умолчанию" id="{CE72DD33-DD87-438F-8656-F4ECD17BCF77}">
           <p14:sldIdLst>
             <p14:sldId id="640"/>
@@ -358,7 +358,7 @@
       </p14:sectionLst>
     </p:ext>
     <p:ext uri="{EFAFB233-063F-42B5-8137-9DF3F51BA10A}">
-      <p15:sldGuideLst xmlns:p15="http://schemas.microsoft.com/office/powerpoint/2012/main">
+      <p15:sldGuideLst xmlns:p15="http://schemas.microsoft.com/office/powerpoint/2012/main" xmlns="">
         <p15:guide id="1" orient="horz" pos="2160">
           <p15:clr>
             <a:srgbClr val="A4A3A4"/>
@@ -457,7 +457,8 @@
           <a:p>
             <a:fld id="{D37E7B75-BB9F-426A-B4B7-AC409DFD3BDC}" type="datetimeFigureOut">
               <a:rPr lang="ru-RU" smtClean="0"/>
-              <a:t>20.10.2024</a:t>
+              <a:pPr/>
+              <a:t>25.10.2024</a:t>
             </a:fld>
             <a:endParaRPr lang="ru-RU"/>
           </a:p>
@@ -615,6 +616,7 @@
           <a:p>
             <a:fld id="{778F0BCE-F8BD-4F73-A364-1765E1753651}" type="slidenum">
               <a:rPr lang="ru-RU" smtClean="0"/>
+              <a:pPr/>
               <a:t>‹#›</a:t>
             </a:fld>
             <a:endParaRPr lang="ru-RU"/>
@@ -624,7 +626,7 @@
     </p:spTree>
     <p:extLst>
       <p:ext uri="{BB962C8B-B14F-4D97-AF65-F5344CB8AC3E}">
-        <p14:creationId xmlns:p14="http://schemas.microsoft.com/office/powerpoint/2010/main" val="3840284699"/>
+        <p14:creationId xmlns:p14="http://schemas.microsoft.com/office/powerpoint/2010/main" xmlns="" val="3840284699"/>
       </p:ext>
     </p:extLst>
   </p:cSld>
@@ -903,7 +905,8 @@
           <a:p>
             <a:fld id="{C3366AD2-DA4C-40BF-BD8D-2CB8F96D6E10}" type="datetimeFigureOut">
               <a:rPr lang="ru-RU" smtClean="0"/>
-              <a:t>20.10.2024</a:t>
+              <a:pPr/>
+              <a:t>25.10.2024</a:t>
             </a:fld>
             <a:endParaRPr lang="ru-RU" dirty="0"/>
           </a:p>
@@ -945,6 +948,7 @@
           <a:p>
             <a:fld id="{F88E1E71-BFCB-4728-8781-77F35182DB80}" type="slidenum">
               <a:rPr lang="ru-RU" smtClean="0"/>
+              <a:pPr/>
               <a:t>‹#›</a:t>
             </a:fld>
             <a:endParaRPr lang="ru-RU" dirty="0"/>
@@ -954,7 +958,7 @@
     </p:spTree>
     <p:extLst>
       <p:ext uri="{BB962C8B-B14F-4D97-AF65-F5344CB8AC3E}">
-        <p14:creationId xmlns:p14="http://schemas.microsoft.com/office/powerpoint/2010/main" val="3857884467"/>
+        <p14:creationId xmlns:p14="http://schemas.microsoft.com/office/powerpoint/2010/main" xmlns="" val="3857884467"/>
       </p:ext>
     </p:extLst>
   </p:cSld>
@@ -1071,7 +1075,8 @@
           <a:p>
             <a:fld id="{C3366AD2-DA4C-40BF-BD8D-2CB8F96D6E10}" type="datetimeFigureOut">
               <a:rPr lang="ru-RU" smtClean="0"/>
-              <a:t>20.10.2024</a:t>
+              <a:pPr/>
+              <a:t>25.10.2024</a:t>
             </a:fld>
             <a:endParaRPr lang="ru-RU" dirty="0"/>
           </a:p>
@@ -1113,6 +1118,7 @@
           <a:p>
             <a:fld id="{F88E1E71-BFCB-4728-8781-77F35182DB80}" type="slidenum">
               <a:rPr lang="ru-RU" smtClean="0"/>
+              <a:pPr/>
               <a:t>‹#›</a:t>
             </a:fld>
             <a:endParaRPr lang="ru-RU" dirty="0"/>
@@ -1122,7 +1128,7 @@
     </p:spTree>
     <p:extLst>
       <p:ext uri="{BB962C8B-B14F-4D97-AF65-F5344CB8AC3E}">
-        <p14:creationId xmlns:p14="http://schemas.microsoft.com/office/powerpoint/2010/main" val="2975456407"/>
+        <p14:creationId xmlns:p14="http://schemas.microsoft.com/office/powerpoint/2010/main" xmlns="" val="2975456407"/>
       </p:ext>
     </p:extLst>
   </p:cSld>
@@ -1249,7 +1255,8 @@
           <a:p>
             <a:fld id="{C3366AD2-DA4C-40BF-BD8D-2CB8F96D6E10}" type="datetimeFigureOut">
               <a:rPr lang="ru-RU" smtClean="0"/>
-              <a:t>20.10.2024</a:t>
+              <a:pPr/>
+              <a:t>25.10.2024</a:t>
             </a:fld>
             <a:endParaRPr lang="ru-RU" dirty="0"/>
           </a:p>
@@ -1291,6 +1298,7 @@
           <a:p>
             <a:fld id="{F88E1E71-BFCB-4728-8781-77F35182DB80}" type="slidenum">
               <a:rPr lang="ru-RU" smtClean="0"/>
+              <a:pPr/>
               <a:t>‹#›</a:t>
             </a:fld>
             <a:endParaRPr lang="ru-RU" dirty="0"/>
@@ -1300,7 +1308,7 @@
     </p:spTree>
     <p:extLst>
       <p:ext uri="{BB962C8B-B14F-4D97-AF65-F5344CB8AC3E}">
-        <p14:creationId xmlns:p14="http://schemas.microsoft.com/office/powerpoint/2010/main" val="2447425384"/>
+        <p14:creationId xmlns:p14="http://schemas.microsoft.com/office/powerpoint/2010/main" xmlns="" val="2447425384"/>
       </p:ext>
     </p:extLst>
   </p:cSld>
@@ -1417,7 +1425,8 @@
           <a:p>
             <a:fld id="{C3366AD2-DA4C-40BF-BD8D-2CB8F96D6E10}" type="datetimeFigureOut">
               <a:rPr lang="ru-RU" smtClean="0"/>
-              <a:t>20.10.2024</a:t>
+              <a:pPr/>
+              <a:t>25.10.2024</a:t>
             </a:fld>
             <a:endParaRPr lang="ru-RU" dirty="0"/>
           </a:p>
@@ -1459,6 +1468,7 @@
           <a:p>
             <a:fld id="{F88E1E71-BFCB-4728-8781-77F35182DB80}" type="slidenum">
               <a:rPr lang="ru-RU" smtClean="0"/>
+              <a:pPr/>
               <a:t>‹#›</a:t>
             </a:fld>
             <a:endParaRPr lang="ru-RU" dirty="0"/>
@@ -1468,7 +1478,7 @@
     </p:spTree>
     <p:extLst>
       <p:ext uri="{BB962C8B-B14F-4D97-AF65-F5344CB8AC3E}">
-        <p14:creationId xmlns:p14="http://schemas.microsoft.com/office/powerpoint/2010/main" val="332533996"/>
+        <p14:creationId xmlns:p14="http://schemas.microsoft.com/office/powerpoint/2010/main" xmlns="" val="332533996"/>
       </p:ext>
     </p:extLst>
   </p:cSld>
@@ -1662,7 +1672,8 @@
           <a:p>
             <a:fld id="{C3366AD2-DA4C-40BF-BD8D-2CB8F96D6E10}" type="datetimeFigureOut">
               <a:rPr lang="ru-RU" smtClean="0"/>
-              <a:t>20.10.2024</a:t>
+              <a:pPr/>
+              <a:t>25.10.2024</a:t>
             </a:fld>
             <a:endParaRPr lang="ru-RU" dirty="0"/>
           </a:p>
@@ -1704,6 +1715,7 @@
           <a:p>
             <a:fld id="{F88E1E71-BFCB-4728-8781-77F35182DB80}" type="slidenum">
               <a:rPr lang="ru-RU" smtClean="0"/>
+              <a:pPr/>
               <a:t>‹#›</a:t>
             </a:fld>
             <a:endParaRPr lang="ru-RU" dirty="0"/>
@@ -1713,7 +1725,7 @@
     </p:spTree>
     <p:extLst>
       <p:ext uri="{BB962C8B-B14F-4D97-AF65-F5344CB8AC3E}">
-        <p14:creationId xmlns:p14="http://schemas.microsoft.com/office/powerpoint/2010/main" val="3875742230"/>
+        <p14:creationId xmlns:p14="http://schemas.microsoft.com/office/powerpoint/2010/main" xmlns="" val="3875742230"/>
       </p:ext>
     </p:extLst>
   </p:cSld>
@@ -1947,7 +1959,8 @@
           <a:p>
             <a:fld id="{C3366AD2-DA4C-40BF-BD8D-2CB8F96D6E10}" type="datetimeFigureOut">
               <a:rPr lang="ru-RU" smtClean="0"/>
-              <a:t>20.10.2024</a:t>
+              <a:pPr/>
+              <a:t>25.10.2024</a:t>
             </a:fld>
             <a:endParaRPr lang="ru-RU" dirty="0"/>
           </a:p>
@@ -1989,6 +2002,7 @@
           <a:p>
             <a:fld id="{F88E1E71-BFCB-4728-8781-77F35182DB80}" type="slidenum">
               <a:rPr lang="ru-RU" smtClean="0"/>
+              <a:pPr/>
               <a:t>‹#›</a:t>
             </a:fld>
             <a:endParaRPr lang="ru-RU" dirty="0"/>
@@ -1998,7 +2012,7 @@
     </p:spTree>
     <p:extLst>
       <p:ext uri="{BB962C8B-B14F-4D97-AF65-F5344CB8AC3E}">
-        <p14:creationId xmlns:p14="http://schemas.microsoft.com/office/powerpoint/2010/main" val="4274848075"/>
+        <p14:creationId xmlns:p14="http://schemas.microsoft.com/office/powerpoint/2010/main" xmlns="" val="4274848075"/>
       </p:ext>
     </p:extLst>
   </p:cSld>
@@ -2366,7 +2380,8 @@
           <a:p>
             <a:fld id="{C3366AD2-DA4C-40BF-BD8D-2CB8F96D6E10}" type="datetimeFigureOut">
               <a:rPr lang="ru-RU" smtClean="0"/>
-              <a:t>20.10.2024</a:t>
+              <a:pPr/>
+              <a:t>25.10.2024</a:t>
             </a:fld>
             <a:endParaRPr lang="ru-RU" dirty="0"/>
           </a:p>
@@ -2408,6 +2423,7 @@
           <a:p>
             <a:fld id="{F88E1E71-BFCB-4728-8781-77F35182DB80}" type="slidenum">
               <a:rPr lang="ru-RU" smtClean="0"/>
+              <a:pPr/>
               <a:t>‹#›</a:t>
             </a:fld>
             <a:endParaRPr lang="ru-RU" dirty="0"/>
@@ -2417,7 +2433,7 @@
     </p:spTree>
     <p:extLst>
       <p:ext uri="{BB962C8B-B14F-4D97-AF65-F5344CB8AC3E}">
-        <p14:creationId xmlns:p14="http://schemas.microsoft.com/office/powerpoint/2010/main" val="3954261869"/>
+        <p14:creationId xmlns:p14="http://schemas.microsoft.com/office/powerpoint/2010/main" xmlns="" val="3954261869"/>
       </p:ext>
     </p:extLst>
   </p:cSld>
@@ -2483,7 +2499,8 @@
           <a:p>
             <a:fld id="{C3366AD2-DA4C-40BF-BD8D-2CB8F96D6E10}" type="datetimeFigureOut">
               <a:rPr lang="ru-RU" smtClean="0"/>
-              <a:t>20.10.2024</a:t>
+              <a:pPr/>
+              <a:t>25.10.2024</a:t>
             </a:fld>
             <a:endParaRPr lang="ru-RU" dirty="0"/>
           </a:p>
@@ -2525,6 +2542,7 @@
           <a:p>
             <a:fld id="{F88E1E71-BFCB-4728-8781-77F35182DB80}" type="slidenum">
               <a:rPr lang="ru-RU" smtClean="0"/>
+              <a:pPr/>
               <a:t>‹#›</a:t>
             </a:fld>
             <a:endParaRPr lang="ru-RU" dirty="0"/>
@@ -2534,7 +2552,7 @@
     </p:spTree>
     <p:extLst>
       <p:ext uri="{BB962C8B-B14F-4D97-AF65-F5344CB8AC3E}">
-        <p14:creationId xmlns:p14="http://schemas.microsoft.com/office/powerpoint/2010/main" val="516759562"/>
+        <p14:creationId xmlns:p14="http://schemas.microsoft.com/office/powerpoint/2010/main" xmlns="" val="516759562"/>
       </p:ext>
     </p:extLst>
   </p:cSld>
@@ -2578,7 +2596,8 @@
           <a:p>
             <a:fld id="{C3366AD2-DA4C-40BF-BD8D-2CB8F96D6E10}" type="datetimeFigureOut">
               <a:rPr lang="ru-RU" smtClean="0"/>
-              <a:t>20.10.2024</a:t>
+              <a:pPr/>
+              <a:t>25.10.2024</a:t>
             </a:fld>
             <a:endParaRPr lang="ru-RU" dirty="0"/>
           </a:p>
@@ -2620,6 +2639,7 @@
           <a:p>
             <a:fld id="{F88E1E71-BFCB-4728-8781-77F35182DB80}" type="slidenum">
               <a:rPr lang="ru-RU" smtClean="0"/>
+              <a:pPr/>
               <a:t>‹#›</a:t>
             </a:fld>
             <a:endParaRPr lang="ru-RU" dirty="0"/>
@@ -2629,7 +2649,7 @@
     </p:spTree>
     <p:extLst>
       <p:ext uri="{BB962C8B-B14F-4D97-AF65-F5344CB8AC3E}">
-        <p14:creationId xmlns:p14="http://schemas.microsoft.com/office/powerpoint/2010/main" val="2298037221"/>
+        <p14:creationId xmlns:p14="http://schemas.microsoft.com/office/powerpoint/2010/main" xmlns="" val="2298037221"/>
       </p:ext>
     </p:extLst>
   </p:cSld>
@@ -2853,7 +2873,8 @@
           <a:p>
             <a:fld id="{C3366AD2-DA4C-40BF-BD8D-2CB8F96D6E10}" type="datetimeFigureOut">
               <a:rPr lang="ru-RU" smtClean="0"/>
-              <a:t>20.10.2024</a:t>
+              <a:pPr/>
+              <a:t>25.10.2024</a:t>
             </a:fld>
             <a:endParaRPr lang="ru-RU" dirty="0"/>
           </a:p>
@@ -2895,6 +2916,7 @@
           <a:p>
             <a:fld id="{F88E1E71-BFCB-4728-8781-77F35182DB80}" type="slidenum">
               <a:rPr lang="ru-RU" smtClean="0"/>
+              <a:pPr/>
               <a:t>‹#›</a:t>
             </a:fld>
             <a:endParaRPr lang="ru-RU" dirty="0"/>
@@ -2904,7 +2926,7 @@
     </p:spTree>
     <p:extLst>
       <p:ext uri="{BB962C8B-B14F-4D97-AF65-F5344CB8AC3E}">
-        <p14:creationId xmlns:p14="http://schemas.microsoft.com/office/powerpoint/2010/main" val="3099503693"/>
+        <p14:creationId xmlns:p14="http://schemas.microsoft.com/office/powerpoint/2010/main" xmlns="" val="3099503693"/>
       </p:ext>
     </p:extLst>
   </p:cSld>
@@ -3105,7 +3127,8 @@
           <a:p>
             <a:fld id="{C3366AD2-DA4C-40BF-BD8D-2CB8F96D6E10}" type="datetimeFigureOut">
               <a:rPr lang="ru-RU" smtClean="0"/>
-              <a:t>20.10.2024</a:t>
+              <a:pPr/>
+              <a:t>25.10.2024</a:t>
             </a:fld>
             <a:endParaRPr lang="ru-RU" dirty="0"/>
           </a:p>
@@ -3147,6 +3170,7 @@
           <a:p>
             <a:fld id="{F88E1E71-BFCB-4728-8781-77F35182DB80}" type="slidenum">
               <a:rPr lang="ru-RU" smtClean="0"/>
+              <a:pPr/>
               <a:t>‹#›</a:t>
             </a:fld>
             <a:endParaRPr lang="ru-RU" dirty="0"/>
@@ -3156,7 +3180,7 @@
     </p:spTree>
     <p:extLst>
       <p:ext uri="{BB962C8B-B14F-4D97-AF65-F5344CB8AC3E}">
-        <p14:creationId xmlns:p14="http://schemas.microsoft.com/office/powerpoint/2010/main" val="1482655347"/>
+        <p14:creationId xmlns:p14="http://schemas.microsoft.com/office/powerpoint/2010/main" xmlns="" val="1482655347"/>
       </p:ext>
     </p:extLst>
   </p:cSld>
@@ -3316,7 +3340,8 @@
           <a:p>
             <a:fld id="{C3366AD2-DA4C-40BF-BD8D-2CB8F96D6E10}" type="datetimeFigureOut">
               <a:rPr lang="ru-RU" smtClean="0"/>
-              <a:t>20.10.2024</a:t>
+              <a:pPr/>
+              <a:t>25.10.2024</a:t>
             </a:fld>
             <a:endParaRPr lang="ru-RU" dirty="0"/>
           </a:p>
@@ -3394,6 +3419,7 @@
           <a:p>
             <a:fld id="{F88E1E71-BFCB-4728-8781-77F35182DB80}" type="slidenum">
               <a:rPr lang="ru-RU" smtClean="0"/>
+              <a:pPr/>
               <a:t>‹#›</a:t>
             </a:fld>
             <a:endParaRPr lang="ru-RU" dirty="0"/>
@@ -3403,7 +3429,7 @@
     </p:spTree>
     <p:extLst>
       <p:ext uri="{BB962C8B-B14F-4D97-AF65-F5344CB8AC3E}">
-        <p14:creationId xmlns:p14="http://schemas.microsoft.com/office/powerpoint/2010/main" val="1686278486"/>
+        <p14:creationId xmlns:p14="http://schemas.microsoft.com/office/powerpoint/2010/main" xmlns="" val="1686278486"/>
       </p:ext>
     </p:extLst>
   </p:cSld>
@@ -3923,7 +3949,7 @@
           <p:cNvPr id="6" name="Заголовок 1">
             <a:extLst>
               <a:ext uri="{FF2B5EF4-FFF2-40B4-BE49-F238E27FC236}">
-                <a16:creationId xmlns:a16="http://schemas.microsoft.com/office/drawing/2014/main" id="{3B14BECF-3D77-25C7-559C-67A19E0B1CBC}"/>
+                <a16:creationId xmlns:a16="http://schemas.microsoft.com/office/drawing/2014/main" xmlns="" id="{3B14BECF-3D77-25C7-559C-67A19E0B1CBC}"/>
               </a:ext>
             </a:extLst>
           </p:cNvPr>
@@ -4008,7 +4034,7 @@
           <p:cNvPr id="2" name="Заголовок 1">
             <a:extLst>
               <a:ext uri="{FF2B5EF4-FFF2-40B4-BE49-F238E27FC236}">
-                <a16:creationId xmlns:a16="http://schemas.microsoft.com/office/drawing/2014/main" id="{3C54C129-FC2A-61C9-6796-DDAB2F0E0E76}"/>
+                <a16:creationId xmlns:a16="http://schemas.microsoft.com/office/drawing/2014/main" xmlns="" id="{3C54C129-FC2A-61C9-6796-DDAB2F0E0E76}"/>
               </a:ext>
             </a:extLst>
           </p:cNvPr>
@@ -4068,6 +4094,16 @@
               </a:rPr>
               <a:t>Федосович</a:t>
             </a:r>
+            <a:r>
+              <a:rPr lang="ru-RU" sz="2400" b="1" dirty="0">
+                <a:solidFill>
+                  <a:schemeClr val="tx2"/>
+                </a:solidFill>
+                <a:latin typeface="Calibri" panose="020F0502020204030204" pitchFamily="34" charset="0"/>
+                <a:cs typeface="Calibri" panose="020F0502020204030204" pitchFamily="34" charset="0"/>
+              </a:rPr>
+              <a:t/>
+            </a:r>
             <a:br>
               <a:rPr lang="ru-RU" sz="2400" b="1" dirty="0">
                 <a:solidFill>
@@ -4100,7 +4136,7 @@
     </p:spTree>
     <p:extLst>
       <p:ext uri="{BB962C8B-B14F-4D97-AF65-F5344CB8AC3E}">
-        <p14:creationId xmlns:p14="http://schemas.microsoft.com/office/powerpoint/2010/main" val="4003259821"/>
+        <p14:creationId xmlns:p14="http://schemas.microsoft.com/office/powerpoint/2010/main" xmlns="" val="4003259821"/>
       </p:ext>
     </p:extLst>
   </p:cSld>
@@ -4193,7 +4229,7 @@
           <p:cNvPr id="8" name="TextBox 7">
             <a:extLst>
               <a:ext uri="{FF2B5EF4-FFF2-40B4-BE49-F238E27FC236}">
-                <a16:creationId xmlns:a16="http://schemas.microsoft.com/office/drawing/2014/main" id="{1E2A112A-6CFD-4660-9BF8-8DC33023E526}"/>
+                <a16:creationId xmlns:a16="http://schemas.microsoft.com/office/drawing/2014/main" xmlns="" id="{1E2A112A-6CFD-4660-9BF8-8DC33023E526}"/>
               </a:ext>
             </a:extLst>
           </p:cNvPr>
@@ -4234,7 +4270,7 @@
           <p:cNvPr id="4" name="TextBox 3">
             <a:extLst>
               <a:ext uri="{FF2B5EF4-FFF2-40B4-BE49-F238E27FC236}">
-                <a16:creationId xmlns:a16="http://schemas.microsoft.com/office/drawing/2014/main" id="{CC1C7DB5-602D-49BC-920E-9E1EA9462E63}"/>
+                <a16:creationId xmlns:a16="http://schemas.microsoft.com/office/drawing/2014/main" xmlns="" id="{CC1C7DB5-602D-49BC-920E-9E1EA9462E63}"/>
               </a:ext>
             </a:extLst>
           </p:cNvPr>
@@ -4517,7 +4553,7 @@
           <p:cNvPr id="6" name="Picture 2">
             <a:extLst>
               <a:ext uri="{FF2B5EF4-FFF2-40B4-BE49-F238E27FC236}">
-                <a16:creationId xmlns:a16="http://schemas.microsoft.com/office/drawing/2014/main" id="{6D025139-0404-4580-AAFB-A0FE5F5955D4}"/>
+                <a16:creationId xmlns:a16="http://schemas.microsoft.com/office/drawing/2014/main" xmlns="" id="{6D025139-0404-4580-AAFB-A0FE5F5955D4}"/>
               </a:ext>
             </a:extLst>
           </p:cNvPr>
@@ -4530,7 +4566,7 @@
           <a:blip r:embed="rId2">
             <a:extLst>
               <a:ext uri="{28A0092B-C50C-407E-A947-70E740481C1C}">
-                <a14:useLocalDpi xmlns:a14="http://schemas.microsoft.com/office/drawing/2010/main" val="0"/>
+                <a14:useLocalDpi xmlns:a14="http://schemas.microsoft.com/office/drawing/2010/main" xmlns="" val="0"/>
               </a:ext>
             </a:extLst>
           </a:blip>
@@ -4553,14 +4589,14 @@
           </a:ln>
           <a:extLst>
             <a:ext uri="{909E8E84-426E-40DD-AFC4-6F175D3DCCD1}">
-              <a14:hiddenFill xmlns:a14="http://schemas.microsoft.com/office/drawing/2010/main">
+              <a14:hiddenFill xmlns:a14="http://schemas.microsoft.com/office/drawing/2010/main" xmlns="">
                 <a:solidFill>
                   <a:schemeClr val="accent1"/>
                 </a:solidFill>
               </a14:hiddenFill>
             </a:ext>
             <a:ext uri="{91240B29-F687-4F45-9708-019B960494DF}">
-              <a14:hiddenLine xmlns:a14="http://schemas.microsoft.com/office/drawing/2010/main" w="9525">
+              <a14:hiddenLine xmlns:a14="http://schemas.microsoft.com/office/drawing/2010/main" xmlns="" w="9525">
                 <a:solidFill>
                   <a:schemeClr val="tx1"/>
                 </a:solidFill>
@@ -4575,7 +4611,7 @@
     </p:spTree>
     <p:extLst>
       <p:ext uri="{BB962C8B-B14F-4D97-AF65-F5344CB8AC3E}">
-        <p14:creationId xmlns:p14="http://schemas.microsoft.com/office/powerpoint/2010/main" val="3776837698"/>
+        <p14:creationId xmlns:p14="http://schemas.microsoft.com/office/powerpoint/2010/main" xmlns="" val="3776837698"/>
       </p:ext>
     </p:extLst>
   </p:cSld>
@@ -4636,7 +4672,7 @@
           <p:cNvPr id="5" name="Прямоугольник 4">
             <a:extLst>
               <a:ext uri="{FF2B5EF4-FFF2-40B4-BE49-F238E27FC236}">
-                <a16:creationId xmlns:a16="http://schemas.microsoft.com/office/drawing/2014/main" id="{80EF481F-15AF-4912-9334-5D004B11C5A6}"/>
+                <a16:creationId xmlns:a16="http://schemas.microsoft.com/office/drawing/2014/main" xmlns="" id="{80EF481F-15AF-4912-9334-5D004B11C5A6}"/>
               </a:ext>
             </a:extLst>
           </p:cNvPr>
@@ -4676,7 +4712,7 @@
           <p:cNvPr id="8" name="Рисунок 7">
             <a:extLst>
               <a:ext uri="{FF2B5EF4-FFF2-40B4-BE49-F238E27FC236}">
-                <a16:creationId xmlns:a16="http://schemas.microsoft.com/office/drawing/2014/main" id="{956DBC7F-27F1-49D4-92FF-A5ABF50C17D8}"/>
+                <a16:creationId xmlns:a16="http://schemas.microsoft.com/office/drawing/2014/main" xmlns="" id="{956DBC7F-27F1-49D4-92FF-A5ABF50C17D8}"/>
               </a:ext>
             </a:extLst>
           </p:cNvPr>
@@ -4704,7 +4740,7 @@
     </p:spTree>
     <p:extLst>
       <p:ext uri="{BB962C8B-B14F-4D97-AF65-F5344CB8AC3E}">
-        <p14:creationId xmlns:p14="http://schemas.microsoft.com/office/powerpoint/2010/main" val="1406713027"/>
+        <p14:creationId xmlns:p14="http://schemas.microsoft.com/office/powerpoint/2010/main" xmlns="" val="1406713027"/>
       </p:ext>
     </p:extLst>
   </p:cSld>
@@ -4765,7 +4801,7 @@
           <p:cNvPr id="5" name="Прямоугольник 4">
             <a:extLst>
               <a:ext uri="{FF2B5EF4-FFF2-40B4-BE49-F238E27FC236}">
-                <a16:creationId xmlns:a16="http://schemas.microsoft.com/office/drawing/2014/main" id="{80EF481F-15AF-4912-9334-5D004B11C5A6}"/>
+                <a16:creationId xmlns:a16="http://schemas.microsoft.com/office/drawing/2014/main" xmlns="" id="{80EF481F-15AF-4912-9334-5D004B11C5A6}"/>
               </a:ext>
             </a:extLst>
           </p:cNvPr>
@@ -4825,7 +4861,7 @@
           <p:cNvPr id="7" name="Рисунок 6">
             <a:extLst>
               <a:ext uri="{FF2B5EF4-FFF2-40B4-BE49-F238E27FC236}">
-                <a16:creationId xmlns:a16="http://schemas.microsoft.com/office/drawing/2014/main" id="{141DB045-3860-48C3-85B9-C93350EA9B79}"/>
+                <a16:creationId xmlns:a16="http://schemas.microsoft.com/office/drawing/2014/main" xmlns="" id="{141DB045-3860-48C3-85B9-C93350EA9B79}"/>
               </a:ext>
             </a:extLst>
           </p:cNvPr>
@@ -4853,7 +4889,7 @@
     </p:spTree>
     <p:extLst>
       <p:ext uri="{BB962C8B-B14F-4D97-AF65-F5344CB8AC3E}">
-        <p14:creationId xmlns:p14="http://schemas.microsoft.com/office/powerpoint/2010/main" val="2966595219"/>
+        <p14:creationId xmlns:p14="http://schemas.microsoft.com/office/powerpoint/2010/main" xmlns="" val="2966595219"/>
       </p:ext>
     </p:extLst>
   </p:cSld>
@@ -4914,7 +4950,7 @@
           <p:cNvPr id="5" name="Прямоугольник 4">
             <a:extLst>
               <a:ext uri="{FF2B5EF4-FFF2-40B4-BE49-F238E27FC236}">
-                <a16:creationId xmlns:a16="http://schemas.microsoft.com/office/drawing/2014/main" id="{80EF481F-15AF-4912-9334-5D004B11C5A6}"/>
+                <a16:creationId xmlns:a16="http://schemas.microsoft.com/office/drawing/2014/main" xmlns="" id="{80EF481F-15AF-4912-9334-5D004B11C5A6}"/>
               </a:ext>
             </a:extLst>
           </p:cNvPr>
@@ -4966,7 +5002,7 @@
           <p:cNvPr id="4" name="Рисунок 3">
             <a:extLst>
               <a:ext uri="{FF2B5EF4-FFF2-40B4-BE49-F238E27FC236}">
-                <a16:creationId xmlns:a16="http://schemas.microsoft.com/office/drawing/2014/main" id="{A2FAF18F-600D-4192-AC6F-5CAF3EE5FA7D}"/>
+                <a16:creationId xmlns:a16="http://schemas.microsoft.com/office/drawing/2014/main" xmlns="" id="{A2FAF18F-600D-4192-AC6F-5CAF3EE5FA7D}"/>
               </a:ext>
             </a:extLst>
           </p:cNvPr>
@@ -4996,7 +5032,7 @@
           <p:cNvPr id="8" name="Рисунок 7">
             <a:extLst>
               <a:ext uri="{FF2B5EF4-FFF2-40B4-BE49-F238E27FC236}">
-                <a16:creationId xmlns:a16="http://schemas.microsoft.com/office/drawing/2014/main" id="{DD7DF464-3C5F-4B12-AB46-CFCB69A4B282}"/>
+                <a16:creationId xmlns:a16="http://schemas.microsoft.com/office/drawing/2014/main" xmlns="" id="{DD7DF464-3C5F-4B12-AB46-CFCB69A4B282}"/>
               </a:ext>
             </a:extLst>
           </p:cNvPr>
@@ -5024,7 +5060,7 @@
     </p:spTree>
     <p:extLst>
       <p:ext uri="{BB962C8B-B14F-4D97-AF65-F5344CB8AC3E}">
-        <p14:creationId xmlns:p14="http://schemas.microsoft.com/office/powerpoint/2010/main" val="2954626335"/>
+        <p14:creationId xmlns:p14="http://schemas.microsoft.com/office/powerpoint/2010/main" xmlns="" val="2954626335"/>
       </p:ext>
     </p:extLst>
   </p:cSld>
@@ -5085,7 +5121,7 @@
           <p:cNvPr id="5" name="Прямоугольник 4">
             <a:extLst>
               <a:ext uri="{FF2B5EF4-FFF2-40B4-BE49-F238E27FC236}">
-                <a16:creationId xmlns:a16="http://schemas.microsoft.com/office/drawing/2014/main" id="{80EF481F-15AF-4912-9334-5D004B11C5A6}"/>
+                <a16:creationId xmlns:a16="http://schemas.microsoft.com/office/drawing/2014/main" xmlns="" id="{80EF481F-15AF-4912-9334-5D004B11C5A6}"/>
               </a:ext>
             </a:extLst>
           </p:cNvPr>
@@ -5130,7 +5166,7 @@
           <p:cNvPr id="6" name="Рисунок 5">
             <a:extLst>
               <a:ext uri="{FF2B5EF4-FFF2-40B4-BE49-F238E27FC236}">
-                <a16:creationId xmlns:a16="http://schemas.microsoft.com/office/drawing/2014/main" id="{07DCDC76-6FDB-4897-9781-AAF4626BAF6C}"/>
+                <a16:creationId xmlns:a16="http://schemas.microsoft.com/office/drawing/2014/main" xmlns="" id="{07DCDC76-6FDB-4897-9781-AAF4626BAF6C}"/>
               </a:ext>
             </a:extLst>
           </p:cNvPr>
@@ -5158,7 +5194,7 @@
     </p:spTree>
     <p:extLst>
       <p:ext uri="{BB962C8B-B14F-4D97-AF65-F5344CB8AC3E}">
-        <p14:creationId xmlns:p14="http://schemas.microsoft.com/office/powerpoint/2010/main" val="2575881924"/>
+        <p14:creationId xmlns:p14="http://schemas.microsoft.com/office/powerpoint/2010/main" xmlns="" val="2575881924"/>
       </p:ext>
     </p:extLst>
   </p:cSld>
@@ -5219,7 +5255,7 @@
           <p:cNvPr id="5" name="Прямоугольник 4">
             <a:extLst>
               <a:ext uri="{FF2B5EF4-FFF2-40B4-BE49-F238E27FC236}">
-                <a16:creationId xmlns:a16="http://schemas.microsoft.com/office/drawing/2014/main" id="{80EF481F-15AF-4912-9334-5D004B11C5A6}"/>
+                <a16:creationId xmlns:a16="http://schemas.microsoft.com/office/drawing/2014/main" xmlns="" id="{80EF481F-15AF-4912-9334-5D004B11C5A6}"/>
               </a:ext>
             </a:extLst>
           </p:cNvPr>
@@ -5267,7 +5303,7 @@
           <p:cNvPr id="4" name="Рисунок 3">
             <a:extLst>
               <a:ext uri="{FF2B5EF4-FFF2-40B4-BE49-F238E27FC236}">
-                <a16:creationId xmlns:a16="http://schemas.microsoft.com/office/drawing/2014/main" id="{0FF5B377-A4C6-4A4B-B9D0-24C6F0D074C3}"/>
+                <a16:creationId xmlns:a16="http://schemas.microsoft.com/office/drawing/2014/main" xmlns="" id="{0FF5B377-A4C6-4A4B-B9D0-24C6F0D074C3}"/>
               </a:ext>
             </a:extLst>
           </p:cNvPr>
@@ -5295,7 +5331,7 @@
     </p:spTree>
     <p:extLst>
       <p:ext uri="{BB962C8B-B14F-4D97-AF65-F5344CB8AC3E}">
-        <p14:creationId xmlns:p14="http://schemas.microsoft.com/office/powerpoint/2010/main" val="1088476004"/>
+        <p14:creationId xmlns:p14="http://schemas.microsoft.com/office/powerpoint/2010/main" xmlns="" val="1088476004"/>
       </p:ext>
     </p:extLst>
   </p:cSld>
@@ -5356,7 +5392,7 @@
           <p:cNvPr id="5" name="Прямоугольник 4">
             <a:extLst>
               <a:ext uri="{FF2B5EF4-FFF2-40B4-BE49-F238E27FC236}">
-                <a16:creationId xmlns:a16="http://schemas.microsoft.com/office/drawing/2014/main" id="{80EF481F-15AF-4912-9334-5D004B11C5A6}"/>
+                <a16:creationId xmlns:a16="http://schemas.microsoft.com/office/drawing/2014/main" xmlns="" id="{80EF481F-15AF-4912-9334-5D004B11C5A6}"/>
               </a:ext>
             </a:extLst>
           </p:cNvPr>
@@ -5393,7 +5429,7 @@
           <p:cNvPr id="6" name="Рисунок 5">
             <a:extLst>
               <a:ext uri="{FF2B5EF4-FFF2-40B4-BE49-F238E27FC236}">
-                <a16:creationId xmlns:a16="http://schemas.microsoft.com/office/drawing/2014/main" id="{B7780BCF-622E-4042-86EC-FA88F6869854}"/>
+                <a16:creationId xmlns:a16="http://schemas.microsoft.com/office/drawing/2014/main" xmlns="" id="{B7780BCF-622E-4042-86EC-FA88F6869854}"/>
               </a:ext>
             </a:extLst>
           </p:cNvPr>
@@ -5421,7 +5457,7 @@
     </p:spTree>
     <p:extLst>
       <p:ext uri="{BB962C8B-B14F-4D97-AF65-F5344CB8AC3E}">
-        <p14:creationId xmlns:p14="http://schemas.microsoft.com/office/powerpoint/2010/main" val="242551311"/>
+        <p14:creationId xmlns:p14="http://schemas.microsoft.com/office/powerpoint/2010/main" xmlns="" val="242551311"/>
       </p:ext>
     </p:extLst>
   </p:cSld>
@@ -5482,7 +5518,7 @@
           <p:cNvPr id="5" name="Прямоугольник 4">
             <a:extLst>
               <a:ext uri="{FF2B5EF4-FFF2-40B4-BE49-F238E27FC236}">
-                <a16:creationId xmlns:a16="http://schemas.microsoft.com/office/drawing/2014/main" id="{80EF481F-15AF-4912-9334-5D004B11C5A6}"/>
+                <a16:creationId xmlns:a16="http://schemas.microsoft.com/office/drawing/2014/main" xmlns="" id="{80EF481F-15AF-4912-9334-5D004B11C5A6}"/>
               </a:ext>
             </a:extLst>
           </p:cNvPr>
@@ -5516,7 +5552,7 @@
           <p:cNvPr id="4" name="Рисунок 3">
             <a:extLst>
               <a:ext uri="{FF2B5EF4-FFF2-40B4-BE49-F238E27FC236}">
-                <a16:creationId xmlns:a16="http://schemas.microsoft.com/office/drawing/2014/main" id="{4D3EF7E8-D76E-4581-8C65-EEC0F57CCE7E}"/>
+                <a16:creationId xmlns:a16="http://schemas.microsoft.com/office/drawing/2014/main" xmlns="" id="{4D3EF7E8-D76E-4581-8C65-EEC0F57CCE7E}"/>
               </a:ext>
             </a:extLst>
           </p:cNvPr>
@@ -5544,7 +5580,7 @@
     </p:spTree>
     <p:extLst>
       <p:ext uri="{BB962C8B-B14F-4D97-AF65-F5344CB8AC3E}">
-        <p14:creationId xmlns:p14="http://schemas.microsoft.com/office/powerpoint/2010/main" val="2524594168"/>
+        <p14:creationId xmlns:p14="http://schemas.microsoft.com/office/powerpoint/2010/main" xmlns="" val="2524594168"/>
       </p:ext>
     </p:extLst>
   </p:cSld>
@@ -5574,7 +5610,7 @@
     </p:spTree>
     <p:extLst>
       <p:ext uri="{BB962C8B-B14F-4D97-AF65-F5344CB8AC3E}">
-        <p14:creationId xmlns:p14="http://schemas.microsoft.com/office/powerpoint/2010/main" val="2508446861"/>
+        <p14:creationId xmlns:p14="http://schemas.microsoft.com/office/powerpoint/2010/main" xmlns="" val="2508446861"/>
       </p:ext>
     </p:extLst>
   </p:cSld>
@@ -5635,7 +5671,7 @@
           <p:cNvPr id="4" name="Заголовок 1">
             <a:extLst>
               <a:ext uri="{FF2B5EF4-FFF2-40B4-BE49-F238E27FC236}">
-                <a16:creationId xmlns:a16="http://schemas.microsoft.com/office/drawing/2014/main" id="{67F36D55-042F-4E0F-B730-32C761BB4897}"/>
+                <a16:creationId xmlns:a16="http://schemas.microsoft.com/office/drawing/2014/main" xmlns="" id="{67F36D55-042F-4E0F-B730-32C761BB4897}"/>
               </a:ext>
             </a:extLst>
           </p:cNvPr>
@@ -5689,7 +5725,7 @@
     </p:spTree>
     <p:extLst>
       <p:ext uri="{BB962C8B-B14F-4D97-AF65-F5344CB8AC3E}">
-        <p14:creationId xmlns:p14="http://schemas.microsoft.com/office/powerpoint/2010/main" val="2792650188"/>
+        <p14:creationId xmlns:p14="http://schemas.microsoft.com/office/powerpoint/2010/main" xmlns="" val="2792650188"/>
       </p:ext>
     </p:extLst>
   </p:cSld>
@@ -5750,7 +5786,7 @@
           <p:cNvPr id="6" name="Прямоугольник 5">
             <a:extLst>
               <a:ext uri="{FF2B5EF4-FFF2-40B4-BE49-F238E27FC236}">
-                <a16:creationId xmlns:a16="http://schemas.microsoft.com/office/drawing/2014/main" id="{5351AF43-26C1-4938-B994-784CD1713893}"/>
+                <a16:creationId xmlns:a16="http://schemas.microsoft.com/office/drawing/2014/main" xmlns="" id="{5351AF43-26C1-4938-B994-784CD1713893}"/>
               </a:ext>
             </a:extLst>
           </p:cNvPr>
@@ -5782,7 +5818,7 @@
     </p:spTree>
     <p:extLst>
       <p:ext uri="{BB962C8B-B14F-4D97-AF65-F5344CB8AC3E}">
-        <p14:creationId xmlns:p14="http://schemas.microsoft.com/office/powerpoint/2010/main" val="327342563"/>
+        <p14:creationId xmlns:p14="http://schemas.microsoft.com/office/powerpoint/2010/main" xmlns="" val="327342563"/>
       </p:ext>
     </p:extLst>
   </p:cSld>
@@ -5875,7 +5911,7 @@
           <p:cNvPr id="8" name="TextBox 7">
             <a:extLst>
               <a:ext uri="{FF2B5EF4-FFF2-40B4-BE49-F238E27FC236}">
-                <a16:creationId xmlns:a16="http://schemas.microsoft.com/office/drawing/2014/main" id="{1E2A112A-6CFD-4660-9BF8-8DC33023E526}"/>
+                <a16:creationId xmlns:a16="http://schemas.microsoft.com/office/drawing/2014/main" xmlns="" id="{1E2A112A-6CFD-4660-9BF8-8DC33023E526}"/>
               </a:ext>
             </a:extLst>
           </p:cNvPr>
@@ -5916,7 +5952,7 @@
           <p:cNvPr id="4" name="TextBox 3">
             <a:extLst>
               <a:ext uri="{FF2B5EF4-FFF2-40B4-BE49-F238E27FC236}">
-                <a16:creationId xmlns:a16="http://schemas.microsoft.com/office/drawing/2014/main" id="{CC1C7DB5-602D-49BC-920E-9E1EA9462E63}"/>
+                <a16:creationId xmlns:a16="http://schemas.microsoft.com/office/drawing/2014/main" xmlns="" id="{CC1C7DB5-602D-49BC-920E-9E1EA9462E63}"/>
               </a:ext>
             </a:extLst>
           </p:cNvPr>
@@ -6199,7 +6235,7 @@
           <p:cNvPr id="6" name="Picture 2">
             <a:extLst>
               <a:ext uri="{FF2B5EF4-FFF2-40B4-BE49-F238E27FC236}">
-                <a16:creationId xmlns:a16="http://schemas.microsoft.com/office/drawing/2014/main" id="{6D025139-0404-4580-AAFB-A0FE5F5955D4}"/>
+                <a16:creationId xmlns:a16="http://schemas.microsoft.com/office/drawing/2014/main" xmlns="" id="{6D025139-0404-4580-AAFB-A0FE5F5955D4}"/>
               </a:ext>
             </a:extLst>
           </p:cNvPr>
@@ -6212,7 +6248,7 @@
           <a:blip r:embed="rId2">
             <a:extLst>
               <a:ext uri="{28A0092B-C50C-407E-A947-70E740481C1C}">
-                <a14:useLocalDpi xmlns:a14="http://schemas.microsoft.com/office/drawing/2010/main" val="0"/>
+                <a14:useLocalDpi xmlns:a14="http://schemas.microsoft.com/office/drawing/2010/main" xmlns="" val="0"/>
               </a:ext>
             </a:extLst>
           </a:blip>
@@ -6235,14 +6271,14 @@
           </a:ln>
           <a:extLst>
             <a:ext uri="{909E8E84-426E-40DD-AFC4-6F175D3DCCD1}">
-              <a14:hiddenFill xmlns:a14="http://schemas.microsoft.com/office/drawing/2010/main">
+              <a14:hiddenFill xmlns:a14="http://schemas.microsoft.com/office/drawing/2010/main" xmlns="">
                 <a:solidFill>
                   <a:schemeClr val="accent1"/>
                 </a:solidFill>
               </a14:hiddenFill>
             </a:ext>
             <a:ext uri="{91240B29-F687-4F45-9708-019B960494DF}">
-              <a14:hiddenLine xmlns:a14="http://schemas.microsoft.com/office/drawing/2010/main" w="9525">
+              <a14:hiddenLine xmlns:a14="http://schemas.microsoft.com/office/drawing/2010/main" xmlns="" w="9525">
                 <a:solidFill>
                   <a:schemeClr val="tx1"/>
                 </a:solidFill>
@@ -6259,7 +6295,7 @@
           <p:cNvPr id="5" name="Рисунок 4">
             <a:extLst>
               <a:ext uri="{FF2B5EF4-FFF2-40B4-BE49-F238E27FC236}">
-                <a16:creationId xmlns:a16="http://schemas.microsoft.com/office/drawing/2014/main" id="{9F9C289F-59C4-4F8D-9D53-31C6D1217551}"/>
+                <a16:creationId xmlns:a16="http://schemas.microsoft.com/office/drawing/2014/main" xmlns="" id="{9F9C289F-59C4-4F8D-9D53-31C6D1217551}"/>
               </a:ext>
             </a:extLst>
           </p:cNvPr>
@@ -6287,7 +6323,7 @@
     </p:spTree>
     <p:extLst>
       <p:ext uri="{BB962C8B-B14F-4D97-AF65-F5344CB8AC3E}">
-        <p14:creationId xmlns:p14="http://schemas.microsoft.com/office/powerpoint/2010/main" val="2464600963"/>
+        <p14:creationId xmlns:p14="http://schemas.microsoft.com/office/powerpoint/2010/main" xmlns="" val="2464600963"/>
       </p:ext>
     </p:extLst>
   </p:cSld>
@@ -6348,7 +6384,7 @@
           <p:cNvPr id="6" name="Прямоугольник 5">
             <a:extLst>
               <a:ext uri="{FF2B5EF4-FFF2-40B4-BE49-F238E27FC236}">
-                <a16:creationId xmlns:a16="http://schemas.microsoft.com/office/drawing/2014/main" id="{5351AF43-26C1-4938-B994-784CD1713893}"/>
+                <a16:creationId xmlns:a16="http://schemas.microsoft.com/office/drawing/2014/main" xmlns="" id="{5351AF43-26C1-4938-B994-784CD1713893}"/>
               </a:ext>
             </a:extLst>
           </p:cNvPr>
@@ -6383,7 +6419,7 @@
     </p:spTree>
     <p:extLst>
       <p:ext uri="{BB962C8B-B14F-4D97-AF65-F5344CB8AC3E}">
-        <p14:creationId xmlns:p14="http://schemas.microsoft.com/office/powerpoint/2010/main" val="1701578447"/>
+        <p14:creationId xmlns:p14="http://schemas.microsoft.com/office/powerpoint/2010/main" xmlns="" val="1701578447"/>
       </p:ext>
     </p:extLst>
   </p:cSld>
@@ -6478,7 +6514,7 @@
     </p:spTree>
     <p:extLst>
       <p:ext uri="{BB962C8B-B14F-4D97-AF65-F5344CB8AC3E}">
-        <p14:creationId xmlns:p14="http://schemas.microsoft.com/office/powerpoint/2010/main" val="3164489012"/>
+        <p14:creationId xmlns:p14="http://schemas.microsoft.com/office/powerpoint/2010/main" xmlns="" val="3164489012"/>
       </p:ext>
     </p:extLst>
   </p:cSld>
@@ -6573,7 +6609,7 @@
     </p:spTree>
     <p:extLst>
       <p:ext uri="{BB962C8B-B14F-4D97-AF65-F5344CB8AC3E}">
-        <p14:creationId xmlns:p14="http://schemas.microsoft.com/office/powerpoint/2010/main" val="581642216"/>
+        <p14:creationId xmlns:p14="http://schemas.microsoft.com/office/powerpoint/2010/main" xmlns="" val="581642216"/>
       </p:ext>
     </p:extLst>
   </p:cSld>
@@ -6837,8 +6873,8 @@
               <a:t>При нажатии клавиши </a:t>
             </a:r>
             <a:r>
-              <a:rPr lang="en-US" dirty="0"/>
-              <a:t>‘A’ </a:t>
+              <a:rPr lang="en-US" smtClean="0"/>
+              <a:t>‘G’ </a:t>
             </a:r>
             <a:r>
               <a:rPr lang="ru-RU" dirty="0"/>
@@ -6873,7 +6909,7 @@
     </p:spTree>
     <p:extLst>
       <p:ext uri="{BB962C8B-B14F-4D97-AF65-F5344CB8AC3E}">
-        <p14:creationId xmlns:p14="http://schemas.microsoft.com/office/powerpoint/2010/main" val="3571186749"/>
+        <p14:creationId xmlns:p14="http://schemas.microsoft.com/office/powerpoint/2010/main" xmlns="" val="3571186749"/>
       </p:ext>
     </p:extLst>
   </p:cSld>
@@ -6903,7 +6939,7 @@
     </p:spTree>
     <p:extLst>
       <p:ext uri="{BB962C8B-B14F-4D97-AF65-F5344CB8AC3E}">
-        <p14:creationId xmlns:p14="http://schemas.microsoft.com/office/powerpoint/2010/main" val="1177790608"/>
+        <p14:creationId xmlns:p14="http://schemas.microsoft.com/office/powerpoint/2010/main" xmlns="" val="1177790608"/>
       </p:ext>
     </p:extLst>
   </p:cSld>
@@ -6933,7 +6969,7 @@
     </p:spTree>
     <p:extLst>
       <p:ext uri="{BB962C8B-B14F-4D97-AF65-F5344CB8AC3E}">
-        <p14:creationId xmlns:p14="http://schemas.microsoft.com/office/powerpoint/2010/main" val="2005681683"/>
+        <p14:creationId xmlns:p14="http://schemas.microsoft.com/office/powerpoint/2010/main" xmlns="" val="2005681683"/>
       </p:ext>
     </p:extLst>
   </p:cSld>
@@ -6963,7 +6999,7 @@
     </p:spTree>
     <p:extLst>
       <p:ext uri="{BB962C8B-B14F-4D97-AF65-F5344CB8AC3E}">
-        <p14:creationId xmlns:p14="http://schemas.microsoft.com/office/powerpoint/2010/main" val="2715397700"/>
+        <p14:creationId xmlns:p14="http://schemas.microsoft.com/office/powerpoint/2010/main" xmlns="" val="2715397700"/>
       </p:ext>
     </p:extLst>
   </p:cSld>
@@ -7092,7 +7128,7 @@
     </p:spTree>
     <p:extLst>
       <p:ext uri="{BB962C8B-B14F-4D97-AF65-F5344CB8AC3E}">
-        <p14:creationId xmlns:p14="http://schemas.microsoft.com/office/powerpoint/2010/main" val="2825649107"/>
+        <p14:creationId xmlns:p14="http://schemas.microsoft.com/office/powerpoint/2010/main" xmlns="" val="2825649107"/>
       </p:ext>
     </p:extLst>
   </p:cSld>
@@ -7122,7 +7158,7 @@
     </p:spTree>
     <p:extLst>
       <p:ext uri="{BB962C8B-B14F-4D97-AF65-F5344CB8AC3E}">
-        <p14:creationId xmlns:p14="http://schemas.microsoft.com/office/powerpoint/2010/main" val="2491735131"/>
+        <p14:creationId xmlns:p14="http://schemas.microsoft.com/office/powerpoint/2010/main" xmlns="" val="2491735131"/>
       </p:ext>
     </p:extLst>
   </p:cSld>
@@ -7140,7 +7176,7 @@
         <p:cNvPr id="1" name="">
           <a:extLst>
             <a:ext uri="{FF2B5EF4-FFF2-40B4-BE49-F238E27FC236}">
-              <a16:creationId xmlns:a16="http://schemas.microsoft.com/office/drawing/2014/main" id="{5B5A758D-4E26-5CE4-FB2A-74F3F188FF2D}"/>
+              <a16:creationId xmlns:a16="http://schemas.microsoft.com/office/drawing/2014/main" xmlns="" id="{5B5A758D-4E26-5CE4-FB2A-74F3F188FF2D}"/>
             </a:ext>
           </a:extLst>
         </p:cNvPr>
@@ -7160,7 +7196,7 @@
           <p:cNvPr id="2" name="Заголовок 1">
             <a:extLst>
               <a:ext uri="{FF2B5EF4-FFF2-40B4-BE49-F238E27FC236}">
-                <a16:creationId xmlns:a16="http://schemas.microsoft.com/office/drawing/2014/main" id="{1027132E-34AC-B8CB-3B30-D0BA0EB6DF6B}"/>
+                <a16:creationId xmlns:a16="http://schemas.microsoft.com/office/drawing/2014/main" xmlns="" id="{1027132E-34AC-B8CB-3B30-D0BA0EB6DF6B}"/>
               </a:ext>
             </a:extLst>
           </p:cNvPr>
@@ -7195,7 +7231,7 @@
           <p:cNvPr id="4" name="Прямоугольник 3">
             <a:extLst>
               <a:ext uri="{FF2B5EF4-FFF2-40B4-BE49-F238E27FC236}">
-                <a16:creationId xmlns:a16="http://schemas.microsoft.com/office/drawing/2014/main" id="{838C8DBB-1EBF-8F57-FBAE-E46126479E77}"/>
+                <a16:creationId xmlns:a16="http://schemas.microsoft.com/office/drawing/2014/main" xmlns="" id="{838C8DBB-1EBF-8F57-FBAE-E46126479E77}"/>
               </a:ext>
             </a:extLst>
           </p:cNvPr>
@@ -7526,7 +7562,7 @@
     </p:spTree>
     <p:extLst>
       <p:ext uri="{BB962C8B-B14F-4D97-AF65-F5344CB8AC3E}">
-        <p14:creationId xmlns:p14="http://schemas.microsoft.com/office/powerpoint/2010/main" val="3744157899"/>
+        <p14:creationId xmlns:p14="http://schemas.microsoft.com/office/powerpoint/2010/main" xmlns="" val="3744157899"/>
       </p:ext>
     </p:extLst>
   </p:cSld>
@@ -7556,7 +7592,7 @@
     </p:spTree>
     <p:extLst>
       <p:ext uri="{BB962C8B-B14F-4D97-AF65-F5344CB8AC3E}">
-        <p14:creationId xmlns:p14="http://schemas.microsoft.com/office/powerpoint/2010/main" val="3706331615"/>
+        <p14:creationId xmlns:p14="http://schemas.microsoft.com/office/powerpoint/2010/main" xmlns="" val="3706331615"/>
       </p:ext>
     </p:extLst>
   </p:cSld>
@@ -7574,7 +7610,7 @@
         <p:cNvPr id="1" name="">
           <a:extLst>
             <a:ext uri="{FF2B5EF4-FFF2-40B4-BE49-F238E27FC236}">
-              <a16:creationId xmlns:a16="http://schemas.microsoft.com/office/drawing/2014/main" id="{5B5A758D-4E26-5CE4-FB2A-74F3F188FF2D}"/>
+              <a16:creationId xmlns:a16="http://schemas.microsoft.com/office/drawing/2014/main" xmlns="" id="{5B5A758D-4E26-5CE4-FB2A-74F3F188FF2D}"/>
             </a:ext>
           </a:extLst>
         </p:cNvPr>
@@ -7594,7 +7630,7 @@
           <p:cNvPr id="2" name="Заголовок 1">
             <a:extLst>
               <a:ext uri="{FF2B5EF4-FFF2-40B4-BE49-F238E27FC236}">
-                <a16:creationId xmlns:a16="http://schemas.microsoft.com/office/drawing/2014/main" id="{1027132E-34AC-B8CB-3B30-D0BA0EB6DF6B}"/>
+                <a16:creationId xmlns:a16="http://schemas.microsoft.com/office/drawing/2014/main" xmlns="" id="{1027132E-34AC-B8CB-3B30-D0BA0EB6DF6B}"/>
               </a:ext>
             </a:extLst>
           </p:cNvPr>
@@ -7634,7 +7670,7 @@
           <p:cNvPr id="4" name="Прямоугольник 3">
             <a:extLst>
               <a:ext uri="{FF2B5EF4-FFF2-40B4-BE49-F238E27FC236}">
-                <a16:creationId xmlns:a16="http://schemas.microsoft.com/office/drawing/2014/main" id="{838C8DBB-1EBF-8F57-FBAE-E46126479E77}"/>
+                <a16:creationId xmlns:a16="http://schemas.microsoft.com/office/drawing/2014/main" xmlns="" id="{838C8DBB-1EBF-8F57-FBAE-E46126479E77}"/>
               </a:ext>
             </a:extLst>
           </p:cNvPr>
@@ -7873,7 +7909,7 @@
     </p:spTree>
     <p:extLst>
       <p:ext uri="{BB962C8B-B14F-4D97-AF65-F5344CB8AC3E}">
-        <p14:creationId xmlns:p14="http://schemas.microsoft.com/office/powerpoint/2010/main" val="4106270815"/>
+        <p14:creationId xmlns:p14="http://schemas.microsoft.com/office/powerpoint/2010/main" xmlns="" val="4106270815"/>
       </p:ext>
     </p:extLst>
   </p:cSld>
@@ -7891,7 +7927,7 @@
         <p:cNvPr id="1" name="">
           <a:extLst>
             <a:ext uri="{FF2B5EF4-FFF2-40B4-BE49-F238E27FC236}">
-              <a16:creationId xmlns:a16="http://schemas.microsoft.com/office/drawing/2014/main" id="{5B5A758D-4E26-5CE4-FB2A-74F3F188FF2D}"/>
+              <a16:creationId xmlns:a16="http://schemas.microsoft.com/office/drawing/2014/main" xmlns="" id="{5B5A758D-4E26-5CE4-FB2A-74F3F188FF2D}"/>
             </a:ext>
           </a:extLst>
         </p:cNvPr>
@@ -7911,7 +7947,7 @@
           <p:cNvPr id="2" name="Заголовок 1">
             <a:extLst>
               <a:ext uri="{FF2B5EF4-FFF2-40B4-BE49-F238E27FC236}">
-                <a16:creationId xmlns:a16="http://schemas.microsoft.com/office/drawing/2014/main" id="{1027132E-34AC-B8CB-3B30-D0BA0EB6DF6B}"/>
+                <a16:creationId xmlns:a16="http://schemas.microsoft.com/office/drawing/2014/main" xmlns="" id="{1027132E-34AC-B8CB-3B30-D0BA0EB6DF6B}"/>
               </a:ext>
             </a:extLst>
           </p:cNvPr>
@@ -7947,7 +7983,7 @@
           <p:cNvPr id="4" name="Прямоугольник 3">
             <a:extLst>
               <a:ext uri="{FF2B5EF4-FFF2-40B4-BE49-F238E27FC236}">
-                <a16:creationId xmlns:a16="http://schemas.microsoft.com/office/drawing/2014/main" id="{838C8DBB-1EBF-8F57-FBAE-E46126479E77}"/>
+                <a16:creationId xmlns:a16="http://schemas.microsoft.com/office/drawing/2014/main" xmlns="" id="{838C8DBB-1EBF-8F57-FBAE-E46126479E77}"/>
               </a:ext>
             </a:extLst>
           </p:cNvPr>
@@ -8142,7 +8178,7 @@
     </p:spTree>
     <p:extLst>
       <p:ext uri="{BB962C8B-B14F-4D97-AF65-F5344CB8AC3E}">
-        <p14:creationId xmlns:p14="http://schemas.microsoft.com/office/powerpoint/2010/main" val="404339017"/>
+        <p14:creationId xmlns:p14="http://schemas.microsoft.com/office/powerpoint/2010/main" xmlns="" val="404339017"/>
       </p:ext>
     </p:extLst>
   </p:cSld>
@@ -8202,7 +8238,7 @@
     </p:spTree>
     <p:extLst>
       <p:ext uri="{BB962C8B-B14F-4D97-AF65-F5344CB8AC3E}">
-        <p14:creationId xmlns:p14="http://schemas.microsoft.com/office/powerpoint/2010/main" val="2244874636"/>
+        <p14:creationId xmlns:p14="http://schemas.microsoft.com/office/powerpoint/2010/main" xmlns="" val="2244874636"/>
       </p:ext>
     </p:extLst>
   </p:cSld>
@@ -8276,7 +8312,7 @@
           <p:cNvPr id="8" name="TextBox 7">
             <a:extLst>
               <a:ext uri="{FF2B5EF4-FFF2-40B4-BE49-F238E27FC236}">
-                <a16:creationId xmlns:a16="http://schemas.microsoft.com/office/drawing/2014/main" id="{1E2A112A-6CFD-4660-9BF8-8DC33023E526}"/>
+                <a16:creationId xmlns:a16="http://schemas.microsoft.com/office/drawing/2014/main" xmlns="" id="{1E2A112A-6CFD-4660-9BF8-8DC33023E526}"/>
               </a:ext>
             </a:extLst>
           </p:cNvPr>
@@ -8317,7 +8353,7 @@
           <p:cNvPr id="4" name="TextBox 3">
             <a:extLst>
               <a:ext uri="{FF2B5EF4-FFF2-40B4-BE49-F238E27FC236}">
-                <a16:creationId xmlns:a16="http://schemas.microsoft.com/office/drawing/2014/main" id="{CC1C7DB5-602D-49BC-920E-9E1EA9462E63}"/>
+                <a16:creationId xmlns:a16="http://schemas.microsoft.com/office/drawing/2014/main" xmlns="" id="{CC1C7DB5-602D-49BC-920E-9E1EA9462E63}"/>
               </a:ext>
             </a:extLst>
           </p:cNvPr>
@@ -8785,7 +8821,7 @@
           <p:cNvPr id="5" name="Рисунок 4">
             <a:extLst>
               <a:ext uri="{FF2B5EF4-FFF2-40B4-BE49-F238E27FC236}">
-                <a16:creationId xmlns:a16="http://schemas.microsoft.com/office/drawing/2014/main" id="{8A3756B0-D529-45F5-BDC3-A0EDBA72D152}"/>
+                <a16:creationId xmlns:a16="http://schemas.microsoft.com/office/drawing/2014/main" xmlns="" id="{8A3756B0-D529-45F5-BDC3-A0EDBA72D152}"/>
               </a:ext>
             </a:extLst>
           </p:cNvPr>
@@ -8813,7 +8849,7 @@
     </p:spTree>
     <p:extLst>
       <p:ext uri="{BB962C8B-B14F-4D97-AF65-F5344CB8AC3E}">
-        <p14:creationId xmlns:p14="http://schemas.microsoft.com/office/powerpoint/2010/main" val="1657178361"/>
+        <p14:creationId xmlns:p14="http://schemas.microsoft.com/office/powerpoint/2010/main" xmlns="" val="1657178361"/>
       </p:ext>
     </p:extLst>
   </p:cSld>
@@ -8887,7 +8923,7 @@
           <p:cNvPr id="8" name="TextBox 7">
             <a:extLst>
               <a:ext uri="{FF2B5EF4-FFF2-40B4-BE49-F238E27FC236}">
-                <a16:creationId xmlns:a16="http://schemas.microsoft.com/office/drawing/2014/main" id="{1E2A112A-6CFD-4660-9BF8-8DC33023E526}"/>
+                <a16:creationId xmlns:a16="http://schemas.microsoft.com/office/drawing/2014/main" xmlns="" id="{1E2A112A-6CFD-4660-9BF8-8DC33023E526}"/>
               </a:ext>
             </a:extLst>
           </p:cNvPr>
@@ -8928,7 +8964,7 @@
           <p:cNvPr id="4" name="TextBox 3">
             <a:extLst>
               <a:ext uri="{FF2B5EF4-FFF2-40B4-BE49-F238E27FC236}">
-                <a16:creationId xmlns:a16="http://schemas.microsoft.com/office/drawing/2014/main" id="{CC1C7DB5-602D-49BC-920E-9E1EA9462E63}"/>
+                <a16:creationId xmlns:a16="http://schemas.microsoft.com/office/drawing/2014/main" xmlns="" id="{CC1C7DB5-602D-49BC-920E-9E1EA9462E63}"/>
               </a:ext>
             </a:extLst>
           </p:cNvPr>
@@ -9396,7 +9432,7 @@
           <p:cNvPr id="5" name="Рисунок 4">
             <a:extLst>
               <a:ext uri="{FF2B5EF4-FFF2-40B4-BE49-F238E27FC236}">
-                <a16:creationId xmlns:a16="http://schemas.microsoft.com/office/drawing/2014/main" id="{8A3756B0-D529-45F5-BDC3-A0EDBA72D152}"/>
+                <a16:creationId xmlns:a16="http://schemas.microsoft.com/office/drawing/2014/main" xmlns="" id="{8A3756B0-D529-45F5-BDC3-A0EDBA72D152}"/>
               </a:ext>
             </a:extLst>
           </p:cNvPr>
@@ -9426,7 +9462,7 @@
           <p:cNvPr id="6" name="Рисунок 5">
             <a:extLst>
               <a:ext uri="{FF2B5EF4-FFF2-40B4-BE49-F238E27FC236}">
-                <a16:creationId xmlns:a16="http://schemas.microsoft.com/office/drawing/2014/main" id="{149251EB-BDB4-4F73-BD7F-6E2D406BB5D6}"/>
+                <a16:creationId xmlns:a16="http://schemas.microsoft.com/office/drawing/2014/main" xmlns="" id="{149251EB-BDB4-4F73-BD7F-6E2D406BB5D6}"/>
               </a:ext>
             </a:extLst>
           </p:cNvPr>
@@ -9456,7 +9492,7 @@
           <p:cNvPr id="9" name="Рисунок 8">
             <a:extLst>
               <a:ext uri="{FF2B5EF4-FFF2-40B4-BE49-F238E27FC236}">
-                <a16:creationId xmlns:a16="http://schemas.microsoft.com/office/drawing/2014/main" id="{141485B8-701F-4B82-AC32-1404F417DDA9}"/>
+                <a16:creationId xmlns:a16="http://schemas.microsoft.com/office/drawing/2014/main" xmlns="" id="{141485B8-701F-4B82-AC32-1404F417DDA9}"/>
               </a:ext>
             </a:extLst>
           </p:cNvPr>
@@ -9484,7 +9520,7 @@
     </p:spTree>
     <p:extLst>
       <p:ext uri="{BB962C8B-B14F-4D97-AF65-F5344CB8AC3E}">
-        <p14:creationId xmlns:p14="http://schemas.microsoft.com/office/powerpoint/2010/main" val="2876693822"/>
+        <p14:creationId xmlns:p14="http://schemas.microsoft.com/office/powerpoint/2010/main" xmlns="" val="2876693822"/>
       </p:ext>
     </p:extLst>
   </p:cSld>
@@ -9558,7 +9594,7 @@
           <p:cNvPr id="8" name="TextBox 7">
             <a:extLst>
               <a:ext uri="{FF2B5EF4-FFF2-40B4-BE49-F238E27FC236}">
-                <a16:creationId xmlns:a16="http://schemas.microsoft.com/office/drawing/2014/main" id="{1E2A112A-6CFD-4660-9BF8-8DC33023E526}"/>
+                <a16:creationId xmlns:a16="http://schemas.microsoft.com/office/drawing/2014/main" xmlns="" id="{1E2A112A-6CFD-4660-9BF8-8DC33023E526}"/>
               </a:ext>
             </a:extLst>
           </p:cNvPr>
@@ -9599,7 +9635,7 @@
           <p:cNvPr id="4" name="TextBox 3">
             <a:extLst>
               <a:ext uri="{FF2B5EF4-FFF2-40B4-BE49-F238E27FC236}">
-                <a16:creationId xmlns:a16="http://schemas.microsoft.com/office/drawing/2014/main" id="{CC1C7DB5-602D-49BC-920E-9E1EA9462E63}"/>
+                <a16:creationId xmlns:a16="http://schemas.microsoft.com/office/drawing/2014/main" xmlns="" id="{CC1C7DB5-602D-49BC-920E-9E1EA9462E63}"/>
               </a:ext>
             </a:extLst>
           </p:cNvPr>
@@ -9766,7 +9802,7 @@
           <p:cNvPr id="6" name="Рисунок 5">
             <a:extLst>
               <a:ext uri="{FF2B5EF4-FFF2-40B4-BE49-F238E27FC236}">
-                <a16:creationId xmlns:a16="http://schemas.microsoft.com/office/drawing/2014/main" id="{149251EB-BDB4-4F73-BD7F-6E2D406BB5D6}"/>
+                <a16:creationId xmlns:a16="http://schemas.microsoft.com/office/drawing/2014/main" xmlns="" id="{149251EB-BDB4-4F73-BD7F-6E2D406BB5D6}"/>
               </a:ext>
             </a:extLst>
           </p:cNvPr>
@@ -9796,7 +9832,7 @@
           <p:cNvPr id="9" name="Рисунок 8">
             <a:extLst>
               <a:ext uri="{FF2B5EF4-FFF2-40B4-BE49-F238E27FC236}">
-                <a16:creationId xmlns:a16="http://schemas.microsoft.com/office/drawing/2014/main" id="{141485B8-701F-4B82-AC32-1404F417DDA9}"/>
+                <a16:creationId xmlns:a16="http://schemas.microsoft.com/office/drawing/2014/main" xmlns="" id="{141485B8-701F-4B82-AC32-1404F417DDA9}"/>
               </a:ext>
             </a:extLst>
           </p:cNvPr>
@@ -9824,7 +9860,7 @@
     </p:spTree>
     <p:extLst>
       <p:ext uri="{BB962C8B-B14F-4D97-AF65-F5344CB8AC3E}">
-        <p14:creationId xmlns:p14="http://schemas.microsoft.com/office/powerpoint/2010/main" val="2173509073"/>
+        <p14:creationId xmlns:p14="http://schemas.microsoft.com/office/powerpoint/2010/main" xmlns="" val="2173509073"/>
       </p:ext>
     </p:extLst>
   </p:cSld>
@@ -9898,7 +9934,7 @@
           <p:cNvPr id="8" name="TextBox 7">
             <a:extLst>
               <a:ext uri="{FF2B5EF4-FFF2-40B4-BE49-F238E27FC236}">
-                <a16:creationId xmlns:a16="http://schemas.microsoft.com/office/drawing/2014/main" id="{1E2A112A-6CFD-4660-9BF8-8DC33023E526}"/>
+                <a16:creationId xmlns:a16="http://schemas.microsoft.com/office/drawing/2014/main" xmlns="" id="{1E2A112A-6CFD-4660-9BF8-8DC33023E526}"/>
               </a:ext>
             </a:extLst>
           </p:cNvPr>
@@ -9939,7 +9975,7 @@
           <p:cNvPr id="4" name="TextBox 3">
             <a:extLst>
               <a:ext uri="{FF2B5EF4-FFF2-40B4-BE49-F238E27FC236}">
-                <a16:creationId xmlns:a16="http://schemas.microsoft.com/office/drawing/2014/main" id="{CC1C7DB5-602D-49BC-920E-9E1EA9462E63}"/>
+                <a16:creationId xmlns:a16="http://schemas.microsoft.com/office/drawing/2014/main" xmlns="" id="{CC1C7DB5-602D-49BC-920E-9E1EA9462E63}"/>
               </a:ext>
             </a:extLst>
           </p:cNvPr>
@@ -10875,7 +10911,7 @@
           <p:cNvPr id="9" name="Рисунок 8">
             <a:extLst>
               <a:ext uri="{FF2B5EF4-FFF2-40B4-BE49-F238E27FC236}">
-                <a16:creationId xmlns:a16="http://schemas.microsoft.com/office/drawing/2014/main" id="{904640EA-9456-4480-A81F-128C7D46E709}"/>
+                <a16:creationId xmlns:a16="http://schemas.microsoft.com/office/drawing/2014/main" xmlns="" id="{904640EA-9456-4480-A81F-128C7D46E709}"/>
               </a:ext>
             </a:extLst>
           </p:cNvPr>
@@ -10903,7 +10939,7 @@
     </p:spTree>
     <p:extLst>
       <p:ext uri="{BB962C8B-B14F-4D97-AF65-F5344CB8AC3E}">
-        <p14:creationId xmlns:p14="http://schemas.microsoft.com/office/powerpoint/2010/main" val="1682719821"/>
+        <p14:creationId xmlns:p14="http://schemas.microsoft.com/office/powerpoint/2010/main" xmlns="" val="1682719821"/>
       </p:ext>
     </p:extLst>
   </p:cSld>
@@ -10977,7 +11013,7 @@
           <p:cNvPr id="8" name="TextBox 7">
             <a:extLst>
               <a:ext uri="{FF2B5EF4-FFF2-40B4-BE49-F238E27FC236}">
-                <a16:creationId xmlns:a16="http://schemas.microsoft.com/office/drawing/2014/main" id="{1E2A112A-6CFD-4660-9BF8-8DC33023E526}"/>
+                <a16:creationId xmlns:a16="http://schemas.microsoft.com/office/drawing/2014/main" xmlns="" id="{1E2A112A-6CFD-4660-9BF8-8DC33023E526}"/>
               </a:ext>
             </a:extLst>
           </p:cNvPr>
@@ -11018,7 +11054,7 @@
           <p:cNvPr id="4" name="TextBox 3">
             <a:extLst>
               <a:ext uri="{FF2B5EF4-FFF2-40B4-BE49-F238E27FC236}">
-                <a16:creationId xmlns:a16="http://schemas.microsoft.com/office/drawing/2014/main" id="{CC1C7DB5-602D-49BC-920E-9E1EA9462E63}"/>
+                <a16:creationId xmlns:a16="http://schemas.microsoft.com/office/drawing/2014/main" xmlns="" id="{CC1C7DB5-602D-49BC-920E-9E1EA9462E63}"/>
               </a:ext>
             </a:extLst>
           </p:cNvPr>
@@ -11990,7 +12026,7 @@
           <p:cNvPr id="5" name="Рисунок 4">
             <a:extLst>
               <a:ext uri="{FF2B5EF4-FFF2-40B4-BE49-F238E27FC236}">
-                <a16:creationId xmlns:a16="http://schemas.microsoft.com/office/drawing/2014/main" id="{32ECA65E-A781-440F-A5A2-13893F4BC9C9}"/>
+                <a16:creationId xmlns:a16="http://schemas.microsoft.com/office/drawing/2014/main" xmlns="" id="{32ECA65E-A781-440F-A5A2-13893F4BC9C9}"/>
               </a:ext>
             </a:extLst>
           </p:cNvPr>
@@ -12018,7 +12054,7 @@
     </p:spTree>
     <p:extLst>
       <p:ext uri="{BB962C8B-B14F-4D97-AF65-F5344CB8AC3E}">
-        <p14:creationId xmlns:p14="http://schemas.microsoft.com/office/powerpoint/2010/main" val="1457091059"/>
+        <p14:creationId xmlns:p14="http://schemas.microsoft.com/office/powerpoint/2010/main" xmlns="" val="1457091059"/>
       </p:ext>
     </p:extLst>
   </p:cSld>
@@ -12092,7 +12128,7 @@
           <p:cNvPr id="8" name="TextBox 7">
             <a:extLst>
               <a:ext uri="{FF2B5EF4-FFF2-40B4-BE49-F238E27FC236}">
-                <a16:creationId xmlns:a16="http://schemas.microsoft.com/office/drawing/2014/main" id="{1E2A112A-6CFD-4660-9BF8-8DC33023E526}"/>
+                <a16:creationId xmlns:a16="http://schemas.microsoft.com/office/drawing/2014/main" xmlns="" id="{1E2A112A-6CFD-4660-9BF8-8DC33023E526}"/>
               </a:ext>
             </a:extLst>
           </p:cNvPr>
@@ -12133,7 +12169,7 @@
           <p:cNvPr id="4" name="TextBox 3">
             <a:extLst>
               <a:ext uri="{FF2B5EF4-FFF2-40B4-BE49-F238E27FC236}">
-                <a16:creationId xmlns:a16="http://schemas.microsoft.com/office/drawing/2014/main" id="{CC1C7DB5-602D-49BC-920E-9E1EA9462E63}"/>
+                <a16:creationId xmlns:a16="http://schemas.microsoft.com/office/drawing/2014/main" xmlns="" id="{CC1C7DB5-602D-49BC-920E-9E1EA9462E63}"/>
               </a:ext>
             </a:extLst>
           </p:cNvPr>
@@ -13249,7 +13285,7 @@
           <p:cNvPr id="6" name="Рисунок 5">
             <a:extLst>
               <a:ext uri="{FF2B5EF4-FFF2-40B4-BE49-F238E27FC236}">
-                <a16:creationId xmlns:a16="http://schemas.microsoft.com/office/drawing/2014/main" id="{675F9E68-B82A-4E0C-8B40-35B5A937717D}"/>
+                <a16:creationId xmlns:a16="http://schemas.microsoft.com/office/drawing/2014/main" xmlns="" id="{675F9E68-B82A-4E0C-8B40-35B5A937717D}"/>
               </a:ext>
             </a:extLst>
           </p:cNvPr>
@@ -13277,7 +13313,7 @@
     </p:spTree>
     <p:extLst>
       <p:ext uri="{BB962C8B-B14F-4D97-AF65-F5344CB8AC3E}">
-        <p14:creationId xmlns:p14="http://schemas.microsoft.com/office/powerpoint/2010/main" val="3511696259"/>
+        <p14:creationId xmlns:p14="http://schemas.microsoft.com/office/powerpoint/2010/main" xmlns="" val="3511696259"/>
       </p:ext>
     </p:extLst>
   </p:cSld>
@@ -13307,7 +13343,7 @@
     </p:spTree>
     <p:extLst>
       <p:ext uri="{BB962C8B-B14F-4D97-AF65-F5344CB8AC3E}">
-        <p14:creationId xmlns:p14="http://schemas.microsoft.com/office/powerpoint/2010/main" val="1564282189"/>
+        <p14:creationId xmlns:p14="http://schemas.microsoft.com/office/powerpoint/2010/main" xmlns="" val="1564282189"/>
       </p:ext>
     </p:extLst>
   </p:cSld>
@@ -13381,7 +13417,7 @@
           <p:cNvPr id="8" name="TextBox 7">
             <a:extLst>
               <a:ext uri="{FF2B5EF4-FFF2-40B4-BE49-F238E27FC236}">
-                <a16:creationId xmlns:a16="http://schemas.microsoft.com/office/drawing/2014/main" id="{1E2A112A-6CFD-4660-9BF8-8DC33023E526}"/>
+                <a16:creationId xmlns:a16="http://schemas.microsoft.com/office/drawing/2014/main" xmlns="" id="{1E2A112A-6CFD-4660-9BF8-8DC33023E526}"/>
               </a:ext>
             </a:extLst>
           </p:cNvPr>
@@ -13422,7 +13458,7 @@
           <p:cNvPr id="4" name="TextBox 3">
             <a:extLst>
               <a:ext uri="{FF2B5EF4-FFF2-40B4-BE49-F238E27FC236}">
-                <a16:creationId xmlns:a16="http://schemas.microsoft.com/office/drawing/2014/main" id="{CC1C7DB5-602D-49BC-920E-9E1EA9462E63}"/>
+                <a16:creationId xmlns:a16="http://schemas.microsoft.com/office/drawing/2014/main" xmlns="" id="{CC1C7DB5-602D-49BC-920E-9E1EA9462E63}"/>
               </a:ext>
             </a:extLst>
           </p:cNvPr>
@@ -14538,7 +14574,7 @@
           <p:cNvPr id="9" name="Рисунок 8">
             <a:extLst>
               <a:ext uri="{FF2B5EF4-FFF2-40B4-BE49-F238E27FC236}">
-                <a16:creationId xmlns:a16="http://schemas.microsoft.com/office/drawing/2014/main" id="{028C0410-3ED4-47B6-9939-DDE2656C65AF}"/>
+                <a16:creationId xmlns:a16="http://schemas.microsoft.com/office/drawing/2014/main" xmlns="" id="{028C0410-3ED4-47B6-9939-DDE2656C65AF}"/>
               </a:ext>
             </a:extLst>
           </p:cNvPr>
@@ -14566,7 +14602,7 @@
     </p:spTree>
     <p:extLst>
       <p:ext uri="{BB962C8B-B14F-4D97-AF65-F5344CB8AC3E}">
-        <p14:creationId xmlns:p14="http://schemas.microsoft.com/office/powerpoint/2010/main" val="646866044"/>
+        <p14:creationId xmlns:p14="http://schemas.microsoft.com/office/powerpoint/2010/main" xmlns="" val="646866044"/>
       </p:ext>
     </p:extLst>
   </p:cSld>
@@ -14596,7 +14632,7 @@
     </p:spTree>
     <p:extLst>
       <p:ext uri="{BB962C8B-B14F-4D97-AF65-F5344CB8AC3E}">
-        <p14:creationId xmlns:p14="http://schemas.microsoft.com/office/powerpoint/2010/main" val="2720942633"/>
+        <p14:creationId xmlns:p14="http://schemas.microsoft.com/office/powerpoint/2010/main" xmlns="" val="2720942633"/>
       </p:ext>
     </p:extLst>
   </p:cSld>
@@ -14662,7 +14698,7 @@
     </p:spTree>
     <p:extLst>
       <p:ext uri="{BB962C8B-B14F-4D97-AF65-F5344CB8AC3E}">
-        <p14:creationId xmlns:p14="http://schemas.microsoft.com/office/powerpoint/2010/main" val="3099207537"/>
+        <p14:creationId xmlns:p14="http://schemas.microsoft.com/office/powerpoint/2010/main" xmlns="" val="3099207537"/>
       </p:ext>
     </p:extLst>
   </p:cSld>
@@ -14723,7 +14759,7 @@
           <p:cNvPr id="8" name="TextBox 7">
             <a:extLst>
               <a:ext uri="{FF2B5EF4-FFF2-40B4-BE49-F238E27FC236}">
-                <a16:creationId xmlns:a16="http://schemas.microsoft.com/office/drawing/2014/main" id="{1E2A112A-6CFD-4660-9BF8-8DC33023E526}"/>
+                <a16:creationId xmlns:a16="http://schemas.microsoft.com/office/drawing/2014/main" xmlns="" id="{1E2A112A-6CFD-4660-9BF8-8DC33023E526}"/>
               </a:ext>
             </a:extLst>
           </p:cNvPr>
@@ -14764,7 +14800,7 @@
           <p:cNvPr id="4" name="TextBox 3">
             <a:extLst>
               <a:ext uri="{FF2B5EF4-FFF2-40B4-BE49-F238E27FC236}">
-                <a16:creationId xmlns:a16="http://schemas.microsoft.com/office/drawing/2014/main" id="{CC1C7DB5-602D-49BC-920E-9E1EA9462E63}"/>
+                <a16:creationId xmlns:a16="http://schemas.microsoft.com/office/drawing/2014/main" xmlns="" id="{CC1C7DB5-602D-49BC-920E-9E1EA9462E63}"/>
               </a:ext>
             </a:extLst>
           </p:cNvPr>
@@ -15601,7 +15637,7 @@
           <p:cNvPr id="5" name="Рисунок 4">
             <a:extLst>
               <a:ext uri="{FF2B5EF4-FFF2-40B4-BE49-F238E27FC236}">
-                <a16:creationId xmlns:a16="http://schemas.microsoft.com/office/drawing/2014/main" id="{9E0AC158-888F-4847-8A74-8BC461E5F847}"/>
+                <a16:creationId xmlns:a16="http://schemas.microsoft.com/office/drawing/2014/main" xmlns="" id="{9E0AC158-888F-4847-8A74-8BC461E5F847}"/>
               </a:ext>
             </a:extLst>
           </p:cNvPr>
@@ -15631,7 +15667,7 @@
           <p:cNvPr id="6" name="Рисунок 5">
             <a:extLst>
               <a:ext uri="{FF2B5EF4-FFF2-40B4-BE49-F238E27FC236}">
-                <a16:creationId xmlns:a16="http://schemas.microsoft.com/office/drawing/2014/main" id="{4EB5B05E-1E34-4AD4-8828-A8A998F99CD7}"/>
+                <a16:creationId xmlns:a16="http://schemas.microsoft.com/office/drawing/2014/main" xmlns="" id="{4EB5B05E-1E34-4AD4-8828-A8A998F99CD7}"/>
               </a:ext>
             </a:extLst>
           </p:cNvPr>
@@ -15659,7 +15695,7 @@
     </p:spTree>
     <p:extLst>
       <p:ext uri="{BB962C8B-B14F-4D97-AF65-F5344CB8AC3E}">
-        <p14:creationId xmlns:p14="http://schemas.microsoft.com/office/powerpoint/2010/main" val="4293040968"/>
+        <p14:creationId xmlns:p14="http://schemas.microsoft.com/office/powerpoint/2010/main" xmlns="" val="4293040968"/>
       </p:ext>
     </p:extLst>
   </p:cSld>
@@ -15729,7 +15765,7 @@
           <p:cNvPr id="8" name="TextBox 7">
             <a:extLst>
               <a:ext uri="{FF2B5EF4-FFF2-40B4-BE49-F238E27FC236}">
-                <a16:creationId xmlns:a16="http://schemas.microsoft.com/office/drawing/2014/main" id="{1E2A112A-6CFD-4660-9BF8-8DC33023E526}"/>
+                <a16:creationId xmlns:a16="http://schemas.microsoft.com/office/drawing/2014/main" xmlns="" id="{1E2A112A-6CFD-4660-9BF8-8DC33023E526}"/>
               </a:ext>
             </a:extLst>
           </p:cNvPr>
@@ -15770,7 +15806,7 @@
           <p:cNvPr id="4" name="TextBox 3">
             <a:extLst>
               <a:ext uri="{FF2B5EF4-FFF2-40B4-BE49-F238E27FC236}">
-                <a16:creationId xmlns:a16="http://schemas.microsoft.com/office/drawing/2014/main" id="{CC1C7DB5-602D-49BC-920E-9E1EA9462E63}"/>
+                <a16:creationId xmlns:a16="http://schemas.microsoft.com/office/drawing/2014/main" xmlns="" id="{CC1C7DB5-602D-49BC-920E-9E1EA9462E63}"/>
               </a:ext>
             </a:extLst>
           </p:cNvPr>
@@ -16219,7 +16255,7 @@
           <p:cNvPr id="5" name="Рисунок 4">
             <a:extLst>
               <a:ext uri="{FF2B5EF4-FFF2-40B4-BE49-F238E27FC236}">
-                <a16:creationId xmlns:a16="http://schemas.microsoft.com/office/drawing/2014/main" id="{FD0A9618-0DEE-45C1-9ABC-5BA5F5579015}"/>
+                <a16:creationId xmlns:a16="http://schemas.microsoft.com/office/drawing/2014/main" xmlns="" id="{FD0A9618-0DEE-45C1-9ABC-5BA5F5579015}"/>
               </a:ext>
             </a:extLst>
           </p:cNvPr>
@@ -16247,7 +16283,7 @@
     </p:spTree>
     <p:extLst>
       <p:ext uri="{BB962C8B-B14F-4D97-AF65-F5344CB8AC3E}">
-        <p14:creationId xmlns:p14="http://schemas.microsoft.com/office/powerpoint/2010/main" val="2427921285"/>
+        <p14:creationId xmlns:p14="http://schemas.microsoft.com/office/powerpoint/2010/main" xmlns="" val="2427921285"/>
       </p:ext>
     </p:extLst>
   </p:cSld>
@@ -16313,7 +16349,7 @@
           <p:cNvPr id="8" name="TextBox 7">
             <a:extLst>
               <a:ext uri="{FF2B5EF4-FFF2-40B4-BE49-F238E27FC236}">
-                <a16:creationId xmlns:a16="http://schemas.microsoft.com/office/drawing/2014/main" id="{1E2A112A-6CFD-4660-9BF8-8DC33023E526}"/>
+                <a16:creationId xmlns:a16="http://schemas.microsoft.com/office/drawing/2014/main" xmlns="" id="{1E2A112A-6CFD-4660-9BF8-8DC33023E526}"/>
               </a:ext>
             </a:extLst>
           </p:cNvPr>
@@ -16354,7 +16390,7 @@
           <p:cNvPr id="4" name="TextBox 3">
             <a:extLst>
               <a:ext uri="{FF2B5EF4-FFF2-40B4-BE49-F238E27FC236}">
-                <a16:creationId xmlns:a16="http://schemas.microsoft.com/office/drawing/2014/main" id="{CC1C7DB5-602D-49BC-920E-9E1EA9462E63}"/>
+                <a16:creationId xmlns:a16="http://schemas.microsoft.com/office/drawing/2014/main" xmlns="" id="{CC1C7DB5-602D-49BC-920E-9E1EA9462E63}"/>
               </a:ext>
             </a:extLst>
           </p:cNvPr>
@@ -16872,7 +16908,7 @@
           <p:cNvPr id="5" name="Рисунок 4">
             <a:extLst>
               <a:ext uri="{FF2B5EF4-FFF2-40B4-BE49-F238E27FC236}">
-                <a16:creationId xmlns:a16="http://schemas.microsoft.com/office/drawing/2014/main" id="{9D454082-7D88-4C35-9410-68DD5EE3CB3F}"/>
+                <a16:creationId xmlns:a16="http://schemas.microsoft.com/office/drawing/2014/main" xmlns="" id="{9D454082-7D88-4C35-9410-68DD5EE3CB3F}"/>
               </a:ext>
             </a:extLst>
           </p:cNvPr>
@@ -16900,7 +16936,7 @@
     </p:spTree>
     <p:extLst>
       <p:ext uri="{BB962C8B-B14F-4D97-AF65-F5344CB8AC3E}">
-        <p14:creationId xmlns:p14="http://schemas.microsoft.com/office/powerpoint/2010/main" val="2586602031"/>
+        <p14:creationId xmlns:p14="http://schemas.microsoft.com/office/powerpoint/2010/main" xmlns="" val="2586602031"/>
       </p:ext>
     </p:extLst>
   </p:cSld>
@@ -16961,7 +16997,7 @@
           <p:cNvPr id="8" name="TextBox 7">
             <a:extLst>
               <a:ext uri="{FF2B5EF4-FFF2-40B4-BE49-F238E27FC236}">
-                <a16:creationId xmlns:a16="http://schemas.microsoft.com/office/drawing/2014/main" id="{1E2A112A-6CFD-4660-9BF8-8DC33023E526}"/>
+                <a16:creationId xmlns:a16="http://schemas.microsoft.com/office/drawing/2014/main" xmlns="" id="{1E2A112A-6CFD-4660-9BF8-8DC33023E526}"/>
               </a:ext>
             </a:extLst>
           </p:cNvPr>
@@ -17002,7 +17038,7 @@
           <p:cNvPr id="4" name="TextBox 3">
             <a:extLst>
               <a:ext uri="{FF2B5EF4-FFF2-40B4-BE49-F238E27FC236}">
-                <a16:creationId xmlns:a16="http://schemas.microsoft.com/office/drawing/2014/main" id="{CC1C7DB5-602D-49BC-920E-9E1EA9462E63}"/>
+                <a16:creationId xmlns:a16="http://schemas.microsoft.com/office/drawing/2014/main" xmlns="" id="{CC1C7DB5-602D-49BC-920E-9E1EA9462E63}"/>
               </a:ext>
             </a:extLst>
           </p:cNvPr>
@@ -17481,7 +17517,7 @@
           <p:cNvPr id="5" name="Рисунок 4">
             <a:extLst>
               <a:ext uri="{FF2B5EF4-FFF2-40B4-BE49-F238E27FC236}">
-                <a16:creationId xmlns:a16="http://schemas.microsoft.com/office/drawing/2014/main" id="{1CE8256C-B8AA-4874-8804-6FCA538F719F}"/>
+                <a16:creationId xmlns:a16="http://schemas.microsoft.com/office/drawing/2014/main" xmlns="" id="{1CE8256C-B8AA-4874-8804-6FCA538F719F}"/>
               </a:ext>
             </a:extLst>
           </p:cNvPr>
@@ -17509,7 +17545,7 @@
     </p:spTree>
     <p:extLst>
       <p:ext uri="{BB962C8B-B14F-4D97-AF65-F5344CB8AC3E}">
-        <p14:creationId xmlns:p14="http://schemas.microsoft.com/office/powerpoint/2010/main" val="1958100610"/>
+        <p14:creationId xmlns:p14="http://schemas.microsoft.com/office/powerpoint/2010/main" xmlns="" val="1958100610"/>
       </p:ext>
     </p:extLst>
   </p:cSld>
@@ -17570,7 +17606,7 @@
           <p:cNvPr id="8" name="TextBox 7">
             <a:extLst>
               <a:ext uri="{FF2B5EF4-FFF2-40B4-BE49-F238E27FC236}">
-                <a16:creationId xmlns:a16="http://schemas.microsoft.com/office/drawing/2014/main" id="{1E2A112A-6CFD-4660-9BF8-8DC33023E526}"/>
+                <a16:creationId xmlns:a16="http://schemas.microsoft.com/office/drawing/2014/main" xmlns="" id="{1E2A112A-6CFD-4660-9BF8-8DC33023E526}"/>
               </a:ext>
             </a:extLst>
           </p:cNvPr>
@@ -17611,7 +17647,7 @@
           <p:cNvPr id="4" name="TextBox 3">
             <a:extLst>
               <a:ext uri="{FF2B5EF4-FFF2-40B4-BE49-F238E27FC236}">
-                <a16:creationId xmlns:a16="http://schemas.microsoft.com/office/drawing/2014/main" id="{CC1C7DB5-602D-49BC-920E-9E1EA9462E63}"/>
+                <a16:creationId xmlns:a16="http://schemas.microsoft.com/office/drawing/2014/main" xmlns="" id="{CC1C7DB5-602D-49BC-920E-9E1EA9462E63}"/>
               </a:ext>
             </a:extLst>
           </p:cNvPr>
@@ -18444,7 +18480,7 @@
           <p:cNvPr id="6" name="Рисунок 5">
             <a:extLst>
               <a:ext uri="{FF2B5EF4-FFF2-40B4-BE49-F238E27FC236}">
-                <a16:creationId xmlns:a16="http://schemas.microsoft.com/office/drawing/2014/main" id="{955D334D-1DDC-49A1-9B6A-8B8B5888A5BF}"/>
+                <a16:creationId xmlns:a16="http://schemas.microsoft.com/office/drawing/2014/main" xmlns="" id="{955D334D-1DDC-49A1-9B6A-8B8B5888A5BF}"/>
               </a:ext>
             </a:extLst>
           </p:cNvPr>
@@ -18472,7 +18508,7 @@
     </p:spTree>
     <p:extLst>
       <p:ext uri="{BB962C8B-B14F-4D97-AF65-F5344CB8AC3E}">
-        <p14:creationId xmlns:p14="http://schemas.microsoft.com/office/powerpoint/2010/main" val="4199327277"/>
+        <p14:creationId xmlns:p14="http://schemas.microsoft.com/office/powerpoint/2010/main" xmlns="" val="4199327277"/>
       </p:ext>
     </p:extLst>
   </p:cSld>
@@ -18533,7 +18569,7 @@
           <p:cNvPr id="8" name="TextBox 7">
             <a:extLst>
               <a:ext uri="{FF2B5EF4-FFF2-40B4-BE49-F238E27FC236}">
-                <a16:creationId xmlns:a16="http://schemas.microsoft.com/office/drawing/2014/main" id="{1E2A112A-6CFD-4660-9BF8-8DC33023E526}"/>
+                <a16:creationId xmlns:a16="http://schemas.microsoft.com/office/drawing/2014/main" xmlns="" id="{1E2A112A-6CFD-4660-9BF8-8DC33023E526}"/>
               </a:ext>
             </a:extLst>
           </p:cNvPr>
@@ -18574,7 +18610,7 @@
           <p:cNvPr id="4" name="TextBox 3">
             <a:extLst>
               <a:ext uri="{FF2B5EF4-FFF2-40B4-BE49-F238E27FC236}">
-                <a16:creationId xmlns:a16="http://schemas.microsoft.com/office/drawing/2014/main" id="{CC1C7DB5-602D-49BC-920E-9E1EA9462E63}"/>
+                <a16:creationId xmlns:a16="http://schemas.microsoft.com/office/drawing/2014/main" xmlns="" id="{CC1C7DB5-602D-49BC-920E-9E1EA9462E63}"/>
               </a:ext>
             </a:extLst>
           </p:cNvPr>
@@ -19350,7 +19386,7 @@
           <p:cNvPr id="5" name="Рисунок 4">
             <a:extLst>
               <a:ext uri="{FF2B5EF4-FFF2-40B4-BE49-F238E27FC236}">
-                <a16:creationId xmlns:a16="http://schemas.microsoft.com/office/drawing/2014/main" id="{E0DBC387-4313-447A-9A73-B39C3D3A02A5}"/>
+                <a16:creationId xmlns:a16="http://schemas.microsoft.com/office/drawing/2014/main" xmlns="" id="{E0DBC387-4313-447A-9A73-B39C3D3A02A5}"/>
               </a:ext>
             </a:extLst>
           </p:cNvPr>
@@ -19380,7 +19416,7 @@
           <p:cNvPr id="9" name="Рисунок 8">
             <a:extLst>
               <a:ext uri="{FF2B5EF4-FFF2-40B4-BE49-F238E27FC236}">
-                <a16:creationId xmlns:a16="http://schemas.microsoft.com/office/drawing/2014/main" id="{1826AD92-0079-A1DF-4D47-F4BB27657877}"/>
+                <a16:creationId xmlns:a16="http://schemas.microsoft.com/office/drawing/2014/main" xmlns="" id="{1826AD92-0079-A1DF-4D47-F4BB27657877}"/>
               </a:ext>
             </a:extLst>
           </p:cNvPr>
@@ -19410,7 +19446,7 @@
           <p:cNvPr id="11" name="Рисунок 10">
             <a:extLst>
               <a:ext uri="{FF2B5EF4-FFF2-40B4-BE49-F238E27FC236}">
-                <a16:creationId xmlns:a16="http://schemas.microsoft.com/office/drawing/2014/main" id="{50404D66-9AD9-AA10-A2ED-3BC1BD2AE38B}"/>
+                <a16:creationId xmlns:a16="http://schemas.microsoft.com/office/drawing/2014/main" xmlns="" id="{50404D66-9AD9-AA10-A2ED-3BC1BD2AE38B}"/>
               </a:ext>
             </a:extLst>
           </p:cNvPr>
@@ -19438,7 +19474,7 @@
     </p:spTree>
     <p:extLst>
       <p:ext uri="{BB962C8B-B14F-4D97-AF65-F5344CB8AC3E}">
-        <p14:creationId xmlns:p14="http://schemas.microsoft.com/office/powerpoint/2010/main" val="766687876"/>
+        <p14:creationId xmlns:p14="http://schemas.microsoft.com/office/powerpoint/2010/main" xmlns="" val="766687876"/>
       </p:ext>
     </p:extLst>
   </p:cSld>
@@ -19507,7 +19543,7 @@
           <p:cNvPr id="8" name="TextBox 7">
             <a:extLst>
               <a:ext uri="{FF2B5EF4-FFF2-40B4-BE49-F238E27FC236}">
-                <a16:creationId xmlns:a16="http://schemas.microsoft.com/office/drawing/2014/main" id="{1E2A112A-6CFD-4660-9BF8-8DC33023E526}"/>
+                <a16:creationId xmlns:a16="http://schemas.microsoft.com/office/drawing/2014/main" xmlns="" id="{1E2A112A-6CFD-4660-9BF8-8DC33023E526}"/>
               </a:ext>
             </a:extLst>
           </p:cNvPr>
@@ -19548,7 +19584,7 @@
           <p:cNvPr id="4" name="TextBox 3">
             <a:extLst>
               <a:ext uri="{FF2B5EF4-FFF2-40B4-BE49-F238E27FC236}">
-                <a16:creationId xmlns:a16="http://schemas.microsoft.com/office/drawing/2014/main" id="{CC1C7DB5-602D-49BC-920E-9E1EA9462E63}"/>
+                <a16:creationId xmlns:a16="http://schemas.microsoft.com/office/drawing/2014/main" xmlns="" id="{CC1C7DB5-602D-49BC-920E-9E1EA9462E63}"/>
               </a:ext>
             </a:extLst>
           </p:cNvPr>
@@ -20054,7 +20090,7 @@
           <p:cNvPr id="9" name="Рисунок 8">
             <a:extLst>
               <a:ext uri="{FF2B5EF4-FFF2-40B4-BE49-F238E27FC236}">
-                <a16:creationId xmlns:a16="http://schemas.microsoft.com/office/drawing/2014/main" id="{39C323C8-5570-4667-A510-7BF4D0A6DE7D}"/>
+                <a16:creationId xmlns:a16="http://schemas.microsoft.com/office/drawing/2014/main" xmlns="" id="{39C323C8-5570-4667-A510-7BF4D0A6DE7D}"/>
               </a:ext>
             </a:extLst>
           </p:cNvPr>
@@ -20084,7 +20120,7 @@
           <p:cNvPr id="5" name="Рисунок 4">
             <a:extLst>
               <a:ext uri="{FF2B5EF4-FFF2-40B4-BE49-F238E27FC236}">
-                <a16:creationId xmlns:a16="http://schemas.microsoft.com/office/drawing/2014/main" id="{BD690EBA-2530-CB58-CF1F-7FCC6C018C46}"/>
+                <a16:creationId xmlns:a16="http://schemas.microsoft.com/office/drawing/2014/main" xmlns="" id="{BD690EBA-2530-CB58-CF1F-7FCC6C018C46}"/>
               </a:ext>
             </a:extLst>
           </p:cNvPr>
@@ -20114,7 +20150,7 @@
           <p:cNvPr id="6" name="Рисунок 5">
             <a:extLst>
               <a:ext uri="{FF2B5EF4-FFF2-40B4-BE49-F238E27FC236}">
-                <a16:creationId xmlns:a16="http://schemas.microsoft.com/office/drawing/2014/main" id="{893EB497-7CF0-67D2-346B-3025213EE797}"/>
+                <a16:creationId xmlns:a16="http://schemas.microsoft.com/office/drawing/2014/main" xmlns="" id="{893EB497-7CF0-67D2-346B-3025213EE797}"/>
               </a:ext>
             </a:extLst>
           </p:cNvPr>
@@ -20142,7 +20178,7 @@
     </p:spTree>
     <p:extLst>
       <p:ext uri="{BB962C8B-B14F-4D97-AF65-F5344CB8AC3E}">
-        <p14:creationId xmlns:p14="http://schemas.microsoft.com/office/powerpoint/2010/main" val="1375841073"/>
+        <p14:creationId xmlns:p14="http://schemas.microsoft.com/office/powerpoint/2010/main" xmlns="" val="1375841073"/>
       </p:ext>
     </p:extLst>
   </p:cSld>
@@ -20202,7 +20238,7 @@
     </p:spTree>
     <p:extLst>
       <p:ext uri="{BB962C8B-B14F-4D97-AF65-F5344CB8AC3E}">
-        <p14:creationId xmlns:p14="http://schemas.microsoft.com/office/powerpoint/2010/main" val="1221442529"/>
+        <p14:creationId xmlns:p14="http://schemas.microsoft.com/office/powerpoint/2010/main" xmlns="" val="1221442529"/>
       </p:ext>
     </p:extLst>
   </p:cSld>
@@ -20263,7 +20299,7 @@
           <p:cNvPr id="8" name="TextBox 7">
             <a:extLst>
               <a:ext uri="{FF2B5EF4-FFF2-40B4-BE49-F238E27FC236}">
-                <a16:creationId xmlns:a16="http://schemas.microsoft.com/office/drawing/2014/main" id="{1E2A112A-6CFD-4660-9BF8-8DC33023E526}"/>
+                <a16:creationId xmlns:a16="http://schemas.microsoft.com/office/drawing/2014/main" xmlns="" id="{1E2A112A-6CFD-4660-9BF8-8DC33023E526}"/>
               </a:ext>
             </a:extLst>
           </p:cNvPr>
@@ -20304,7 +20340,7 @@
           <p:cNvPr id="4" name="TextBox 3">
             <a:extLst>
               <a:ext uri="{FF2B5EF4-FFF2-40B4-BE49-F238E27FC236}">
-                <a16:creationId xmlns:a16="http://schemas.microsoft.com/office/drawing/2014/main" id="{CC1C7DB5-602D-49BC-920E-9E1EA9462E63}"/>
+                <a16:creationId xmlns:a16="http://schemas.microsoft.com/office/drawing/2014/main" xmlns="" id="{CC1C7DB5-602D-49BC-920E-9E1EA9462E63}"/>
               </a:ext>
             </a:extLst>
           </p:cNvPr>
@@ -21179,7 +21215,7 @@
           <p:cNvPr id="5" name="Рисунок 4">
             <a:extLst>
               <a:ext uri="{FF2B5EF4-FFF2-40B4-BE49-F238E27FC236}">
-                <a16:creationId xmlns:a16="http://schemas.microsoft.com/office/drawing/2014/main" id="{B55ECD5D-D142-B343-E310-88A6B22C6CB9}"/>
+                <a16:creationId xmlns:a16="http://schemas.microsoft.com/office/drawing/2014/main" xmlns="" id="{B55ECD5D-D142-B343-E310-88A6B22C6CB9}"/>
               </a:ext>
             </a:extLst>
           </p:cNvPr>
@@ -21207,7 +21243,7 @@
     </p:spTree>
     <p:extLst>
       <p:ext uri="{BB962C8B-B14F-4D97-AF65-F5344CB8AC3E}">
-        <p14:creationId xmlns:p14="http://schemas.microsoft.com/office/powerpoint/2010/main" val="1291100403"/>
+        <p14:creationId xmlns:p14="http://schemas.microsoft.com/office/powerpoint/2010/main" xmlns="" val="1291100403"/>
       </p:ext>
     </p:extLst>
   </p:cSld>
@@ -21268,7 +21304,7 @@
           <p:cNvPr id="8" name="TextBox 7">
             <a:extLst>
               <a:ext uri="{FF2B5EF4-FFF2-40B4-BE49-F238E27FC236}">
-                <a16:creationId xmlns:a16="http://schemas.microsoft.com/office/drawing/2014/main" id="{1E2A112A-6CFD-4660-9BF8-8DC33023E526}"/>
+                <a16:creationId xmlns:a16="http://schemas.microsoft.com/office/drawing/2014/main" xmlns="" id="{1E2A112A-6CFD-4660-9BF8-8DC33023E526}"/>
               </a:ext>
             </a:extLst>
           </p:cNvPr>
@@ -21309,7 +21345,7 @@
           <p:cNvPr id="4" name="TextBox 3">
             <a:extLst>
               <a:ext uri="{FF2B5EF4-FFF2-40B4-BE49-F238E27FC236}">
-                <a16:creationId xmlns:a16="http://schemas.microsoft.com/office/drawing/2014/main" id="{CC1C7DB5-602D-49BC-920E-9E1EA9462E63}"/>
+                <a16:creationId xmlns:a16="http://schemas.microsoft.com/office/drawing/2014/main" xmlns="" id="{CC1C7DB5-602D-49BC-920E-9E1EA9462E63}"/>
               </a:ext>
             </a:extLst>
           </p:cNvPr>
@@ -22004,7 +22040,7 @@
           <p:cNvPr id="3" name="Рисунок 2">
             <a:extLst>
               <a:ext uri="{FF2B5EF4-FFF2-40B4-BE49-F238E27FC236}">
-                <a16:creationId xmlns:a16="http://schemas.microsoft.com/office/drawing/2014/main" id="{CCF83435-A60A-5F6F-94FB-7F156905B00D}"/>
+                <a16:creationId xmlns:a16="http://schemas.microsoft.com/office/drawing/2014/main" xmlns="" id="{CCF83435-A60A-5F6F-94FB-7F156905B00D}"/>
               </a:ext>
             </a:extLst>
           </p:cNvPr>
@@ -22032,7 +22068,7 @@
     </p:spTree>
     <p:extLst>
       <p:ext uri="{BB962C8B-B14F-4D97-AF65-F5344CB8AC3E}">
-        <p14:creationId xmlns:p14="http://schemas.microsoft.com/office/powerpoint/2010/main" val="1250910888"/>
+        <p14:creationId xmlns:p14="http://schemas.microsoft.com/office/powerpoint/2010/main" xmlns="" val="1250910888"/>
       </p:ext>
     </p:extLst>
   </p:cSld>
@@ -22093,7 +22129,7 @@
           <p:cNvPr id="8" name="TextBox 7">
             <a:extLst>
               <a:ext uri="{FF2B5EF4-FFF2-40B4-BE49-F238E27FC236}">
-                <a16:creationId xmlns:a16="http://schemas.microsoft.com/office/drawing/2014/main" id="{1E2A112A-6CFD-4660-9BF8-8DC33023E526}"/>
+                <a16:creationId xmlns:a16="http://schemas.microsoft.com/office/drawing/2014/main" xmlns="" id="{1E2A112A-6CFD-4660-9BF8-8DC33023E526}"/>
               </a:ext>
             </a:extLst>
           </p:cNvPr>
@@ -22134,7 +22170,7 @@
           <p:cNvPr id="4" name="TextBox 3">
             <a:extLst>
               <a:ext uri="{FF2B5EF4-FFF2-40B4-BE49-F238E27FC236}">
-                <a16:creationId xmlns:a16="http://schemas.microsoft.com/office/drawing/2014/main" id="{CC1C7DB5-602D-49BC-920E-9E1EA9462E63}"/>
+                <a16:creationId xmlns:a16="http://schemas.microsoft.com/office/drawing/2014/main" xmlns="" id="{CC1C7DB5-602D-49BC-920E-9E1EA9462E63}"/>
               </a:ext>
             </a:extLst>
           </p:cNvPr>
@@ -22508,7 +22544,7 @@
           <p:cNvPr id="3" name="Рисунок 2">
             <a:extLst>
               <a:ext uri="{FF2B5EF4-FFF2-40B4-BE49-F238E27FC236}">
-                <a16:creationId xmlns:a16="http://schemas.microsoft.com/office/drawing/2014/main" id="{4C6E479E-0D9E-6C78-D9C6-ADD1638D5929}"/>
+                <a16:creationId xmlns:a16="http://schemas.microsoft.com/office/drawing/2014/main" xmlns="" id="{4C6E479E-0D9E-6C78-D9C6-ADD1638D5929}"/>
               </a:ext>
             </a:extLst>
           </p:cNvPr>
@@ -22538,7 +22574,7 @@
           <p:cNvPr id="5" name="Рисунок 4">
             <a:extLst>
               <a:ext uri="{FF2B5EF4-FFF2-40B4-BE49-F238E27FC236}">
-                <a16:creationId xmlns:a16="http://schemas.microsoft.com/office/drawing/2014/main" id="{06709127-067D-583F-47C5-C2D66A897FA1}"/>
+                <a16:creationId xmlns:a16="http://schemas.microsoft.com/office/drawing/2014/main" xmlns="" id="{06709127-067D-583F-47C5-C2D66A897FA1}"/>
               </a:ext>
             </a:extLst>
           </p:cNvPr>
@@ -22566,7 +22602,7 @@
     </p:spTree>
     <p:extLst>
       <p:ext uri="{BB962C8B-B14F-4D97-AF65-F5344CB8AC3E}">
-        <p14:creationId xmlns:p14="http://schemas.microsoft.com/office/powerpoint/2010/main" val="1098771826"/>
+        <p14:creationId xmlns:p14="http://schemas.microsoft.com/office/powerpoint/2010/main" xmlns="" val="1098771826"/>
       </p:ext>
     </p:extLst>
   </p:cSld>
@@ -22596,7 +22632,7 @@
     </p:spTree>
     <p:extLst>
       <p:ext uri="{BB962C8B-B14F-4D97-AF65-F5344CB8AC3E}">
-        <p14:creationId xmlns:p14="http://schemas.microsoft.com/office/powerpoint/2010/main" val="1657512920"/>
+        <p14:creationId xmlns:p14="http://schemas.microsoft.com/office/powerpoint/2010/main" xmlns="" val="1657512920"/>
       </p:ext>
     </p:extLst>
   </p:cSld>
@@ -22657,7 +22693,7 @@
           <p:cNvPr id="4" name="Заголовок 1">
             <a:extLst>
               <a:ext uri="{FF2B5EF4-FFF2-40B4-BE49-F238E27FC236}">
-                <a16:creationId xmlns:a16="http://schemas.microsoft.com/office/drawing/2014/main" id="{67F36D55-042F-4E0F-B730-32C761BB4897}"/>
+                <a16:creationId xmlns:a16="http://schemas.microsoft.com/office/drawing/2014/main" xmlns="" id="{67F36D55-042F-4E0F-B730-32C761BB4897}"/>
               </a:ext>
             </a:extLst>
           </p:cNvPr>
@@ -22711,7 +22747,7 @@
     </p:spTree>
     <p:extLst>
       <p:ext uri="{BB962C8B-B14F-4D97-AF65-F5344CB8AC3E}">
-        <p14:creationId xmlns:p14="http://schemas.microsoft.com/office/powerpoint/2010/main" val="3566795437"/>
+        <p14:creationId xmlns:p14="http://schemas.microsoft.com/office/powerpoint/2010/main" xmlns="" val="3566795437"/>
       </p:ext>
     </p:extLst>
   </p:cSld>
@@ -22772,7 +22808,7 @@
           <p:cNvPr id="6" name="Прямоугольник 5">
             <a:extLst>
               <a:ext uri="{FF2B5EF4-FFF2-40B4-BE49-F238E27FC236}">
-                <a16:creationId xmlns:a16="http://schemas.microsoft.com/office/drawing/2014/main" id="{5351AF43-26C1-4938-B994-784CD1713893}"/>
+                <a16:creationId xmlns:a16="http://schemas.microsoft.com/office/drawing/2014/main" xmlns="" id="{5351AF43-26C1-4938-B994-784CD1713893}"/>
               </a:ext>
             </a:extLst>
           </p:cNvPr>
@@ -22817,7 +22853,7 @@
           <p:cNvPr id="5" name="Рисунок 4">
             <a:extLst>
               <a:ext uri="{FF2B5EF4-FFF2-40B4-BE49-F238E27FC236}">
-                <a16:creationId xmlns:a16="http://schemas.microsoft.com/office/drawing/2014/main" id="{F711901B-F607-4502-8A70-F98A9111A92B}"/>
+                <a16:creationId xmlns:a16="http://schemas.microsoft.com/office/drawing/2014/main" xmlns="" id="{F711901B-F607-4502-8A70-F98A9111A92B}"/>
               </a:ext>
             </a:extLst>
           </p:cNvPr>
@@ -22845,7 +22881,7 @@
     </p:spTree>
     <p:extLst>
       <p:ext uri="{BB962C8B-B14F-4D97-AF65-F5344CB8AC3E}">
-        <p14:creationId xmlns:p14="http://schemas.microsoft.com/office/powerpoint/2010/main" val="3497320472"/>
+        <p14:creationId xmlns:p14="http://schemas.microsoft.com/office/powerpoint/2010/main" xmlns="" val="3497320472"/>
       </p:ext>
     </p:extLst>
   </p:cSld>
@@ -22914,7 +22950,7 @@
           <p:cNvPr id="6" name="Прямоугольник 5">
             <a:extLst>
               <a:ext uri="{FF2B5EF4-FFF2-40B4-BE49-F238E27FC236}">
-                <a16:creationId xmlns:a16="http://schemas.microsoft.com/office/drawing/2014/main" id="{5351AF43-26C1-4938-B994-784CD1713893}"/>
+                <a16:creationId xmlns:a16="http://schemas.microsoft.com/office/drawing/2014/main" xmlns="" id="{5351AF43-26C1-4938-B994-784CD1713893}"/>
               </a:ext>
             </a:extLst>
           </p:cNvPr>
@@ -22986,7 +23022,7 @@
           <p:cNvPr id="5" name="Рисунок 4">
             <a:extLst>
               <a:ext uri="{FF2B5EF4-FFF2-40B4-BE49-F238E27FC236}">
-                <a16:creationId xmlns:a16="http://schemas.microsoft.com/office/drawing/2014/main" id="{F711901B-F607-4502-8A70-F98A9111A92B}"/>
+                <a16:creationId xmlns:a16="http://schemas.microsoft.com/office/drawing/2014/main" xmlns="" id="{F711901B-F607-4502-8A70-F98A9111A92B}"/>
               </a:ext>
             </a:extLst>
           </p:cNvPr>
@@ -23014,7 +23050,7 @@
     </p:spTree>
     <p:extLst>
       <p:ext uri="{BB962C8B-B14F-4D97-AF65-F5344CB8AC3E}">
-        <p14:creationId xmlns:p14="http://schemas.microsoft.com/office/powerpoint/2010/main" val="4228990354"/>
+        <p14:creationId xmlns:p14="http://schemas.microsoft.com/office/powerpoint/2010/main" xmlns="" val="4228990354"/>
       </p:ext>
     </p:extLst>
   </p:cSld>
@@ -23075,7 +23111,7 @@
           <p:cNvPr id="6" name="Прямоугольник 5">
             <a:extLst>
               <a:ext uri="{FF2B5EF4-FFF2-40B4-BE49-F238E27FC236}">
-                <a16:creationId xmlns:a16="http://schemas.microsoft.com/office/drawing/2014/main" id="{5351AF43-26C1-4938-B994-784CD1713893}"/>
+                <a16:creationId xmlns:a16="http://schemas.microsoft.com/office/drawing/2014/main" xmlns="" id="{5351AF43-26C1-4938-B994-784CD1713893}"/>
               </a:ext>
             </a:extLst>
           </p:cNvPr>
@@ -23112,7 +23148,7 @@
           <p:cNvPr id="5" name="Рисунок 4">
             <a:extLst>
               <a:ext uri="{FF2B5EF4-FFF2-40B4-BE49-F238E27FC236}">
-                <a16:creationId xmlns:a16="http://schemas.microsoft.com/office/drawing/2014/main" id="{F711901B-F607-4502-8A70-F98A9111A92B}"/>
+                <a16:creationId xmlns:a16="http://schemas.microsoft.com/office/drawing/2014/main" xmlns="" id="{F711901B-F607-4502-8A70-F98A9111A92B}"/>
               </a:ext>
             </a:extLst>
           </p:cNvPr>
@@ -23140,7 +23176,7 @@
     </p:spTree>
     <p:extLst>
       <p:ext uri="{BB962C8B-B14F-4D97-AF65-F5344CB8AC3E}">
-        <p14:creationId xmlns:p14="http://schemas.microsoft.com/office/powerpoint/2010/main" val="3618931337"/>
+        <p14:creationId xmlns:p14="http://schemas.microsoft.com/office/powerpoint/2010/main" xmlns="" val="3618931337"/>
       </p:ext>
     </p:extLst>
   </p:cSld>
@@ -23201,7 +23237,7 @@
           <p:cNvPr id="6" name="Прямоугольник 5">
             <a:extLst>
               <a:ext uri="{FF2B5EF4-FFF2-40B4-BE49-F238E27FC236}">
-                <a16:creationId xmlns:a16="http://schemas.microsoft.com/office/drawing/2014/main" id="{5351AF43-26C1-4938-B994-784CD1713893}"/>
+                <a16:creationId xmlns:a16="http://schemas.microsoft.com/office/drawing/2014/main" xmlns="" id="{5351AF43-26C1-4938-B994-784CD1713893}"/>
               </a:ext>
             </a:extLst>
           </p:cNvPr>
@@ -23238,7 +23274,7 @@
           <p:cNvPr id="5" name="Рисунок 4">
             <a:extLst>
               <a:ext uri="{FF2B5EF4-FFF2-40B4-BE49-F238E27FC236}">
-                <a16:creationId xmlns:a16="http://schemas.microsoft.com/office/drawing/2014/main" id="{F711901B-F607-4502-8A70-F98A9111A92B}"/>
+                <a16:creationId xmlns:a16="http://schemas.microsoft.com/office/drawing/2014/main" xmlns="" id="{F711901B-F607-4502-8A70-F98A9111A92B}"/>
               </a:ext>
             </a:extLst>
           </p:cNvPr>
@@ -23266,7 +23302,7 @@
     </p:spTree>
     <p:extLst>
       <p:ext uri="{BB962C8B-B14F-4D97-AF65-F5344CB8AC3E}">
-        <p14:creationId xmlns:p14="http://schemas.microsoft.com/office/powerpoint/2010/main" val="2022994017"/>
+        <p14:creationId xmlns:p14="http://schemas.microsoft.com/office/powerpoint/2010/main" xmlns="" val="2022994017"/>
       </p:ext>
     </p:extLst>
   </p:cSld>
@@ -23425,7 +23461,7 @@
     </p:spTree>
     <p:extLst>
       <p:ext uri="{BB962C8B-B14F-4D97-AF65-F5344CB8AC3E}">
-        <p14:creationId xmlns:p14="http://schemas.microsoft.com/office/powerpoint/2010/main" val="3854799009"/>
+        <p14:creationId xmlns:p14="http://schemas.microsoft.com/office/powerpoint/2010/main" xmlns="" val="3854799009"/>
       </p:ext>
     </p:extLst>
   </p:cSld>
@@ -23530,7 +23566,7 @@
           <a:blip r:embed="rId2">
             <a:extLst>
               <a:ext uri="{28A0092B-C50C-407E-A947-70E740481C1C}">
-                <a14:useLocalDpi xmlns:a14="http://schemas.microsoft.com/office/drawing/2010/main" val="0"/>
+                <a14:useLocalDpi xmlns:a14="http://schemas.microsoft.com/office/drawing/2010/main" xmlns="" val="0"/>
               </a:ext>
             </a:extLst>
           </a:blip>
@@ -23553,14 +23589,14 @@
           </a:ln>
           <a:extLst>
             <a:ext uri="{909E8E84-426E-40DD-AFC4-6F175D3DCCD1}">
-              <a14:hiddenFill xmlns:a14="http://schemas.microsoft.com/office/drawing/2010/main">
+              <a14:hiddenFill xmlns:a14="http://schemas.microsoft.com/office/drawing/2010/main" xmlns="">
                 <a:solidFill>
                   <a:schemeClr val="accent1"/>
                 </a:solidFill>
               </a14:hiddenFill>
             </a:ext>
             <a:ext uri="{91240B29-F687-4F45-9708-019B960494DF}">
-              <a14:hiddenLine xmlns:a14="http://schemas.microsoft.com/office/drawing/2010/main" w="9525">
+              <a14:hiddenLine xmlns:a14="http://schemas.microsoft.com/office/drawing/2010/main" xmlns="" w="9525">
                 <a:solidFill>
                   <a:schemeClr val="tx1"/>
                 </a:solidFill>
@@ -23575,7 +23611,7 @@
     </p:spTree>
     <p:extLst>
       <p:ext uri="{BB962C8B-B14F-4D97-AF65-F5344CB8AC3E}">
-        <p14:creationId xmlns:p14="http://schemas.microsoft.com/office/powerpoint/2010/main" val="2949949130"/>
+        <p14:creationId xmlns:p14="http://schemas.microsoft.com/office/powerpoint/2010/main" xmlns="" val="2949949130"/>
       </p:ext>
     </p:extLst>
   </p:cSld>
@@ -23858,7 +23894,7 @@
     </p:spTree>
     <p:extLst>
       <p:ext uri="{BB962C8B-B14F-4D97-AF65-F5344CB8AC3E}">
-        <p14:creationId xmlns:p14="http://schemas.microsoft.com/office/powerpoint/2010/main" val="2307304623"/>
+        <p14:creationId xmlns:p14="http://schemas.microsoft.com/office/powerpoint/2010/main" xmlns="" val="2307304623"/>
       </p:ext>
     </p:extLst>
   </p:cSld>
@@ -24343,7 +24379,7 @@
     </p:spTree>
     <p:extLst>
       <p:ext uri="{BB962C8B-B14F-4D97-AF65-F5344CB8AC3E}">
-        <p14:creationId xmlns:p14="http://schemas.microsoft.com/office/powerpoint/2010/main" val="2871746161"/>
+        <p14:creationId xmlns:p14="http://schemas.microsoft.com/office/powerpoint/2010/main" xmlns="" val="2871746161"/>
       </p:ext>
     </p:extLst>
   </p:cSld>
@@ -24436,7 +24472,7 @@
     </p:spTree>
     <p:extLst>
       <p:ext uri="{BB962C8B-B14F-4D97-AF65-F5344CB8AC3E}">
-        <p14:creationId xmlns:p14="http://schemas.microsoft.com/office/powerpoint/2010/main" val="1795114205"/>
+        <p14:creationId xmlns:p14="http://schemas.microsoft.com/office/powerpoint/2010/main" xmlns="" val="1795114205"/>
       </p:ext>
     </p:extLst>
   </p:cSld>
@@ -24466,7 +24502,7 @@
     </p:spTree>
     <p:extLst>
       <p:ext uri="{BB962C8B-B14F-4D97-AF65-F5344CB8AC3E}">
-        <p14:creationId xmlns:p14="http://schemas.microsoft.com/office/powerpoint/2010/main" val="824466969"/>
+        <p14:creationId xmlns:p14="http://schemas.microsoft.com/office/powerpoint/2010/main" xmlns="" val="824466969"/>
       </p:ext>
     </p:extLst>
   </p:cSld>
@@ -24526,7 +24562,7 @@
     </p:spTree>
     <p:extLst>
       <p:ext uri="{BB962C8B-B14F-4D97-AF65-F5344CB8AC3E}">
-        <p14:creationId xmlns:p14="http://schemas.microsoft.com/office/powerpoint/2010/main" val="3722968069"/>
+        <p14:creationId xmlns:p14="http://schemas.microsoft.com/office/powerpoint/2010/main" xmlns="" val="3722968069"/>
       </p:ext>
     </p:extLst>
   </p:cSld>
@@ -24587,7 +24623,7 @@
           <p:cNvPr id="6" name="Прямоугольник 5">
             <a:extLst>
               <a:ext uri="{FF2B5EF4-FFF2-40B4-BE49-F238E27FC236}">
-                <a16:creationId xmlns:a16="http://schemas.microsoft.com/office/drawing/2014/main" id="{5351AF43-26C1-4938-B994-784CD1713893}"/>
+                <a16:creationId xmlns:a16="http://schemas.microsoft.com/office/drawing/2014/main" xmlns="" id="{5351AF43-26C1-4938-B994-784CD1713893}"/>
               </a:ext>
             </a:extLst>
           </p:cNvPr>
@@ -24966,7 +25002,7 @@
     </p:spTree>
     <p:extLst>
       <p:ext uri="{BB962C8B-B14F-4D97-AF65-F5344CB8AC3E}">
-        <p14:creationId xmlns:p14="http://schemas.microsoft.com/office/powerpoint/2010/main" val="3940683252"/>
+        <p14:creationId xmlns:p14="http://schemas.microsoft.com/office/powerpoint/2010/main" xmlns="" val="3940683252"/>
       </p:ext>
     </p:extLst>
   </p:cSld>
@@ -24998,7 +25034,7 @@
           <p:cNvPr id="4" name="Рисунок 3">
             <a:extLst>
               <a:ext uri="{FF2B5EF4-FFF2-40B4-BE49-F238E27FC236}">
-                <a16:creationId xmlns:a16="http://schemas.microsoft.com/office/drawing/2014/main" id="{BA66AEFD-9148-44B5-9F9F-AE97EDDA407A}"/>
+                <a16:creationId xmlns:a16="http://schemas.microsoft.com/office/drawing/2014/main" xmlns="" id="{BA66AEFD-9148-44B5-9F9F-AE97EDDA407A}"/>
               </a:ext>
             </a:extLst>
           </p:cNvPr>
@@ -25057,7 +25093,7 @@
           <p:cNvPr id="6" name="Прямоугольник 5">
             <a:extLst>
               <a:ext uri="{FF2B5EF4-FFF2-40B4-BE49-F238E27FC236}">
-                <a16:creationId xmlns:a16="http://schemas.microsoft.com/office/drawing/2014/main" id="{5351AF43-26C1-4938-B994-784CD1713893}"/>
+                <a16:creationId xmlns:a16="http://schemas.microsoft.com/office/drawing/2014/main" xmlns="" id="{5351AF43-26C1-4938-B994-784CD1713893}"/>
               </a:ext>
             </a:extLst>
           </p:cNvPr>
@@ -25436,7 +25472,7 @@
     </p:spTree>
     <p:extLst>
       <p:ext uri="{BB962C8B-B14F-4D97-AF65-F5344CB8AC3E}">
-        <p14:creationId xmlns:p14="http://schemas.microsoft.com/office/powerpoint/2010/main" val="2721964283"/>
+        <p14:creationId xmlns:p14="http://schemas.microsoft.com/office/powerpoint/2010/main" xmlns="" val="2721964283"/>
       </p:ext>
     </p:extLst>
   </p:cSld>
@@ -25497,7 +25533,7 @@
           <p:cNvPr id="6" name="Прямоугольник 5">
             <a:extLst>
               <a:ext uri="{FF2B5EF4-FFF2-40B4-BE49-F238E27FC236}">
-                <a16:creationId xmlns:a16="http://schemas.microsoft.com/office/drawing/2014/main" id="{5351AF43-26C1-4938-B994-784CD1713893}"/>
+                <a16:creationId xmlns:a16="http://schemas.microsoft.com/office/drawing/2014/main" xmlns="" id="{5351AF43-26C1-4938-B994-784CD1713893}"/>
               </a:ext>
             </a:extLst>
           </p:cNvPr>
@@ -26410,7 +26446,7 @@
           <p:cNvPr id="4" name="Рисунок 3">
             <a:extLst>
               <a:ext uri="{FF2B5EF4-FFF2-40B4-BE49-F238E27FC236}">
-                <a16:creationId xmlns:a16="http://schemas.microsoft.com/office/drawing/2014/main" id="{BA66AEFD-9148-44B5-9F9F-AE97EDDA407A}"/>
+                <a16:creationId xmlns:a16="http://schemas.microsoft.com/office/drawing/2014/main" xmlns="" id="{BA66AEFD-9148-44B5-9F9F-AE97EDDA407A}"/>
               </a:ext>
             </a:extLst>
           </p:cNvPr>
@@ -26438,7 +26474,7 @@
     </p:spTree>
     <p:extLst>
       <p:ext uri="{BB962C8B-B14F-4D97-AF65-F5344CB8AC3E}">
-        <p14:creationId xmlns:p14="http://schemas.microsoft.com/office/powerpoint/2010/main" val="1249344008"/>
+        <p14:creationId xmlns:p14="http://schemas.microsoft.com/office/powerpoint/2010/main" xmlns="" val="1249344008"/>
       </p:ext>
     </p:extLst>
   </p:cSld>
@@ -26499,7 +26535,7 @@
           <p:cNvPr id="6" name="Прямоугольник 5">
             <a:extLst>
               <a:ext uri="{FF2B5EF4-FFF2-40B4-BE49-F238E27FC236}">
-                <a16:creationId xmlns:a16="http://schemas.microsoft.com/office/drawing/2014/main" id="{5351AF43-26C1-4938-B994-784CD1713893}"/>
+                <a16:creationId xmlns:a16="http://schemas.microsoft.com/office/drawing/2014/main" xmlns="" id="{5351AF43-26C1-4938-B994-784CD1713893}"/>
               </a:ext>
             </a:extLst>
           </p:cNvPr>
@@ -27166,7 +27202,7 @@
           <p:cNvPr id="4" name="Рисунок 3">
             <a:extLst>
               <a:ext uri="{FF2B5EF4-FFF2-40B4-BE49-F238E27FC236}">
-                <a16:creationId xmlns:a16="http://schemas.microsoft.com/office/drawing/2014/main" id="{BA66AEFD-9148-44B5-9F9F-AE97EDDA407A}"/>
+                <a16:creationId xmlns:a16="http://schemas.microsoft.com/office/drawing/2014/main" xmlns="" id="{BA66AEFD-9148-44B5-9F9F-AE97EDDA407A}"/>
               </a:ext>
             </a:extLst>
           </p:cNvPr>
@@ -27194,7 +27230,7 @@
     </p:spTree>
     <p:extLst>
       <p:ext uri="{BB962C8B-B14F-4D97-AF65-F5344CB8AC3E}">
-        <p14:creationId xmlns:p14="http://schemas.microsoft.com/office/powerpoint/2010/main" val="1817557057"/>
+        <p14:creationId xmlns:p14="http://schemas.microsoft.com/office/powerpoint/2010/main" xmlns="" val="1817557057"/>
       </p:ext>
     </p:extLst>
   </p:cSld>
@@ -27255,7 +27291,7 @@
           <p:cNvPr id="6" name="Прямоугольник 5">
             <a:extLst>
               <a:ext uri="{FF2B5EF4-FFF2-40B4-BE49-F238E27FC236}">
-                <a16:creationId xmlns:a16="http://schemas.microsoft.com/office/drawing/2014/main" id="{5351AF43-26C1-4938-B994-784CD1713893}"/>
+                <a16:creationId xmlns:a16="http://schemas.microsoft.com/office/drawing/2014/main" xmlns="" id="{5351AF43-26C1-4938-B994-784CD1713893}"/>
               </a:ext>
             </a:extLst>
           </p:cNvPr>
@@ -28001,7 +28037,7 @@
     </p:spTree>
     <p:extLst>
       <p:ext uri="{BB962C8B-B14F-4D97-AF65-F5344CB8AC3E}">
-        <p14:creationId xmlns:p14="http://schemas.microsoft.com/office/powerpoint/2010/main" val="479114250"/>
+        <p14:creationId xmlns:p14="http://schemas.microsoft.com/office/powerpoint/2010/main" xmlns="" val="479114250"/>
       </p:ext>
     </p:extLst>
   </p:cSld>
@@ -28106,7 +28142,7 @@
           <a:blip r:embed="rId2">
             <a:extLst>
               <a:ext uri="{28A0092B-C50C-407E-A947-70E740481C1C}">
-                <a14:useLocalDpi xmlns:a14="http://schemas.microsoft.com/office/drawing/2010/main" val="0"/>
+                <a14:useLocalDpi xmlns:a14="http://schemas.microsoft.com/office/drawing/2010/main" xmlns="" val="0"/>
               </a:ext>
             </a:extLst>
           </a:blip>
@@ -28129,14 +28165,14 @@
           </a:ln>
           <a:extLst>
             <a:ext uri="{909E8E84-426E-40DD-AFC4-6F175D3DCCD1}">
-              <a14:hiddenFill xmlns:a14="http://schemas.microsoft.com/office/drawing/2010/main">
+              <a14:hiddenFill xmlns:a14="http://schemas.microsoft.com/office/drawing/2010/main" xmlns="">
                 <a:solidFill>
                   <a:schemeClr val="accent1"/>
                 </a:solidFill>
               </a14:hiddenFill>
             </a:ext>
             <a:ext uri="{91240B29-F687-4F45-9708-019B960494DF}">
-              <a14:hiddenLine xmlns:a14="http://schemas.microsoft.com/office/drawing/2010/main" w="9525">
+              <a14:hiddenLine xmlns:a14="http://schemas.microsoft.com/office/drawing/2010/main" xmlns="" w="9525">
                 <a:solidFill>
                   <a:schemeClr val="tx1"/>
                 </a:solidFill>
@@ -28153,7 +28189,7 @@
           <p:cNvPr id="9" name="Рисунок 8">
             <a:extLst>
               <a:ext uri="{FF2B5EF4-FFF2-40B4-BE49-F238E27FC236}">
-                <a16:creationId xmlns:a16="http://schemas.microsoft.com/office/drawing/2014/main" id="{387E11A2-16B0-41AE-BD34-8AB46D158912}"/>
+                <a16:creationId xmlns:a16="http://schemas.microsoft.com/office/drawing/2014/main" xmlns="" id="{387E11A2-16B0-41AE-BD34-8AB46D158912}"/>
               </a:ext>
             </a:extLst>
           </p:cNvPr>
@@ -28181,7 +28217,7 @@
     </p:spTree>
     <p:extLst>
       <p:ext uri="{BB962C8B-B14F-4D97-AF65-F5344CB8AC3E}">
-        <p14:creationId xmlns:p14="http://schemas.microsoft.com/office/powerpoint/2010/main" val="4023902105"/>
+        <p14:creationId xmlns:p14="http://schemas.microsoft.com/office/powerpoint/2010/main" xmlns="" val="4023902105"/>
       </p:ext>
     </p:extLst>
   </p:cSld>
@@ -28242,7 +28278,7 @@
           <p:cNvPr id="6" name="Прямоугольник 5">
             <a:extLst>
               <a:ext uri="{FF2B5EF4-FFF2-40B4-BE49-F238E27FC236}">
-                <a16:creationId xmlns:a16="http://schemas.microsoft.com/office/drawing/2014/main" id="{5351AF43-26C1-4938-B994-784CD1713893}"/>
+                <a16:creationId xmlns:a16="http://schemas.microsoft.com/office/drawing/2014/main" xmlns="" id="{5351AF43-26C1-4938-B994-784CD1713893}"/>
               </a:ext>
             </a:extLst>
           </p:cNvPr>
@@ -28907,7 +28943,7 @@
     </p:spTree>
     <p:extLst>
       <p:ext uri="{BB962C8B-B14F-4D97-AF65-F5344CB8AC3E}">
-        <p14:creationId xmlns:p14="http://schemas.microsoft.com/office/powerpoint/2010/main" val="2149668784"/>
+        <p14:creationId xmlns:p14="http://schemas.microsoft.com/office/powerpoint/2010/main" xmlns="" val="2149668784"/>
       </p:ext>
     </p:extLst>
   </p:cSld>
@@ -28968,7 +29004,7 @@
           <p:cNvPr id="6" name="Прямоугольник 5">
             <a:extLst>
               <a:ext uri="{FF2B5EF4-FFF2-40B4-BE49-F238E27FC236}">
-                <a16:creationId xmlns:a16="http://schemas.microsoft.com/office/drawing/2014/main" id="{5351AF43-26C1-4938-B994-784CD1713893}"/>
+                <a16:creationId xmlns:a16="http://schemas.microsoft.com/office/drawing/2014/main" xmlns="" id="{5351AF43-26C1-4938-B994-784CD1713893}"/>
               </a:ext>
             </a:extLst>
           </p:cNvPr>
@@ -29645,7 +29681,7 @@
     </p:spTree>
     <p:extLst>
       <p:ext uri="{BB962C8B-B14F-4D97-AF65-F5344CB8AC3E}">
-        <p14:creationId xmlns:p14="http://schemas.microsoft.com/office/powerpoint/2010/main" val="3171212326"/>
+        <p14:creationId xmlns:p14="http://schemas.microsoft.com/office/powerpoint/2010/main" xmlns="" val="3171212326"/>
       </p:ext>
     </p:extLst>
   </p:cSld>
@@ -29706,7 +29742,7 @@
           <p:cNvPr id="6" name="Прямоугольник 5">
             <a:extLst>
               <a:ext uri="{FF2B5EF4-FFF2-40B4-BE49-F238E27FC236}">
-                <a16:creationId xmlns:a16="http://schemas.microsoft.com/office/drawing/2014/main" id="{5351AF43-26C1-4938-B994-784CD1713893}"/>
+                <a16:creationId xmlns:a16="http://schemas.microsoft.com/office/drawing/2014/main" xmlns="" id="{5351AF43-26C1-4938-B994-784CD1713893}"/>
               </a:ext>
             </a:extLst>
           </p:cNvPr>
@@ -30563,7 +30599,7 @@
     </p:spTree>
     <p:extLst>
       <p:ext uri="{BB962C8B-B14F-4D97-AF65-F5344CB8AC3E}">
-        <p14:creationId xmlns:p14="http://schemas.microsoft.com/office/powerpoint/2010/main" val="1098334482"/>
+        <p14:creationId xmlns:p14="http://schemas.microsoft.com/office/powerpoint/2010/main" xmlns="" val="1098334482"/>
       </p:ext>
     </p:extLst>
   </p:cSld>
@@ -30632,7 +30668,7 @@
           <p:cNvPr id="6" name="Прямоугольник 5">
             <a:extLst>
               <a:ext uri="{FF2B5EF4-FFF2-40B4-BE49-F238E27FC236}">
-                <a16:creationId xmlns:a16="http://schemas.microsoft.com/office/drawing/2014/main" id="{5351AF43-26C1-4938-B994-784CD1713893}"/>
+                <a16:creationId xmlns:a16="http://schemas.microsoft.com/office/drawing/2014/main" xmlns="" id="{5351AF43-26C1-4938-B994-784CD1713893}"/>
               </a:ext>
             </a:extLst>
           </p:cNvPr>
@@ -31070,7 +31106,7 @@
     </p:spTree>
     <p:extLst>
       <p:ext uri="{BB962C8B-B14F-4D97-AF65-F5344CB8AC3E}">
-        <p14:creationId xmlns:p14="http://schemas.microsoft.com/office/powerpoint/2010/main" val="42808955"/>
+        <p14:creationId xmlns:p14="http://schemas.microsoft.com/office/powerpoint/2010/main" xmlns="" val="42808955"/>
       </p:ext>
     </p:extLst>
   </p:cSld>
@@ -31130,7 +31166,7 @@
     </p:spTree>
     <p:extLst>
       <p:ext uri="{BB962C8B-B14F-4D97-AF65-F5344CB8AC3E}">
-        <p14:creationId xmlns:p14="http://schemas.microsoft.com/office/powerpoint/2010/main" val="1326442859"/>
+        <p14:creationId xmlns:p14="http://schemas.microsoft.com/office/powerpoint/2010/main" xmlns="" val="1326442859"/>
       </p:ext>
     </p:extLst>
   </p:cSld>
@@ -31271,7 +31307,7 @@
           <p:cNvPr id="9" name="Рисунок 8">
             <a:extLst>
               <a:ext uri="{FF2B5EF4-FFF2-40B4-BE49-F238E27FC236}">
-                <a16:creationId xmlns:a16="http://schemas.microsoft.com/office/drawing/2014/main" id="{2260E8B9-5B45-45FE-B75F-52437352EAC4}"/>
+                <a16:creationId xmlns:a16="http://schemas.microsoft.com/office/drawing/2014/main" xmlns="" id="{2260E8B9-5B45-45FE-B75F-52437352EAC4}"/>
               </a:ext>
             </a:extLst>
           </p:cNvPr>
@@ -31301,7 +31337,7 @@
           <p:cNvPr id="11" name="Рисунок 10">
             <a:extLst>
               <a:ext uri="{FF2B5EF4-FFF2-40B4-BE49-F238E27FC236}">
-                <a16:creationId xmlns:a16="http://schemas.microsoft.com/office/drawing/2014/main" id="{A114568C-FA40-40CC-99BB-384CCCA08D40}"/>
+                <a16:creationId xmlns:a16="http://schemas.microsoft.com/office/drawing/2014/main" xmlns="" id="{A114568C-FA40-40CC-99BB-384CCCA08D40}"/>
               </a:ext>
             </a:extLst>
           </p:cNvPr>
@@ -31329,7 +31365,7 @@
     </p:spTree>
     <p:extLst>
       <p:ext uri="{BB962C8B-B14F-4D97-AF65-F5344CB8AC3E}">
-        <p14:creationId xmlns:p14="http://schemas.microsoft.com/office/powerpoint/2010/main" val="4151314008"/>
+        <p14:creationId xmlns:p14="http://schemas.microsoft.com/office/powerpoint/2010/main" xmlns="" val="4151314008"/>
       </p:ext>
     </p:extLst>
   </p:cSld>
@@ -31390,7 +31426,7 @@
           <p:cNvPr id="5" name="Рисунок 4">
             <a:extLst>
               <a:ext uri="{FF2B5EF4-FFF2-40B4-BE49-F238E27FC236}">
-                <a16:creationId xmlns:a16="http://schemas.microsoft.com/office/drawing/2014/main" id="{92D27E22-8C16-4DEF-BE76-9F14BD0BCDBF}"/>
+                <a16:creationId xmlns:a16="http://schemas.microsoft.com/office/drawing/2014/main" xmlns="" id="{92D27E22-8C16-4DEF-BE76-9F14BD0BCDBF}"/>
               </a:ext>
             </a:extLst>
           </p:cNvPr>
@@ -31418,7 +31454,7 @@
     </p:spTree>
     <p:extLst>
       <p:ext uri="{BB962C8B-B14F-4D97-AF65-F5344CB8AC3E}">
-        <p14:creationId xmlns:p14="http://schemas.microsoft.com/office/powerpoint/2010/main" val="1354293774"/>
+        <p14:creationId xmlns:p14="http://schemas.microsoft.com/office/powerpoint/2010/main" xmlns="" val="1354293774"/>
       </p:ext>
     </p:extLst>
   </p:cSld>
@@ -31479,7 +31515,7 @@
           <p:cNvPr id="5" name="Рисунок 4">
             <a:extLst>
               <a:ext uri="{FF2B5EF4-FFF2-40B4-BE49-F238E27FC236}">
-                <a16:creationId xmlns:a16="http://schemas.microsoft.com/office/drawing/2014/main" id="{A3AC3544-1288-E466-4CAC-9E0E6D109243}"/>
+                <a16:creationId xmlns:a16="http://schemas.microsoft.com/office/drawing/2014/main" xmlns="" id="{A3AC3544-1288-E466-4CAC-9E0E6D109243}"/>
               </a:ext>
             </a:extLst>
           </p:cNvPr>
@@ -31507,7 +31543,7 @@
     </p:spTree>
     <p:extLst>
       <p:ext uri="{BB962C8B-B14F-4D97-AF65-F5344CB8AC3E}">
-        <p14:creationId xmlns:p14="http://schemas.microsoft.com/office/powerpoint/2010/main" val="3070774335"/>
+        <p14:creationId xmlns:p14="http://schemas.microsoft.com/office/powerpoint/2010/main" xmlns="" val="3070774335"/>
       </p:ext>
     </p:extLst>
   </p:cSld>
@@ -31568,7 +31604,7 @@
           <p:cNvPr id="4" name="Рисунок 3">
             <a:extLst>
               <a:ext uri="{FF2B5EF4-FFF2-40B4-BE49-F238E27FC236}">
-                <a16:creationId xmlns:a16="http://schemas.microsoft.com/office/drawing/2014/main" id="{E0317EB8-1E53-B232-7401-317F9B803E4A}"/>
+                <a16:creationId xmlns:a16="http://schemas.microsoft.com/office/drawing/2014/main" xmlns="" id="{E0317EB8-1E53-B232-7401-317F9B803E4A}"/>
               </a:ext>
             </a:extLst>
           </p:cNvPr>
@@ -31596,7 +31632,7 @@
     </p:spTree>
     <p:extLst>
       <p:ext uri="{BB962C8B-B14F-4D97-AF65-F5344CB8AC3E}">
-        <p14:creationId xmlns:p14="http://schemas.microsoft.com/office/powerpoint/2010/main" val="1800213727"/>
+        <p14:creationId xmlns:p14="http://schemas.microsoft.com/office/powerpoint/2010/main" xmlns="" val="1800213727"/>
       </p:ext>
     </p:extLst>
   </p:cSld>
@@ -31665,7 +31701,7 @@
           <p:cNvPr id="9" name="Рисунок 8">
             <a:extLst>
               <a:ext uri="{FF2B5EF4-FFF2-40B4-BE49-F238E27FC236}">
-                <a16:creationId xmlns:a16="http://schemas.microsoft.com/office/drawing/2014/main" id="{8D266ACC-43F9-4307-B738-3B0C5486299E}"/>
+                <a16:creationId xmlns:a16="http://schemas.microsoft.com/office/drawing/2014/main" xmlns="" id="{8D266ACC-43F9-4307-B738-3B0C5486299E}"/>
               </a:ext>
             </a:extLst>
           </p:cNvPr>
@@ -31695,7 +31731,7 @@
           <p:cNvPr id="11" name="Рисунок 10">
             <a:extLst>
               <a:ext uri="{FF2B5EF4-FFF2-40B4-BE49-F238E27FC236}">
-                <a16:creationId xmlns:a16="http://schemas.microsoft.com/office/drawing/2014/main" id="{AC6B8721-5FAD-4672-87A7-FCA2BC3B0186}"/>
+                <a16:creationId xmlns:a16="http://schemas.microsoft.com/office/drawing/2014/main" xmlns="" id="{AC6B8721-5FAD-4672-87A7-FCA2BC3B0186}"/>
               </a:ext>
             </a:extLst>
           </p:cNvPr>
@@ -31725,7 +31761,7 @@
           <p:cNvPr id="13" name="Рисунок 12">
             <a:extLst>
               <a:ext uri="{FF2B5EF4-FFF2-40B4-BE49-F238E27FC236}">
-                <a16:creationId xmlns:a16="http://schemas.microsoft.com/office/drawing/2014/main" id="{4DD17495-0D90-4815-A343-43C04C9B0271}"/>
+                <a16:creationId xmlns:a16="http://schemas.microsoft.com/office/drawing/2014/main" xmlns="" id="{4DD17495-0D90-4815-A343-43C04C9B0271}"/>
               </a:ext>
             </a:extLst>
           </p:cNvPr>
@@ -31755,7 +31791,7 @@
           <p:cNvPr id="15" name="Рисунок 14">
             <a:extLst>
               <a:ext uri="{FF2B5EF4-FFF2-40B4-BE49-F238E27FC236}">
-                <a16:creationId xmlns:a16="http://schemas.microsoft.com/office/drawing/2014/main" id="{6C6BFD22-587D-4B8E-BAA0-99A55C38873B}"/>
+                <a16:creationId xmlns:a16="http://schemas.microsoft.com/office/drawing/2014/main" xmlns="" id="{6C6BFD22-587D-4B8E-BAA0-99A55C38873B}"/>
               </a:ext>
             </a:extLst>
           </p:cNvPr>
@@ -31783,7 +31819,7 @@
     </p:spTree>
     <p:extLst>
       <p:ext uri="{BB962C8B-B14F-4D97-AF65-F5344CB8AC3E}">
-        <p14:creationId xmlns:p14="http://schemas.microsoft.com/office/powerpoint/2010/main" val="2298702344"/>
+        <p14:creationId xmlns:p14="http://schemas.microsoft.com/office/powerpoint/2010/main" xmlns="" val="2298702344"/>
       </p:ext>
     </p:extLst>
   </p:cSld>
@@ -32507,7 +32543,7 @@
           <a:blip r:embed="rId2">
             <a:extLst>
               <a:ext uri="{28A0092B-C50C-407E-A947-70E740481C1C}">
-                <a14:useLocalDpi xmlns:a14="http://schemas.microsoft.com/office/drawing/2010/main" val="0"/>
+                <a14:useLocalDpi xmlns:a14="http://schemas.microsoft.com/office/drawing/2010/main" xmlns="" val="0"/>
               </a:ext>
             </a:extLst>
           </a:blip>
@@ -32530,14 +32566,14 @@
           </a:ln>
           <a:extLst>
             <a:ext uri="{909E8E84-426E-40DD-AFC4-6F175D3DCCD1}">
-              <a14:hiddenFill xmlns:a14="http://schemas.microsoft.com/office/drawing/2010/main">
+              <a14:hiddenFill xmlns:a14="http://schemas.microsoft.com/office/drawing/2010/main" xmlns="">
                 <a:solidFill>
                   <a:schemeClr val="accent1"/>
                 </a:solidFill>
               </a14:hiddenFill>
             </a:ext>
             <a:ext uri="{91240B29-F687-4F45-9708-019B960494DF}">
-              <a14:hiddenLine xmlns:a14="http://schemas.microsoft.com/office/drawing/2010/main" w="9525">
+              <a14:hiddenLine xmlns:a14="http://schemas.microsoft.com/office/drawing/2010/main" xmlns="" w="9525">
                 <a:solidFill>
                   <a:schemeClr val="tx1"/>
                 </a:solidFill>
@@ -32552,7 +32588,7 @@
     </p:spTree>
     <p:extLst>
       <p:ext uri="{BB962C8B-B14F-4D97-AF65-F5344CB8AC3E}">
-        <p14:creationId xmlns:p14="http://schemas.microsoft.com/office/powerpoint/2010/main" val="437081608"/>
+        <p14:creationId xmlns:p14="http://schemas.microsoft.com/office/powerpoint/2010/main" xmlns="" val="437081608"/>
       </p:ext>
     </p:extLst>
   </p:cSld>
@@ -32582,7 +32618,7 @@
     </p:spTree>
     <p:extLst>
       <p:ext uri="{BB962C8B-B14F-4D97-AF65-F5344CB8AC3E}">
-        <p14:creationId xmlns:p14="http://schemas.microsoft.com/office/powerpoint/2010/main" val="3721981707"/>
+        <p14:creationId xmlns:p14="http://schemas.microsoft.com/office/powerpoint/2010/main" xmlns="" val="3721981707"/>
       </p:ext>
     </p:extLst>
   </p:cSld>
@@ -32641,7 +32677,7 @@
     </p:spTree>
     <p:extLst>
       <p:ext uri="{BB962C8B-B14F-4D97-AF65-F5344CB8AC3E}">
-        <p14:creationId xmlns:p14="http://schemas.microsoft.com/office/powerpoint/2010/main" val="2357389054"/>
+        <p14:creationId xmlns:p14="http://schemas.microsoft.com/office/powerpoint/2010/main" xmlns="" val="2357389054"/>
       </p:ext>
     </p:extLst>
   </p:cSld>
@@ -32702,7 +32738,7 @@
           <p:cNvPr id="6" name="TextBox 5">
             <a:extLst>
               <a:ext uri="{FF2B5EF4-FFF2-40B4-BE49-F238E27FC236}">
-                <a16:creationId xmlns:a16="http://schemas.microsoft.com/office/drawing/2014/main" id="{70F7A867-769B-4BC0-B24F-512773CB02B6}"/>
+                <a16:creationId xmlns:a16="http://schemas.microsoft.com/office/drawing/2014/main" xmlns="" id="{70F7A867-769B-4BC0-B24F-512773CB02B6}"/>
               </a:ext>
             </a:extLst>
           </p:cNvPr>
@@ -33010,7 +33046,7 @@
           <p:cNvPr id="4" name="Рисунок 3">
             <a:extLst>
               <a:ext uri="{FF2B5EF4-FFF2-40B4-BE49-F238E27FC236}">
-                <a16:creationId xmlns:a16="http://schemas.microsoft.com/office/drawing/2014/main" id="{656FDF12-A310-59A6-CB3B-3A286079FEAB}"/>
+                <a16:creationId xmlns:a16="http://schemas.microsoft.com/office/drawing/2014/main" xmlns="" id="{656FDF12-A310-59A6-CB3B-3A286079FEAB}"/>
               </a:ext>
             </a:extLst>
           </p:cNvPr>
@@ -33038,7 +33074,7 @@
     </p:spTree>
     <p:extLst>
       <p:ext uri="{BB962C8B-B14F-4D97-AF65-F5344CB8AC3E}">
-        <p14:creationId xmlns:p14="http://schemas.microsoft.com/office/powerpoint/2010/main" val="3934925264"/>
+        <p14:creationId xmlns:p14="http://schemas.microsoft.com/office/powerpoint/2010/main" xmlns="" val="3934925264"/>
       </p:ext>
     </p:extLst>
   </p:cSld>
@@ -33099,7 +33135,7 @@
           <p:cNvPr id="6" name="TextBox 5">
             <a:extLst>
               <a:ext uri="{FF2B5EF4-FFF2-40B4-BE49-F238E27FC236}">
-                <a16:creationId xmlns:a16="http://schemas.microsoft.com/office/drawing/2014/main" id="{70F7A867-769B-4BC0-B24F-512773CB02B6}"/>
+                <a16:creationId xmlns:a16="http://schemas.microsoft.com/office/drawing/2014/main" xmlns="" id="{70F7A867-769B-4BC0-B24F-512773CB02B6}"/>
               </a:ext>
             </a:extLst>
           </p:cNvPr>
@@ -33559,7 +33595,7 @@
     </p:spTree>
     <p:extLst>
       <p:ext uri="{BB962C8B-B14F-4D97-AF65-F5344CB8AC3E}">
-        <p14:creationId xmlns:p14="http://schemas.microsoft.com/office/powerpoint/2010/main" val="3050348239"/>
+        <p14:creationId xmlns:p14="http://schemas.microsoft.com/office/powerpoint/2010/main" xmlns="" val="3050348239"/>
       </p:ext>
     </p:extLst>
   </p:cSld>
@@ -33619,7 +33655,7 @@
     </p:spTree>
     <p:extLst>
       <p:ext uri="{BB962C8B-B14F-4D97-AF65-F5344CB8AC3E}">
-        <p14:creationId xmlns:p14="http://schemas.microsoft.com/office/powerpoint/2010/main" val="2564883888"/>
+        <p14:creationId xmlns:p14="http://schemas.microsoft.com/office/powerpoint/2010/main" xmlns="" val="2564883888"/>
       </p:ext>
     </p:extLst>
   </p:cSld>
@@ -33746,7 +33782,7 @@
     </p:spTree>
     <p:extLst>
       <p:ext uri="{BB962C8B-B14F-4D97-AF65-F5344CB8AC3E}">
-        <p14:creationId xmlns:p14="http://schemas.microsoft.com/office/powerpoint/2010/main" val="2413376717"/>
+        <p14:creationId xmlns:p14="http://schemas.microsoft.com/office/powerpoint/2010/main" xmlns="" val="2413376717"/>
       </p:ext>
     </p:extLst>
   </p:cSld>
@@ -33807,7 +33843,7 @@
           <p:cNvPr id="4" name="Рисунок 3">
             <a:extLst>
               <a:ext uri="{FF2B5EF4-FFF2-40B4-BE49-F238E27FC236}">
-                <a16:creationId xmlns:a16="http://schemas.microsoft.com/office/drawing/2014/main" id="{D7FC3BE2-C96E-43D0-AB44-426CF31E028C}"/>
+                <a16:creationId xmlns:a16="http://schemas.microsoft.com/office/drawing/2014/main" xmlns="" id="{D7FC3BE2-C96E-43D0-AB44-426CF31E028C}"/>
               </a:ext>
             </a:extLst>
           </p:cNvPr>
@@ -33835,7 +33871,7 @@
     </p:spTree>
     <p:extLst>
       <p:ext uri="{BB962C8B-B14F-4D97-AF65-F5344CB8AC3E}">
-        <p14:creationId xmlns:p14="http://schemas.microsoft.com/office/powerpoint/2010/main" val="2890116365"/>
+        <p14:creationId xmlns:p14="http://schemas.microsoft.com/office/powerpoint/2010/main" xmlns="" val="2890116365"/>
       </p:ext>
     </p:extLst>
   </p:cSld>
@@ -33896,7 +33932,7 @@
           <p:cNvPr id="5" name="Рисунок 4">
             <a:extLst>
               <a:ext uri="{FF2B5EF4-FFF2-40B4-BE49-F238E27FC236}">
-                <a16:creationId xmlns:a16="http://schemas.microsoft.com/office/drawing/2014/main" id="{CF30AF96-7F38-436A-8F55-CC801249FC3A}"/>
+                <a16:creationId xmlns:a16="http://schemas.microsoft.com/office/drawing/2014/main" xmlns="" id="{CF30AF96-7F38-436A-8F55-CC801249FC3A}"/>
               </a:ext>
             </a:extLst>
           </p:cNvPr>
@@ -33926,7 +33962,7 @@
           <p:cNvPr id="6" name="Прямоугольник 5">
             <a:extLst>
               <a:ext uri="{FF2B5EF4-FFF2-40B4-BE49-F238E27FC236}">
-                <a16:creationId xmlns:a16="http://schemas.microsoft.com/office/drawing/2014/main" id="{6125DA21-5264-4D26-99A6-EB4DC5C7A605}"/>
+                <a16:creationId xmlns:a16="http://schemas.microsoft.com/office/drawing/2014/main" xmlns="" id="{6125DA21-5264-4D26-99A6-EB4DC5C7A605}"/>
               </a:ext>
             </a:extLst>
           </p:cNvPr>
@@ -33963,7 +33999,7 @@
     </p:spTree>
     <p:extLst>
       <p:ext uri="{BB962C8B-B14F-4D97-AF65-F5344CB8AC3E}">
-        <p14:creationId xmlns:p14="http://schemas.microsoft.com/office/powerpoint/2010/main" val="1584658652"/>
+        <p14:creationId xmlns:p14="http://schemas.microsoft.com/office/powerpoint/2010/main" xmlns="" val="1584658652"/>
       </p:ext>
     </p:extLst>
   </p:cSld>
@@ -34024,7 +34060,7 @@
           <p:cNvPr id="6" name="Прямоугольник 5">
             <a:extLst>
               <a:ext uri="{FF2B5EF4-FFF2-40B4-BE49-F238E27FC236}">
-                <a16:creationId xmlns:a16="http://schemas.microsoft.com/office/drawing/2014/main" id="{6125DA21-5264-4D26-99A6-EB4DC5C7A605}"/>
+                <a16:creationId xmlns:a16="http://schemas.microsoft.com/office/drawing/2014/main" xmlns="" id="{6125DA21-5264-4D26-99A6-EB4DC5C7A605}"/>
               </a:ext>
             </a:extLst>
           </p:cNvPr>
@@ -34071,7 +34107,7 @@
           <p:cNvPr id="4" name="Рисунок 3">
             <a:extLst>
               <a:ext uri="{FF2B5EF4-FFF2-40B4-BE49-F238E27FC236}">
-                <a16:creationId xmlns:a16="http://schemas.microsoft.com/office/drawing/2014/main" id="{0A6C7BB8-7EE6-4F9C-AFCC-F8DFFE0F3C45}"/>
+                <a16:creationId xmlns:a16="http://schemas.microsoft.com/office/drawing/2014/main" xmlns="" id="{0A6C7BB8-7EE6-4F9C-AFCC-F8DFFE0F3C45}"/>
               </a:ext>
             </a:extLst>
           </p:cNvPr>
@@ -34099,7 +34135,7 @@
     </p:spTree>
     <p:extLst>
       <p:ext uri="{BB962C8B-B14F-4D97-AF65-F5344CB8AC3E}">
-        <p14:creationId xmlns:p14="http://schemas.microsoft.com/office/powerpoint/2010/main" val="3141387186"/>
+        <p14:creationId xmlns:p14="http://schemas.microsoft.com/office/powerpoint/2010/main" xmlns="" val="3141387186"/>
       </p:ext>
     </p:extLst>
   </p:cSld>
@@ -34160,7 +34196,7 @@
           <p:cNvPr id="6" name="Прямоугольник 5">
             <a:extLst>
               <a:ext uri="{FF2B5EF4-FFF2-40B4-BE49-F238E27FC236}">
-                <a16:creationId xmlns:a16="http://schemas.microsoft.com/office/drawing/2014/main" id="{6125DA21-5264-4D26-99A6-EB4DC5C7A605}"/>
+                <a16:creationId xmlns:a16="http://schemas.microsoft.com/office/drawing/2014/main" xmlns="" id="{6125DA21-5264-4D26-99A6-EB4DC5C7A605}"/>
               </a:ext>
             </a:extLst>
           </p:cNvPr>
@@ -34213,7 +34249,7 @@
           <p:cNvPr id="4" name="Рисунок 3">
             <a:extLst>
               <a:ext uri="{FF2B5EF4-FFF2-40B4-BE49-F238E27FC236}">
-                <a16:creationId xmlns:a16="http://schemas.microsoft.com/office/drawing/2014/main" id="{0A6C7BB8-7EE6-4F9C-AFCC-F8DFFE0F3C45}"/>
+                <a16:creationId xmlns:a16="http://schemas.microsoft.com/office/drawing/2014/main" xmlns="" id="{0A6C7BB8-7EE6-4F9C-AFCC-F8DFFE0F3C45}"/>
               </a:ext>
             </a:extLst>
           </p:cNvPr>
@@ -34241,7 +34277,7 @@
     </p:spTree>
     <p:extLst>
       <p:ext uri="{BB962C8B-B14F-4D97-AF65-F5344CB8AC3E}">
-        <p14:creationId xmlns:p14="http://schemas.microsoft.com/office/powerpoint/2010/main" val="1546965812"/>
+        <p14:creationId xmlns:p14="http://schemas.microsoft.com/office/powerpoint/2010/main" xmlns="" val="1546965812"/>
       </p:ext>
     </p:extLst>
   </p:cSld>
@@ -34965,7 +35001,7 @@
           <a:blip r:embed="rId2">
             <a:extLst>
               <a:ext uri="{28A0092B-C50C-407E-A947-70E740481C1C}">
-                <a14:useLocalDpi xmlns:a14="http://schemas.microsoft.com/office/drawing/2010/main" val="0"/>
+                <a14:useLocalDpi xmlns:a14="http://schemas.microsoft.com/office/drawing/2010/main" xmlns="" val="0"/>
               </a:ext>
             </a:extLst>
           </a:blip>
@@ -34988,14 +35024,14 @@
           </a:ln>
           <a:extLst>
             <a:ext uri="{909E8E84-426E-40DD-AFC4-6F175D3DCCD1}">
-              <a14:hiddenFill xmlns:a14="http://schemas.microsoft.com/office/drawing/2010/main">
+              <a14:hiddenFill xmlns:a14="http://schemas.microsoft.com/office/drawing/2010/main" xmlns="">
                 <a:solidFill>
                   <a:schemeClr val="accent1"/>
                 </a:solidFill>
               </a14:hiddenFill>
             </a:ext>
             <a:ext uri="{91240B29-F687-4F45-9708-019B960494DF}">
-              <a14:hiddenLine xmlns:a14="http://schemas.microsoft.com/office/drawing/2010/main" w="9525">
+              <a14:hiddenLine xmlns:a14="http://schemas.microsoft.com/office/drawing/2010/main" xmlns="" w="9525">
                 <a:solidFill>
                   <a:schemeClr val="tx1"/>
                 </a:solidFill>
@@ -35012,7 +35048,7 @@
           <p:cNvPr id="9" name="Рисунок 8">
             <a:extLst>
               <a:ext uri="{FF2B5EF4-FFF2-40B4-BE49-F238E27FC236}">
-                <a16:creationId xmlns:a16="http://schemas.microsoft.com/office/drawing/2014/main" id="{3BB48A81-77B5-479B-BAAC-513867B6E8FC}"/>
+                <a16:creationId xmlns:a16="http://schemas.microsoft.com/office/drawing/2014/main" xmlns="" id="{3BB48A81-77B5-479B-BAAC-513867B6E8FC}"/>
               </a:ext>
             </a:extLst>
           </p:cNvPr>
@@ -35040,7 +35076,7 @@
     </p:spTree>
     <p:extLst>
       <p:ext uri="{BB962C8B-B14F-4D97-AF65-F5344CB8AC3E}">
-        <p14:creationId xmlns:p14="http://schemas.microsoft.com/office/powerpoint/2010/main" val="1745580843"/>
+        <p14:creationId xmlns:p14="http://schemas.microsoft.com/office/powerpoint/2010/main" xmlns="" val="1745580843"/>
       </p:ext>
     </p:extLst>
   </p:cSld>
@@ -35101,7 +35137,7 @@
           <p:cNvPr id="6" name="Прямоугольник 5">
             <a:extLst>
               <a:ext uri="{FF2B5EF4-FFF2-40B4-BE49-F238E27FC236}">
-                <a16:creationId xmlns:a16="http://schemas.microsoft.com/office/drawing/2014/main" id="{6125DA21-5264-4D26-99A6-EB4DC5C7A605}"/>
+                <a16:creationId xmlns:a16="http://schemas.microsoft.com/office/drawing/2014/main" xmlns="" id="{6125DA21-5264-4D26-99A6-EB4DC5C7A605}"/>
               </a:ext>
             </a:extLst>
           </p:cNvPr>
@@ -35154,7 +35190,7 @@
           <p:cNvPr id="5" name="Рисунок 4">
             <a:extLst>
               <a:ext uri="{FF2B5EF4-FFF2-40B4-BE49-F238E27FC236}">
-                <a16:creationId xmlns:a16="http://schemas.microsoft.com/office/drawing/2014/main" id="{8F17CC49-1A59-4CF0-A5F7-A256B6044635}"/>
+                <a16:creationId xmlns:a16="http://schemas.microsoft.com/office/drawing/2014/main" xmlns="" id="{8F17CC49-1A59-4CF0-A5F7-A256B6044635}"/>
               </a:ext>
             </a:extLst>
           </p:cNvPr>
@@ -35182,7 +35218,7 @@
     </p:spTree>
     <p:extLst>
       <p:ext uri="{BB962C8B-B14F-4D97-AF65-F5344CB8AC3E}">
-        <p14:creationId xmlns:p14="http://schemas.microsoft.com/office/powerpoint/2010/main" val="1972942486"/>
+        <p14:creationId xmlns:p14="http://schemas.microsoft.com/office/powerpoint/2010/main" xmlns="" val="1972942486"/>
       </p:ext>
     </p:extLst>
   </p:cSld>
@@ -35243,7 +35279,7 @@
           <p:cNvPr id="6" name="Прямоугольник 5">
             <a:extLst>
               <a:ext uri="{FF2B5EF4-FFF2-40B4-BE49-F238E27FC236}">
-                <a16:creationId xmlns:a16="http://schemas.microsoft.com/office/drawing/2014/main" id="{6125DA21-5264-4D26-99A6-EB4DC5C7A605}"/>
+                <a16:creationId xmlns:a16="http://schemas.microsoft.com/office/drawing/2014/main" xmlns="" id="{6125DA21-5264-4D26-99A6-EB4DC5C7A605}"/>
               </a:ext>
             </a:extLst>
           </p:cNvPr>
@@ -35344,7 +35380,7 @@
           <p:cNvPr id="4" name="Рисунок 3">
             <a:extLst>
               <a:ext uri="{FF2B5EF4-FFF2-40B4-BE49-F238E27FC236}">
-                <a16:creationId xmlns:a16="http://schemas.microsoft.com/office/drawing/2014/main" id="{397CAF00-E1EB-4304-BE3D-7D5C97FB05BF}"/>
+                <a16:creationId xmlns:a16="http://schemas.microsoft.com/office/drawing/2014/main" xmlns="" id="{397CAF00-E1EB-4304-BE3D-7D5C97FB05BF}"/>
               </a:ext>
             </a:extLst>
           </p:cNvPr>
@@ -35372,7 +35408,7 @@
     </p:spTree>
     <p:extLst>
       <p:ext uri="{BB962C8B-B14F-4D97-AF65-F5344CB8AC3E}">
-        <p14:creationId xmlns:p14="http://schemas.microsoft.com/office/powerpoint/2010/main" val="4030197538"/>
+        <p14:creationId xmlns:p14="http://schemas.microsoft.com/office/powerpoint/2010/main" xmlns="" val="4030197538"/>
       </p:ext>
     </p:extLst>
   </p:cSld>
@@ -35433,7 +35469,7 @@
           <p:cNvPr id="6" name="Прямоугольник 5">
             <a:extLst>
               <a:ext uri="{FF2B5EF4-FFF2-40B4-BE49-F238E27FC236}">
-                <a16:creationId xmlns:a16="http://schemas.microsoft.com/office/drawing/2014/main" id="{6125DA21-5264-4D26-99A6-EB4DC5C7A605}"/>
+                <a16:creationId xmlns:a16="http://schemas.microsoft.com/office/drawing/2014/main" xmlns="" id="{6125DA21-5264-4D26-99A6-EB4DC5C7A605}"/>
               </a:ext>
             </a:extLst>
           </p:cNvPr>
@@ -35491,7 +35527,7 @@
           <p:cNvPr id="5" name="Рисунок 4">
             <a:extLst>
               <a:ext uri="{FF2B5EF4-FFF2-40B4-BE49-F238E27FC236}">
-                <a16:creationId xmlns:a16="http://schemas.microsoft.com/office/drawing/2014/main" id="{A4DD55DD-A16E-47FD-8B55-39AC009DDEA7}"/>
+                <a16:creationId xmlns:a16="http://schemas.microsoft.com/office/drawing/2014/main" xmlns="" id="{A4DD55DD-A16E-47FD-8B55-39AC009DDEA7}"/>
               </a:ext>
             </a:extLst>
           </p:cNvPr>
@@ -35519,7 +35555,7 @@
     </p:spTree>
     <p:extLst>
       <p:ext uri="{BB962C8B-B14F-4D97-AF65-F5344CB8AC3E}">
-        <p14:creationId xmlns:p14="http://schemas.microsoft.com/office/powerpoint/2010/main" val="2460759179"/>
+        <p14:creationId xmlns:p14="http://schemas.microsoft.com/office/powerpoint/2010/main" xmlns="" val="2460759179"/>
       </p:ext>
     </p:extLst>
   </p:cSld>
@@ -35580,7 +35616,7 @@
           <p:cNvPr id="6" name="Прямоугольник 5">
             <a:extLst>
               <a:ext uri="{FF2B5EF4-FFF2-40B4-BE49-F238E27FC236}">
-                <a16:creationId xmlns:a16="http://schemas.microsoft.com/office/drawing/2014/main" id="{6125DA21-5264-4D26-99A6-EB4DC5C7A605}"/>
+                <a16:creationId xmlns:a16="http://schemas.microsoft.com/office/drawing/2014/main" xmlns="" id="{6125DA21-5264-4D26-99A6-EB4DC5C7A605}"/>
               </a:ext>
             </a:extLst>
           </p:cNvPr>
@@ -35644,7 +35680,7 @@
           <p:cNvPr id="4" name="Рисунок 3">
             <a:extLst>
               <a:ext uri="{FF2B5EF4-FFF2-40B4-BE49-F238E27FC236}">
-                <a16:creationId xmlns:a16="http://schemas.microsoft.com/office/drawing/2014/main" id="{1FAB7BF3-8D37-4D05-8B58-E207A05616A2}"/>
+                <a16:creationId xmlns:a16="http://schemas.microsoft.com/office/drawing/2014/main" xmlns="" id="{1FAB7BF3-8D37-4D05-8B58-E207A05616A2}"/>
               </a:ext>
             </a:extLst>
           </p:cNvPr>
@@ -35672,7 +35708,7 @@
     </p:spTree>
     <p:extLst>
       <p:ext uri="{BB962C8B-B14F-4D97-AF65-F5344CB8AC3E}">
-        <p14:creationId xmlns:p14="http://schemas.microsoft.com/office/powerpoint/2010/main" val="2781836022"/>
+        <p14:creationId xmlns:p14="http://schemas.microsoft.com/office/powerpoint/2010/main" xmlns="" val="2781836022"/>
       </p:ext>
     </p:extLst>
   </p:cSld>
@@ -35733,7 +35769,7 @@
           <p:cNvPr id="6" name="Прямоугольник 5">
             <a:extLst>
               <a:ext uri="{FF2B5EF4-FFF2-40B4-BE49-F238E27FC236}">
-                <a16:creationId xmlns:a16="http://schemas.microsoft.com/office/drawing/2014/main" id="{6125DA21-5264-4D26-99A6-EB4DC5C7A605}"/>
+                <a16:creationId xmlns:a16="http://schemas.microsoft.com/office/drawing/2014/main" xmlns="" id="{6125DA21-5264-4D26-99A6-EB4DC5C7A605}"/>
               </a:ext>
             </a:extLst>
           </p:cNvPr>
@@ -35825,7 +35861,7 @@
           <p:cNvPr id="8" name="Рисунок 7">
             <a:extLst>
               <a:ext uri="{FF2B5EF4-FFF2-40B4-BE49-F238E27FC236}">
-                <a16:creationId xmlns:a16="http://schemas.microsoft.com/office/drawing/2014/main" id="{528D3587-692F-4840-BAF7-F7F15E4F616B}"/>
+                <a16:creationId xmlns:a16="http://schemas.microsoft.com/office/drawing/2014/main" xmlns="" id="{528D3587-692F-4840-BAF7-F7F15E4F616B}"/>
               </a:ext>
             </a:extLst>
           </p:cNvPr>
@@ -35853,7 +35889,7 @@
     </p:spTree>
     <p:extLst>
       <p:ext uri="{BB962C8B-B14F-4D97-AF65-F5344CB8AC3E}">
-        <p14:creationId xmlns:p14="http://schemas.microsoft.com/office/powerpoint/2010/main" val="4212284329"/>
+        <p14:creationId xmlns:p14="http://schemas.microsoft.com/office/powerpoint/2010/main" xmlns="" val="4212284329"/>
       </p:ext>
     </p:extLst>
   </p:cSld>
@@ -35883,7 +35919,7 @@
     </p:spTree>
     <p:extLst>
       <p:ext uri="{BB962C8B-B14F-4D97-AF65-F5344CB8AC3E}">
-        <p14:creationId xmlns:p14="http://schemas.microsoft.com/office/powerpoint/2010/main" val="758308138"/>
+        <p14:creationId xmlns:p14="http://schemas.microsoft.com/office/powerpoint/2010/main" xmlns="" val="758308138"/>
       </p:ext>
     </p:extLst>
   </p:cSld>
@@ -35951,7 +35987,7 @@
     </p:spTree>
     <p:extLst>
       <p:ext uri="{BB962C8B-B14F-4D97-AF65-F5344CB8AC3E}">
-        <p14:creationId xmlns:p14="http://schemas.microsoft.com/office/powerpoint/2010/main" val="3393647756"/>
+        <p14:creationId xmlns:p14="http://schemas.microsoft.com/office/powerpoint/2010/main" xmlns="" val="3393647756"/>
       </p:ext>
     </p:extLst>
   </p:cSld>
@@ -36086,7 +36122,7 @@
     </p:spTree>
     <p:extLst>
       <p:ext uri="{BB962C8B-B14F-4D97-AF65-F5344CB8AC3E}">
-        <p14:creationId xmlns:p14="http://schemas.microsoft.com/office/powerpoint/2010/main" val="1308605808"/>
+        <p14:creationId xmlns:p14="http://schemas.microsoft.com/office/powerpoint/2010/main" xmlns="" val="1308605808"/>
       </p:ext>
     </p:extLst>
   </p:cSld>
@@ -36231,7 +36267,7 @@
     </p:spTree>
     <p:extLst>
       <p:ext uri="{BB962C8B-B14F-4D97-AF65-F5344CB8AC3E}">
-        <p14:creationId xmlns:p14="http://schemas.microsoft.com/office/powerpoint/2010/main" val="3823822222"/>
+        <p14:creationId xmlns:p14="http://schemas.microsoft.com/office/powerpoint/2010/main" xmlns="" val="3823822222"/>
       </p:ext>
     </p:extLst>
   </p:cSld>
@@ -36375,7 +36411,7 @@
     </p:spTree>
     <p:extLst>
       <p:ext uri="{BB962C8B-B14F-4D97-AF65-F5344CB8AC3E}">
-        <p14:creationId xmlns:p14="http://schemas.microsoft.com/office/powerpoint/2010/main" val="4258193492"/>
+        <p14:creationId xmlns:p14="http://schemas.microsoft.com/office/powerpoint/2010/main" xmlns="" val="4258193492"/>
       </p:ext>
     </p:extLst>
   </p:cSld>
@@ -36436,7 +36472,7 @@
           <p:cNvPr id="7" name="TextBox 6">
             <a:extLst>
               <a:ext uri="{FF2B5EF4-FFF2-40B4-BE49-F238E27FC236}">
-                <a16:creationId xmlns:a16="http://schemas.microsoft.com/office/drawing/2014/main" id="{601EF7DF-8974-4E64-B04C-6C4C8A501E90}"/>
+                <a16:creationId xmlns:a16="http://schemas.microsoft.com/office/drawing/2014/main" xmlns="" id="{601EF7DF-8974-4E64-B04C-6C4C8A501E90}"/>
               </a:ext>
             </a:extLst>
           </p:cNvPr>
@@ -36852,7 +36888,7 @@
           <p:cNvPr id="9" name="Прямоугольник 8">
             <a:extLst>
               <a:ext uri="{FF2B5EF4-FFF2-40B4-BE49-F238E27FC236}">
-                <a16:creationId xmlns:a16="http://schemas.microsoft.com/office/drawing/2014/main" id="{9CF06E7D-35D5-4B35-8E9E-79F97A1C0237}"/>
+                <a16:creationId xmlns:a16="http://schemas.microsoft.com/office/drawing/2014/main" xmlns="" id="{9CF06E7D-35D5-4B35-8E9E-79F97A1C0237}"/>
               </a:ext>
             </a:extLst>
           </p:cNvPr>
@@ -36981,7 +37017,7 @@
     </p:spTree>
     <p:extLst>
       <p:ext uri="{BB962C8B-B14F-4D97-AF65-F5344CB8AC3E}">
-        <p14:creationId xmlns:p14="http://schemas.microsoft.com/office/powerpoint/2010/main" val="88523542"/>
+        <p14:creationId xmlns:p14="http://schemas.microsoft.com/office/powerpoint/2010/main" xmlns="" val="88523542"/>
       </p:ext>
     </p:extLst>
   </p:cSld>
@@ -37242,7 +37278,7 @@
     </p:spTree>
     <p:extLst>
       <p:ext uri="{BB962C8B-B14F-4D97-AF65-F5344CB8AC3E}">
-        <p14:creationId xmlns:p14="http://schemas.microsoft.com/office/powerpoint/2010/main" val="112286898"/>
+        <p14:creationId xmlns:p14="http://schemas.microsoft.com/office/powerpoint/2010/main" xmlns="" val="112286898"/>
       </p:ext>
     </p:extLst>
   </p:cSld>
@@ -37363,7 +37399,7 @@
     </p:spTree>
     <p:extLst>
       <p:ext uri="{BB962C8B-B14F-4D97-AF65-F5344CB8AC3E}">
-        <p14:creationId xmlns:p14="http://schemas.microsoft.com/office/powerpoint/2010/main" val="3632847500"/>
+        <p14:creationId xmlns:p14="http://schemas.microsoft.com/office/powerpoint/2010/main" xmlns="" val="3632847500"/>
       </p:ext>
     </p:extLst>
   </p:cSld>
@@ -37498,7 +37534,7 @@
     </p:spTree>
     <p:extLst>
       <p:ext uri="{BB962C8B-B14F-4D97-AF65-F5344CB8AC3E}">
-        <p14:creationId xmlns:p14="http://schemas.microsoft.com/office/powerpoint/2010/main" val="2939407668"/>
+        <p14:creationId xmlns:p14="http://schemas.microsoft.com/office/powerpoint/2010/main" xmlns="" val="2939407668"/>
       </p:ext>
     </p:extLst>
   </p:cSld>
@@ -37790,7 +37826,7 @@
     </p:spTree>
     <p:extLst>
       <p:ext uri="{BB962C8B-B14F-4D97-AF65-F5344CB8AC3E}">
-        <p14:creationId xmlns:p14="http://schemas.microsoft.com/office/powerpoint/2010/main" val="2140033910"/>
+        <p14:creationId xmlns:p14="http://schemas.microsoft.com/office/powerpoint/2010/main" xmlns="" val="2140033910"/>
       </p:ext>
     </p:extLst>
   </p:cSld>
@@ -37820,7 +37856,7 @@
     </p:spTree>
     <p:extLst>
       <p:ext uri="{BB962C8B-B14F-4D97-AF65-F5344CB8AC3E}">
-        <p14:creationId xmlns:p14="http://schemas.microsoft.com/office/powerpoint/2010/main" val="832722495"/>
+        <p14:creationId xmlns:p14="http://schemas.microsoft.com/office/powerpoint/2010/main" xmlns="" val="832722495"/>
       </p:ext>
     </p:extLst>
   </p:cSld>
@@ -37880,7 +37916,7 @@
     </p:spTree>
     <p:extLst>
       <p:ext uri="{BB962C8B-B14F-4D97-AF65-F5344CB8AC3E}">
-        <p14:creationId xmlns:p14="http://schemas.microsoft.com/office/powerpoint/2010/main" val="2213845240"/>
+        <p14:creationId xmlns:p14="http://schemas.microsoft.com/office/powerpoint/2010/main" xmlns="" val="2213845240"/>
       </p:ext>
     </p:extLst>
   </p:cSld>
@@ -38109,7 +38145,7 @@
     </p:spTree>
     <p:extLst>
       <p:ext uri="{BB962C8B-B14F-4D97-AF65-F5344CB8AC3E}">
-        <p14:creationId xmlns:p14="http://schemas.microsoft.com/office/powerpoint/2010/main" val="558137326"/>
+        <p14:creationId xmlns:p14="http://schemas.microsoft.com/office/powerpoint/2010/main" xmlns="" val="558137326"/>
       </p:ext>
     </p:extLst>
   </p:cSld>
@@ -38359,7 +38395,7 @@
     </p:spTree>
     <p:extLst>
       <p:ext uri="{BB962C8B-B14F-4D97-AF65-F5344CB8AC3E}">
-        <p14:creationId xmlns:p14="http://schemas.microsoft.com/office/powerpoint/2010/main" val="1311352809"/>
+        <p14:creationId xmlns:p14="http://schemas.microsoft.com/office/powerpoint/2010/main" xmlns="" val="1311352809"/>
       </p:ext>
     </p:extLst>
   </p:cSld>
@@ -38542,7 +38578,7 @@
     </p:spTree>
     <p:extLst>
       <p:ext uri="{BB962C8B-B14F-4D97-AF65-F5344CB8AC3E}">
-        <p14:creationId xmlns:p14="http://schemas.microsoft.com/office/powerpoint/2010/main" val="1863601096"/>
+        <p14:creationId xmlns:p14="http://schemas.microsoft.com/office/powerpoint/2010/main" xmlns="" val="1863601096"/>
       </p:ext>
     </p:extLst>
   </p:cSld>
@@ -38742,7 +38778,7 @@
     </p:spTree>
     <p:extLst>
       <p:ext uri="{BB962C8B-B14F-4D97-AF65-F5344CB8AC3E}">
-        <p14:creationId xmlns:p14="http://schemas.microsoft.com/office/powerpoint/2010/main" val="309642701"/>
+        <p14:creationId xmlns:p14="http://schemas.microsoft.com/office/powerpoint/2010/main" xmlns="" val="309642701"/>
       </p:ext>
     </p:extLst>
   </p:cSld>
@@ -38803,7 +38839,7 @@
           <p:cNvPr id="7" name="TextBox 6">
             <a:extLst>
               <a:ext uri="{FF2B5EF4-FFF2-40B4-BE49-F238E27FC236}">
-                <a16:creationId xmlns:a16="http://schemas.microsoft.com/office/drawing/2014/main" id="{601EF7DF-8974-4E64-B04C-6C4C8A501E90}"/>
+                <a16:creationId xmlns:a16="http://schemas.microsoft.com/office/drawing/2014/main" xmlns="" id="{601EF7DF-8974-4E64-B04C-6C4C8A501E90}"/>
               </a:ext>
             </a:extLst>
           </p:cNvPr>
@@ -39219,7 +39255,7 @@
           <p:cNvPr id="9" name="Прямоугольник 8">
             <a:extLst>
               <a:ext uri="{FF2B5EF4-FFF2-40B4-BE49-F238E27FC236}">
-                <a16:creationId xmlns:a16="http://schemas.microsoft.com/office/drawing/2014/main" id="{9CF06E7D-35D5-4B35-8E9E-79F97A1C0237}"/>
+                <a16:creationId xmlns:a16="http://schemas.microsoft.com/office/drawing/2014/main" xmlns="" id="{9CF06E7D-35D5-4B35-8E9E-79F97A1C0237}"/>
               </a:ext>
             </a:extLst>
           </p:cNvPr>
@@ -39350,7 +39386,7 @@
           <p:cNvPr id="6" name="Рисунок 5">
             <a:extLst>
               <a:ext uri="{FF2B5EF4-FFF2-40B4-BE49-F238E27FC236}">
-                <a16:creationId xmlns:a16="http://schemas.microsoft.com/office/drawing/2014/main" id="{17133EE6-8FA0-4B7C-800A-1C0E2A854343}"/>
+                <a16:creationId xmlns:a16="http://schemas.microsoft.com/office/drawing/2014/main" xmlns="" id="{17133EE6-8FA0-4B7C-800A-1C0E2A854343}"/>
               </a:ext>
             </a:extLst>
           </p:cNvPr>
@@ -39378,7 +39414,7 @@
     </p:spTree>
     <p:extLst>
       <p:ext uri="{BB962C8B-B14F-4D97-AF65-F5344CB8AC3E}">
-        <p14:creationId xmlns:p14="http://schemas.microsoft.com/office/powerpoint/2010/main" val="4159431570"/>
+        <p14:creationId xmlns:p14="http://schemas.microsoft.com/office/powerpoint/2010/main" xmlns="" val="4159431570"/>
       </p:ext>
     </p:extLst>
   </p:cSld>
@@ -39408,7 +39444,7 @@
     </p:spTree>
     <p:extLst>
       <p:ext uri="{BB962C8B-B14F-4D97-AF65-F5344CB8AC3E}">
-        <p14:creationId xmlns:p14="http://schemas.microsoft.com/office/powerpoint/2010/main" val="4282316725"/>
+        <p14:creationId xmlns:p14="http://schemas.microsoft.com/office/powerpoint/2010/main" xmlns="" val="4282316725"/>
       </p:ext>
     </p:extLst>
   </p:cSld>
@@ -39468,7 +39504,7 @@
     </p:spTree>
     <p:extLst>
       <p:ext uri="{BB962C8B-B14F-4D97-AF65-F5344CB8AC3E}">
-        <p14:creationId xmlns:p14="http://schemas.microsoft.com/office/powerpoint/2010/main" val="276768002"/>
+        <p14:creationId xmlns:p14="http://schemas.microsoft.com/office/powerpoint/2010/main" xmlns="" val="276768002"/>
       </p:ext>
     </p:extLst>
   </p:cSld>
@@ -39633,7 +39669,7 @@
           <p:cNvPr id="5" name="Рисунок 4">
             <a:extLst>
               <a:ext uri="{FF2B5EF4-FFF2-40B4-BE49-F238E27FC236}">
-                <a16:creationId xmlns:a16="http://schemas.microsoft.com/office/drawing/2014/main" id="{C68F35A0-630C-4AC0-90A2-764B0DF66CB6}"/>
+                <a16:creationId xmlns:a16="http://schemas.microsoft.com/office/drawing/2014/main" xmlns="" id="{C68F35A0-630C-4AC0-90A2-764B0DF66CB6}"/>
               </a:ext>
             </a:extLst>
           </p:cNvPr>
@@ -39663,7 +39699,7 @@
           <p:cNvPr id="7" name="Рисунок 6">
             <a:extLst>
               <a:ext uri="{FF2B5EF4-FFF2-40B4-BE49-F238E27FC236}">
-                <a16:creationId xmlns:a16="http://schemas.microsoft.com/office/drawing/2014/main" id="{A1F0FC64-802F-4218-8732-E3098F541172}"/>
+                <a16:creationId xmlns:a16="http://schemas.microsoft.com/office/drawing/2014/main" xmlns="" id="{A1F0FC64-802F-4218-8732-E3098F541172}"/>
               </a:ext>
             </a:extLst>
           </p:cNvPr>
@@ -39691,7 +39727,7 @@
     </p:spTree>
     <p:extLst>
       <p:ext uri="{BB962C8B-B14F-4D97-AF65-F5344CB8AC3E}">
-        <p14:creationId xmlns:p14="http://schemas.microsoft.com/office/powerpoint/2010/main" val="1368564289"/>
+        <p14:creationId xmlns:p14="http://schemas.microsoft.com/office/powerpoint/2010/main" xmlns="" val="1368564289"/>
       </p:ext>
     </p:extLst>
   </p:cSld>
@@ -39752,7 +39788,7 @@
           <p:cNvPr id="5" name="Рисунок 4">
             <a:extLst>
               <a:ext uri="{FF2B5EF4-FFF2-40B4-BE49-F238E27FC236}">
-                <a16:creationId xmlns:a16="http://schemas.microsoft.com/office/drawing/2014/main" id="{92D27E22-8C16-4DEF-BE76-9F14BD0BCDBF}"/>
+                <a16:creationId xmlns:a16="http://schemas.microsoft.com/office/drawing/2014/main" xmlns="" id="{92D27E22-8C16-4DEF-BE76-9F14BD0BCDBF}"/>
               </a:ext>
             </a:extLst>
           </p:cNvPr>
@@ -39780,7 +39816,7 @@
     </p:spTree>
     <p:extLst>
       <p:ext uri="{BB962C8B-B14F-4D97-AF65-F5344CB8AC3E}">
-        <p14:creationId xmlns:p14="http://schemas.microsoft.com/office/powerpoint/2010/main" val="991935982"/>
+        <p14:creationId xmlns:p14="http://schemas.microsoft.com/office/powerpoint/2010/main" xmlns="" val="991935982"/>
       </p:ext>
     </p:extLst>
   </p:cSld>
@@ -39841,7 +39877,7 @@
           <p:cNvPr id="4" name="Рисунок 3">
             <a:extLst>
               <a:ext uri="{FF2B5EF4-FFF2-40B4-BE49-F238E27FC236}">
-                <a16:creationId xmlns:a16="http://schemas.microsoft.com/office/drawing/2014/main" id="{DDCF6CD8-79EC-2F63-0025-538A1FBBFA3F}"/>
+                <a16:creationId xmlns:a16="http://schemas.microsoft.com/office/drawing/2014/main" xmlns="" id="{DDCF6CD8-79EC-2F63-0025-538A1FBBFA3F}"/>
               </a:ext>
             </a:extLst>
           </p:cNvPr>
@@ -39869,7 +39905,7 @@
     </p:spTree>
     <p:extLst>
       <p:ext uri="{BB962C8B-B14F-4D97-AF65-F5344CB8AC3E}">
-        <p14:creationId xmlns:p14="http://schemas.microsoft.com/office/powerpoint/2010/main" val="3620260499"/>
+        <p14:creationId xmlns:p14="http://schemas.microsoft.com/office/powerpoint/2010/main" xmlns="" val="3620260499"/>
       </p:ext>
     </p:extLst>
   </p:cSld>
@@ -39930,7 +39966,7 @@
           <p:cNvPr id="5" name="Рисунок 4">
             <a:extLst>
               <a:ext uri="{FF2B5EF4-FFF2-40B4-BE49-F238E27FC236}">
-                <a16:creationId xmlns:a16="http://schemas.microsoft.com/office/drawing/2014/main" id="{088B4985-3228-5F17-512B-4396C8F00C72}"/>
+                <a16:creationId xmlns:a16="http://schemas.microsoft.com/office/drawing/2014/main" xmlns="" id="{088B4985-3228-5F17-512B-4396C8F00C72}"/>
               </a:ext>
             </a:extLst>
           </p:cNvPr>
@@ -39958,7 +39994,7 @@
     </p:spTree>
     <p:extLst>
       <p:ext uri="{BB962C8B-B14F-4D97-AF65-F5344CB8AC3E}">
-        <p14:creationId xmlns:p14="http://schemas.microsoft.com/office/powerpoint/2010/main" val="412018527"/>
+        <p14:creationId xmlns:p14="http://schemas.microsoft.com/office/powerpoint/2010/main" xmlns="" val="412018527"/>
       </p:ext>
     </p:extLst>
   </p:cSld>
@@ -40027,7 +40063,7 @@
           <p:cNvPr id="4" name="Рисунок 3">
             <a:extLst>
               <a:ext uri="{FF2B5EF4-FFF2-40B4-BE49-F238E27FC236}">
-                <a16:creationId xmlns:a16="http://schemas.microsoft.com/office/drawing/2014/main" id="{95B5C7C1-E97D-4757-8A66-9E4BFE67B602}"/>
+                <a16:creationId xmlns:a16="http://schemas.microsoft.com/office/drawing/2014/main" xmlns="" id="{95B5C7C1-E97D-4757-8A66-9E4BFE67B602}"/>
               </a:ext>
             </a:extLst>
           </p:cNvPr>
@@ -40057,7 +40093,7 @@
           <p:cNvPr id="8" name="Рисунок 7">
             <a:extLst>
               <a:ext uri="{FF2B5EF4-FFF2-40B4-BE49-F238E27FC236}">
-                <a16:creationId xmlns:a16="http://schemas.microsoft.com/office/drawing/2014/main" id="{AC075F86-C867-4CB1-8605-6A3752A6A2D6}"/>
+                <a16:creationId xmlns:a16="http://schemas.microsoft.com/office/drawing/2014/main" xmlns="" id="{AC075F86-C867-4CB1-8605-6A3752A6A2D6}"/>
               </a:ext>
             </a:extLst>
           </p:cNvPr>
@@ -40085,7 +40121,7 @@
     </p:spTree>
     <p:extLst>
       <p:ext uri="{BB962C8B-B14F-4D97-AF65-F5344CB8AC3E}">
-        <p14:creationId xmlns:p14="http://schemas.microsoft.com/office/powerpoint/2010/main" val="2572720320"/>
+        <p14:creationId xmlns:p14="http://schemas.microsoft.com/office/powerpoint/2010/main" xmlns="" val="2572720320"/>
       </p:ext>
     </p:extLst>
   </p:cSld>
@@ -40146,7 +40182,7 @@
           <p:cNvPr id="5" name="Прямоугольник 4">
             <a:extLst>
               <a:ext uri="{FF2B5EF4-FFF2-40B4-BE49-F238E27FC236}">
-                <a16:creationId xmlns:a16="http://schemas.microsoft.com/office/drawing/2014/main" id="{80EF481F-15AF-4912-9334-5D004B11C5A6}"/>
+                <a16:creationId xmlns:a16="http://schemas.microsoft.com/office/drawing/2014/main" xmlns="" id="{80EF481F-15AF-4912-9334-5D004B11C5A6}"/>
               </a:ext>
             </a:extLst>
           </p:cNvPr>
@@ -40186,7 +40222,7 @@
           <p:cNvPr id="8" name="Рисунок 7">
             <a:extLst>
               <a:ext uri="{FF2B5EF4-FFF2-40B4-BE49-F238E27FC236}">
-                <a16:creationId xmlns:a16="http://schemas.microsoft.com/office/drawing/2014/main" id="{8D60B46D-8898-4BDE-9286-25124C11D96F}"/>
+                <a16:creationId xmlns:a16="http://schemas.microsoft.com/office/drawing/2014/main" xmlns="" id="{8D60B46D-8898-4BDE-9286-25124C11D96F}"/>
               </a:ext>
             </a:extLst>
           </p:cNvPr>
@@ -40214,7 +40250,7 @@
     </p:spTree>
     <p:extLst>
       <p:ext uri="{BB962C8B-B14F-4D97-AF65-F5344CB8AC3E}">
-        <p14:creationId xmlns:p14="http://schemas.microsoft.com/office/powerpoint/2010/main" val="3779142870"/>
+        <p14:creationId xmlns:p14="http://schemas.microsoft.com/office/powerpoint/2010/main" xmlns="" val="3779142870"/>
       </p:ext>
     </p:extLst>
   </p:cSld>
@@ -40275,7 +40311,7 @@
           <p:cNvPr id="5" name="Прямоугольник 4">
             <a:extLst>
               <a:ext uri="{FF2B5EF4-FFF2-40B4-BE49-F238E27FC236}">
-                <a16:creationId xmlns:a16="http://schemas.microsoft.com/office/drawing/2014/main" id="{80EF481F-15AF-4912-9334-5D004B11C5A6}"/>
+                <a16:creationId xmlns:a16="http://schemas.microsoft.com/office/drawing/2014/main" xmlns="" id="{80EF481F-15AF-4912-9334-5D004B11C5A6}"/>
               </a:ext>
             </a:extLst>
           </p:cNvPr>
@@ -40315,7 +40351,7 @@
           <p:cNvPr id="4" name="Рисунок 3">
             <a:extLst>
               <a:ext uri="{FF2B5EF4-FFF2-40B4-BE49-F238E27FC236}">
-                <a16:creationId xmlns:a16="http://schemas.microsoft.com/office/drawing/2014/main" id="{93CFB062-A3DF-4E57-884F-9C3313B0D647}"/>
+                <a16:creationId xmlns:a16="http://schemas.microsoft.com/office/drawing/2014/main" xmlns="" id="{93CFB062-A3DF-4E57-884F-9C3313B0D647}"/>
               </a:ext>
             </a:extLst>
           </p:cNvPr>
@@ -40343,7 +40379,7 @@
     </p:spTree>
     <p:extLst>
       <p:ext uri="{BB962C8B-B14F-4D97-AF65-F5344CB8AC3E}">
-        <p14:creationId xmlns:p14="http://schemas.microsoft.com/office/powerpoint/2010/main" val="2612850140"/>
+        <p14:creationId xmlns:p14="http://schemas.microsoft.com/office/powerpoint/2010/main" xmlns="" val="2612850140"/>
       </p:ext>
     </p:extLst>
   </p:cSld>
@@ -40404,7 +40440,7 @@
           <p:cNvPr id="5" name="Прямоугольник 4">
             <a:extLst>
               <a:ext uri="{FF2B5EF4-FFF2-40B4-BE49-F238E27FC236}">
-                <a16:creationId xmlns:a16="http://schemas.microsoft.com/office/drawing/2014/main" id="{80EF481F-15AF-4912-9334-5D004B11C5A6}"/>
+                <a16:creationId xmlns:a16="http://schemas.microsoft.com/office/drawing/2014/main" xmlns="" id="{80EF481F-15AF-4912-9334-5D004B11C5A6}"/>
               </a:ext>
             </a:extLst>
           </p:cNvPr>
@@ -40444,7 +40480,7 @@
           <p:cNvPr id="6" name="Рисунок 5">
             <a:extLst>
               <a:ext uri="{FF2B5EF4-FFF2-40B4-BE49-F238E27FC236}">
-                <a16:creationId xmlns:a16="http://schemas.microsoft.com/office/drawing/2014/main" id="{1B0514B9-4820-4395-B4B1-67F5CA399076}"/>
+                <a16:creationId xmlns:a16="http://schemas.microsoft.com/office/drawing/2014/main" xmlns="" id="{1B0514B9-4820-4395-B4B1-67F5CA399076}"/>
               </a:ext>
             </a:extLst>
           </p:cNvPr>
@@ -40472,7 +40508,7 @@
     </p:spTree>
     <p:extLst>
       <p:ext uri="{BB962C8B-B14F-4D97-AF65-F5344CB8AC3E}">
-        <p14:creationId xmlns:p14="http://schemas.microsoft.com/office/powerpoint/2010/main" val="14261438"/>
+        <p14:creationId xmlns:p14="http://schemas.microsoft.com/office/powerpoint/2010/main" xmlns="" val="14261438"/>
       </p:ext>
     </p:extLst>
   </p:cSld>
@@ -40810,7 +40846,7 @@
     </a:clrScheme>
     <a:fontScheme name="Стандартная">
       <a:majorFont>
-        <a:latin typeface="Calibri Light" panose="020F0302020204030204"/>
+        <a:latin typeface="Calibri Light"/>
         <a:ea typeface=""/>
         <a:cs typeface=""/>
         <a:font script="Jpan" typeface="游ゴシック Light"/>
@@ -40862,7 +40898,7 @@
         <a:font script="Tfng" typeface="Ebrima"/>
       </a:majorFont>
       <a:minorFont>
-        <a:latin typeface="Calibri" panose="020F0502020204030204"/>
+        <a:latin typeface="Calibri"/>
         <a:ea typeface=""/>
         <a:cs typeface=""/>
         <a:font script="Jpan" typeface="游ゴシック"/>
@@ -41056,7 +41092,7 @@
   <a:extraClrSchemeLst/>
   <a:extLst>
     <a:ext uri="{05A4C25C-085E-4340-85A3-A5531E510DB2}">
-      <thm15:themeFamily xmlns:thm15="http://schemas.microsoft.com/office/thememl/2012/main" name="Office Theme" id="{62F939B6-93AF-4DB8-9C6B-D6C7DFDC589F}" vid="{4A3C46E8-61CC-4603-A589-7422A47A8E4A}"/>
+      <thm15:themeFamily xmlns:thm15="http://schemas.microsoft.com/office/thememl/2012/main" xmlns="" name="Office Theme" id="{62F939B6-93AF-4DB8-9C6B-D6C7DFDC589F}" vid="{4A3C46E8-61CC-4603-A589-7422A47A8E4A}"/>
     </a:ext>
   </a:extLst>
 </a:theme>

</xml_diff>

<commit_message>
Modified lek8 to fit lab16
</commit_message>
<xml_diff>
--- a/Лекции/FIST2024_OsnProgram_lek_08_dvukhmernye_massivy.pptx
+++ b/Лекции/FIST2024_OsnProgram_lek_08_dvukhmernye_massivy.pptx
@@ -6873,8 +6873,8 @@
               <a:t>При нажатии клавиши </a:t>
             </a:r>
             <a:r>
-              <a:rPr lang="en-US" smtClean="0"/>
-              <a:t>‘G’ </a:t>
+              <a:rPr lang="en-US" dirty="0" smtClean="0"/>
+              <a:t>‘1’ </a:t>
             </a:r>
             <a:r>
               <a:rPr lang="ru-RU" dirty="0"/>
@@ -6896,8 +6896,8 @@
               <a:t>При нажатии клавиши </a:t>
             </a:r>
             <a:r>
-              <a:rPr lang="en-US" dirty="0"/>
-              <a:t>‘O’ </a:t>
+              <a:rPr lang="en-US" dirty="0" smtClean="0"/>
+              <a:t>‘2’ </a:t>
             </a:r>
             <a:r>
               <a:rPr lang="ru-RU" dirty="0"/>

</xml_diff>